<commit_message>
updated day 4 files
</commit_message>
<xml_diff>
--- a/Day_4/Lectures/Day_4_Lecture_1_ML_Models_and_Model_Evaluation.pptx
+++ b/Day_4/Lectures/Day_4_Lecture_1_ML_Models_and_Model_Evaluation.pptx
@@ -918,7 +918,7 @@
   <p:cSld>
     <p:spTree>
       <p:nvGrpSpPr>
-        <p:cNvPr id="175" name="Shape 175"/>
+        <p:cNvPr id="176" name="Shape 176"/>
         <p:cNvGrpSpPr/>
         <p:nvPr/>
       </p:nvGrpSpPr>
@@ -932,7 +932,7 @@
       </p:grpSpPr>
       <p:sp>
         <p:nvSpPr>
-          <p:cNvPr id="176" name="Google Shape;176;g1113c07b4bc_0_121:notes"/>
+          <p:cNvPr id="177" name="Google Shape;177;g1113c07b4bc_0_121:notes"/>
           <p:cNvSpPr/>
           <p:nvPr>
             <p:ph idx="2" type="sldImg"/>
@@ -967,7 +967,7 @@
       </p:sp>
       <p:sp>
         <p:nvSpPr>
-          <p:cNvPr id="177" name="Google Shape;177;g1113c07b4bc_0_121:notes"/>
+          <p:cNvPr id="178" name="Google Shape;178;g1113c07b4bc_0_121:notes"/>
           <p:cNvSpPr txBox="1"/>
           <p:nvPr>
             <p:ph idx="1" type="body"/>
@@ -1017,7 +1017,7 @@
   <p:cSld>
     <p:spTree>
       <p:nvGrpSpPr>
-        <p:cNvPr id="183" name="Shape 183"/>
+        <p:cNvPr id="184" name="Shape 184"/>
         <p:cNvGrpSpPr/>
         <p:nvPr/>
       </p:nvGrpSpPr>
@@ -1031,7 +1031,7 @@
       </p:grpSpPr>
       <p:sp>
         <p:nvSpPr>
-          <p:cNvPr id="184" name="Google Shape;184;g1113c07b4bc_0_136:notes"/>
+          <p:cNvPr id="185" name="Google Shape;185;g1113c07b4bc_0_136:notes"/>
           <p:cNvSpPr/>
           <p:nvPr>
             <p:ph idx="2" type="sldImg"/>
@@ -1066,7 +1066,7 @@
       </p:sp>
       <p:sp>
         <p:nvSpPr>
-          <p:cNvPr id="185" name="Google Shape;185;g1113c07b4bc_0_136:notes"/>
+          <p:cNvPr id="186" name="Google Shape;186;g1113c07b4bc_0_136:notes"/>
           <p:cNvSpPr txBox="1"/>
           <p:nvPr>
             <p:ph idx="1" type="body"/>
@@ -1116,7 +1116,7 @@
   <p:cSld>
     <p:spTree>
       <p:nvGrpSpPr>
-        <p:cNvPr id="193" name="Shape 193"/>
+        <p:cNvPr id="194" name="Shape 194"/>
         <p:cNvGrpSpPr/>
         <p:nvPr/>
       </p:nvGrpSpPr>
@@ -1130,7 +1130,7 @@
       </p:grpSpPr>
       <p:sp>
         <p:nvSpPr>
-          <p:cNvPr id="194" name="Google Shape;194;g1113c07b4bc_0_145:notes"/>
+          <p:cNvPr id="195" name="Google Shape;195;g1113c07b4bc_0_145:notes"/>
           <p:cNvSpPr/>
           <p:nvPr>
             <p:ph idx="2" type="sldImg"/>
@@ -1165,7 +1165,7 @@
       </p:sp>
       <p:sp>
         <p:nvSpPr>
-          <p:cNvPr id="195" name="Google Shape;195;g1113c07b4bc_0_145:notes"/>
+          <p:cNvPr id="196" name="Google Shape;196;g1113c07b4bc_0_145:notes"/>
           <p:cNvSpPr txBox="1"/>
           <p:nvPr>
             <p:ph idx="1" type="body"/>
@@ -1215,7 +1215,7 @@
   <p:cSld>
     <p:spTree>
       <p:nvGrpSpPr>
-        <p:cNvPr id="203" name="Shape 203"/>
+        <p:cNvPr id="204" name="Shape 204"/>
         <p:cNvGrpSpPr/>
         <p:nvPr/>
       </p:nvGrpSpPr>
@@ -1229,7 +1229,7 @@
       </p:grpSpPr>
       <p:sp>
         <p:nvSpPr>
-          <p:cNvPr id="204" name="Google Shape;204;g1113c07b4bc_0_155:notes"/>
+          <p:cNvPr id="205" name="Google Shape;205;g1113c07b4bc_0_155:notes"/>
           <p:cNvSpPr/>
           <p:nvPr>
             <p:ph idx="2" type="sldImg"/>
@@ -1264,7 +1264,7 @@
       </p:sp>
       <p:sp>
         <p:nvSpPr>
-          <p:cNvPr id="205" name="Google Shape;205;g1113c07b4bc_0_155:notes"/>
+          <p:cNvPr id="206" name="Google Shape;206;g1113c07b4bc_0_155:notes"/>
           <p:cNvSpPr txBox="1"/>
           <p:nvPr>
             <p:ph idx="1" type="body"/>
@@ -1314,7 +1314,7 @@
   <p:cSld>
     <p:spTree>
       <p:nvGrpSpPr>
-        <p:cNvPr id="213" name="Shape 213"/>
+        <p:cNvPr id="214" name="Shape 214"/>
         <p:cNvGrpSpPr/>
         <p:nvPr/>
       </p:nvGrpSpPr>
@@ -1328,7 +1328,7 @@
       </p:grpSpPr>
       <p:sp>
         <p:nvSpPr>
-          <p:cNvPr id="214" name="Google Shape;214;g1113c07b4bc_0_165:notes"/>
+          <p:cNvPr id="215" name="Google Shape;215;g1113c07b4bc_0_165:notes"/>
           <p:cNvSpPr/>
           <p:nvPr>
             <p:ph idx="2" type="sldImg"/>
@@ -1363,7 +1363,7 @@
       </p:sp>
       <p:sp>
         <p:nvSpPr>
-          <p:cNvPr id="215" name="Google Shape;215;g1113c07b4bc_0_165:notes"/>
+          <p:cNvPr id="216" name="Google Shape;216;g1113c07b4bc_0_165:notes"/>
           <p:cNvSpPr txBox="1"/>
           <p:nvPr>
             <p:ph idx="1" type="body"/>
@@ -1413,7 +1413,7 @@
   <p:cSld>
     <p:spTree>
       <p:nvGrpSpPr>
-        <p:cNvPr id="223" name="Shape 223"/>
+        <p:cNvPr id="224" name="Shape 224"/>
         <p:cNvGrpSpPr/>
         <p:nvPr/>
       </p:nvGrpSpPr>
@@ -1427,7 +1427,7 @@
       </p:grpSpPr>
       <p:sp>
         <p:nvSpPr>
-          <p:cNvPr id="224" name="Google Shape;224;g1113c07b4bc_0_8:notes"/>
+          <p:cNvPr id="225" name="Google Shape;225;g1113c07b4bc_0_8:notes"/>
           <p:cNvSpPr/>
           <p:nvPr>
             <p:ph idx="2" type="sldImg"/>
@@ -1462,7 +1462,7 @@
       </p:sp>
       <p:sp>
         <p:nvSpPr>
-          <p:cNvPr id="225" name="Google Shape;225;g1113c07b4bc_0_8:notes"/>
+          <p:cNvPr id="226" name="Google Shape;226;g1113c07b4bc_0_8:notes"/>
           <p:cNvSpPr txBox="1"/>
           <p:nvPr>
             <p:ph idx="1" type="body"/>
@@ -1512,7 +1512,7 @@
   <p:cSld>
     <p:spTree>
       <p:nvGrpSpPr>
-        <p:cNvPr id="231" name="Shape 231"/>
+        <p:cNvPr id="232" name="Shape 232"/>
         <p:cNvGrpSpPr/>
         <p:nvPr/>
       </p:nvGrpSpPr>
@@ -1526,7 +1526,7 @@
       </p:grpSpPr>
       <p:sp>
         <p:nvSpPr>
-          <p:cNvPr id="232" name="Google Shape;232;g1113c07b4bc_0_174:notes"/>
+          <p:cNvPr id="233" name="Google Shape;233;g1113c07b4bc_0_174:notes"/>
           <p:cNvSpPr/>
           <p:nvPr>
             <p:ph idx="2" type="sldImg"/>
@@ -1561,7 +1561,7 @@
       </p:sp>
       <p:sp>
         <p:nvSpPr>
-          <p:cNvPr id="233" name="Google Shape;233;g1113c07b4bc_0_174:notes"/>
+          <p:cNvPr id="234" name="Google Shape;234;g1113c07b4bc_0_174:notes"/>
           <p:cNvSpPr txBox="1"/>
           <p:nvPr>
             <p:ph idx="1" type="body"/>
@@ -1611,7 +1611,7 @@
   <p:cSld>
     <p:spTree>
       <p:nvGrpSpPr>
-        <p:cNvPr id="241" name="Shape 241"/>
+        <p:cNvPr id="242" name="Shape 242"/>
         <p:cNvGrpSpPr/>
         <p:nvPr/>
       </p:nvGrpSpPr>
@@ -1625,7 +1625,7 @@
       </p:grpSpPr>
       <p:sp>
         <p:nvSpPr>
-          <p:cNvPr id="242" name="Google Shape;242;g1113c07b4bc_0_184:notes"/>
+          <p:cNvPr id="243" name="Google Shape;243;g1113c07b4bc_0_184:notes"/>
           <p:cNvSpPr/>
           <p:nvPr>
             <p:ph idx="2" type="sldImg"/>
@@ -1660,7 +1660,7 @@
       </p:sp>
       <p:sp>
         <p:nvSpPr>
-          <p:cNvPr id="243" name="Google Shape;243;g1113c07b4bc_0_184:notes"/>
+          <p:cNvPr id="244" name="Google Shape;244;g1113c07b4bc_0_184:notes"/>
           <p:cNvSpPr txBox="1"/>
           <p:nvPr>
             <p:ph idx="1" type="body"/>
@@ -1710,7 +1710,7 @@
   <p:cSld>
     <p:spTree>
       <p:nvGrpSpPr>
-        <p:cNvPr id="251" name="Shape 251"/>
+        <p:cNvPr id="252" name="Shape 252"/>
         <p:cNvGrpSpPr/>
         <p:nvPr/>
       </p:nvGrpSpPr>
@@ -1724,7 +1724,7 @@
       </p:grpSpPr>
       <p:sp>
         <p:nvSpPr>
-          <p:cNvPr id="252" name="Google Shape;252;g1113c07b4bc_0_193:notes"/>
+          <p:cNvPr id="253" name="Google Shape;253;g1113c07b4bc_0_193:notes"/>
           <p:cNvSpPr/>
           <p:nvPr>
             <p:ph idx="2" type="sldImg"/>
@@ -1759,7 +1759,7 @@
       </p:sp>
       <p:sp>
         <p:nvSpPr>
-          <p:cNvPr id="253" name="Google Shape;253;g1113c07b4bc_0_193:notes"/>
+          <p:cNvPr id="254" name="Google Shape;254;g1113c07b4bc_0_193:notes"/>
           <p:cNvSpPr txBox="1"/>
           <p:nvPr>
             <p:ph idx="1" type="body"/>
@@ -1809,7 +1809,7 @@
   <p:cSld>
     <p:spTree>
       <p:nvGrpSpPr>
-        <p:cNvPr id="261" name="Shape 261"/>
+        <p:cNvPr id="262" name="Shape 262"/>
         <p:cNvGrpSpPr/>
         <p:nvPr/>
       </p:nvGrpSpPr>
@@ -1823,7 +1823,7 @@
       </p:grpSpPr>
       <p:sp>
         <p:nvSpPr>
-          <p:cNvPr id="262" name="Google Shape;262;g1113c07b4bc_0_20:notes"/>
+          <p:cNvPr id="263" name="Google Shape;263;g1113c07b4bc_0_20:notes"/>
           <p:cNvSpPr/>
           <p:nvPr>
             <p:ph idx="2" type="sldImg"/>
@@ -1858,7 +1858,7 @@
       </p:sp>
       <p:sp>
         <p:nvSpPr>
-          <p:cNvPr id="263" name="Google Shape;263;g1113c07b4bc_0_20:notes"/>
+          <p:cNvPr id="264" name="Google Shape;264;g1113c07b4bc_0_20:notes"/>
           <p:cNvSpPr txBox="1"/>
           <p:nvPr>
             <p:ph idx="1" type="body"/>
@@ -1908,7 +1908,7 @@
   <p:cSld>
     <p:spTree>
       <p:nvGrpSpPr>
-        <p:cNvPr id="103" name="Shape 103"/>
+        <p:cNvPr id="104" name="Shape 104"/>
         <p:cNvGrpSpPr/>
         <p:nvPr/>
       </p:nvGrpSpPr>
@@ -1922,7 +1922,7 @@
       </p:grpSpPr>
       <p:sp>
         <p:nvSpPr>
-          <p:cNvPr id="104" name="Google Shape;104;gc6f9e470d_0_0:notes"/>
+          <p:cNvPr id="105" name="Google Shape;105;gc6f9e470d_0_0:notes"/>
           <p:cNvSpPr/>
           <p:nvPr>
             <p:ph idx="2" type="sldImg"/>
@@ -1957,7 +1957,7 @@
       </p:sp>
       <p:sp>
         <p:nvSpPr>
-          <p:cNvPr id="105" name="Google Shape;105;gc6f9e470d_0_0:notes"/>
+          <p:cNvPr id="106" name="Google Shape;106;gc6f9e470d_0_0:notes"/>
           <p:cNvSpPr txBox="1"/>
           <p:nvPr>
             <p:ph idx="1" type="body"/>
@@ -2007,7 +2007,7 @@
   <p:cSld>
     <p:spTree>
       <p:nvGrpSpPr>
-        <p:cNvPr id="270" name="Shape 270"/>
+        <p:cNvPr id="271" name="Shape 271"/>
         <p:cNvGrpSpPr/>
         <p:nvPr/>
       </p:nvGrpSpPr>
@@ -2021,7 +2021,7 @@
       </p:grpSpPr>
       <p:sp>
         <p:nvSpPr>
-          <p:cNvPr id="271" name="Google Shape;271;g11c1e67c470_0_9:notes"/>
+          <p:cNvPr id="272" name="Google Shape;272;g11c1e67c470_0_9:notes"/>
           <p:cNvSpPr/>
           <p:nvPr>
             <p:ph idx="2" type="sldImg"/>
@@ -2056,7 +2056,7 @@
       </p:sp>
       <p:sp>
         <p:nvSpPr>
-          <p:cNvPr id="272" name="Google Shape;272;g11c1e67c470_0_9:notes"/>
+          <p:cNvPr id="273" name="Google Shape;273;g11c1e67c470_0_9:notes"/>
           <p:cNvSpPr txBox="1"/>
           <p:nvPr>
             <p:ph idx="1" type="body"/>
@@ -2106,7 +2106,7 @@
   <p:cSld>
     <p:spTree>
       <p:nvGrpSpPr>
-        <p:cNvPr id="279" name="Shape 279"/>
+        <p:cNvPr id="280" name="Shape 280"/>
         <p:cNvGrpSpPr/>
         <p:nvPr/>
       </p:nvGrpSpPr>
@@ -2120,7 +2120,7 @@
       </p:grpSpPr>
       <p:sp>
         <p:nvSpPr>
-          <p:cNvPr id="280" name="Google Shape;280;g1113c07b4bc_0_203:notes"/>
+          <p:cNvPr id="281" name="Google Shape;281;g1113c07b4bc_0_203:notes"/>
           <p:cNvSpPr/>
           <p:nvPr>
             <p:ph idx="2" type="sldImg"/>
@@ -2155,7 +2155,7 @@
       </p:sp>
       <p:sp>
         <p:nvSpPr>
-          <p:cNvPr id="281" name="Google Shape;281;g1113c07b4bc_0_203:notes"/>
+          <p:cNvPr id="282" name="Google Shape;282;g1113c07b4bc_0_203:notes"/>
           <p:cNvSpPr txBox="1"/>
           <p:nvPr>
             <p:ph idx="1" type="body"/>
@@ -2205,7 +2205,7 @@
   <p:cSld>
     <p:spTree>
       <p:nvGrpSpPr>
-        <p:cNvPr id="289" name="Shape 289"/>
+        <p:cNvPr id="290" name="Shape 290"/>
         <p:cNvGrpSpPr/>
         <p:nvPr/>
       </p:nvGrpSpPr>
@@ -2219,7 +2219,7 @@
       </p:grpSpPr>
       <p:sp>
         <p:nvSpPr>
-          <p:cNvPr id="290" name="Google Shape;290;g1113c07b4bc_0_212:notes"/>
+          <p:cNvPr id="291" name="Google Shape;291;g1113c07b4bc_0_212:notes"/>
           <p:cNvSpPr/>
           <p:nvPr>
             <p:ph idx="2" type="sldImg"/>
@@ -2254,7 +2254,7 @@
       </p:sp>
       <p:sp>
         <p:nvSpPr>
-          <p:cNvPr id="291" name="Google Shape;291;g1113c07b4bc_0_212:notes"/>
+          <p:cNvPr id="292" name="Google Shape;292;g1113c07b4bc_0_212:notes"/>
           <p:cNvSpPr txBox="1"/>
           <p:nvPr>
             <p:ph idx="1" type="body"/>
@@ -2304,7 +2304,7 @@
   <p:cSld>
     <p:spTree>
       <p:nvGrpSpPr>
-        <p:cNvPr id="299" name="Shape 299"/>
+        <p:cNvPr id="300" name="Shape 300"/>
         <p:cNvGrpSpPr/>
         <p:nvPr/>
       </p:nvGrpSpPr>
@@ -2318,7 +2318,7 @@
       </p:grpSpPr>
       <p:sp>
         <p:nvSpPr>
-          <p:cNvPr id="300" name="Google Shape;300;g1113c07b4bc_0_220:notes"/>
+          <p:cNvPr id="301" name="Google Shape;301;g1113c07b4bc_0_220:notes"/>
           <p:cNvSpPr/>
           <p:nvPr>
             <p:ph idx="2" type="sldImg"/>
@@ -2353,7 +2353,7 @@
       </p:sp>
       <p:sp>
         <p:nvSpPr>
-          <p:cNvPr id="301" name="Google Shape;301;g1113c07b4bc_0_220:notes"/>
+          <p:cNvPr id="302" name="Google Shape;302;g1113c07b4bc_0_220:notes"/>
           <p:cNvSpPr txBox="1"/>
           <p:nvPr>
             <p:ph idx="1" type="body"/>
@@ -2403,7 +2403,7 @@
   <p:cSld>
     <p:spTree>
       <p:nvGrpSpPr>
-        <p:cNvPr id="310" name="Shape 310"/>
+        <p:cNvPr id="311" name="Shape 311"/>
         <p:cNvGrpSpPr/>
         <p:nvPr/>
       </p:nvGrpSpPr>
@@ -2417,7 +2417,7 @@
       </p:grpSpPr>
       <p:sp>
         <p:nvSpPr>
-          <p:cNvPr id="311" name="Google Shape;311;g1113c07b4bc_0_229:notes"/>
+          <p:cNvPr id="312" name="Google Shape;312;g1113c07b4bc_0_229:notes"/>
           <p:cNvSpPr/>
           <p:nvPr>
             <p:ph idx="2" type="sldImg"/>
@@ -2452,7 +2452,7 @@
       </p:sp>
       <p:sp>
         <p:nvSpPr>
-          <p:cNvPr id="312" name="Google Shape;312;g1113c07b4bc_0_229:notes"/>
+          <p:cNvPr id="313" name="Google Shape;313;g1113c07b4bc_0_229:notes"/>
           <p:cNvSpPr txBox="1"/>
           <p:nvPr>
             <p:ph idx="1" type="body"/>
@@ -2502,7 +2502,7 @@
   <p:cSld>
     <p:spTree>
       <p:nvGrpSpPr>
-        <p:cNvPr id="321" name="Shape 321"/>
+        <p:cNvPr id="322" name="Shape 322"/>
         <p:cNvGrpSpPr/>
         <p:nvPr/>
       </p:nvGrpSpPr>
@@ -2516,7 +2516,7 @@
       </p:grpSpPr>
       <p:sp>
         <p:nvSpPr>
-          <p:cNvPr id="322" name="Google Shape;322;g1113c07b4bc_0_238:notes"/>
+          <p:cNvPr id="323" name="Google Shape;323;g1113c07b4bc_0_238:notes"/>
           <p:cNvSpPr/>
           <p:nvPr>
             <p:ph idx="2" type="sldImg"/>
@@ -2551,7 +2551,7 @@
       </p:sp>
       <p:sp>
         <p:nvSpPr>
-          <p:cNvPr id="323" name="Google Shape;323;g1113c07b4bc_0_238:notes"/>
+          <p:cNvPr id="324" name="Google Shape;324;g1113c07b4bc_0_238:notes"/>
           <p:cNvSpPr txBox="1"/>
           <p:nvPr>
             <p:ph idx="1" type="body"/>
@@ -2601,7 +2601,7 @@
   <p:cSld>
     <p:spTree>
       <p:nvGrpSpPr>
-        <p:cNvPr id="329" name="Shape 329"/>
+        <p:cNvPr id="330" name="Shape 330"/>
         <p:cNvGrpSpPr/>
         <p:nvPr/>
       </p:nvGrpSpPr>
@@ -2615,7 +2615,7 @@
       </p:grpSpPr>
       <p:sp>
         <p:nvSpPr>
-          <p:cNvPr id="330" name="Google Shape;330;g1113c07b4bc_0_244:notes"/>
+          <p:cNvPr id="331" name="Google Shape;331;g1113c07b4bc_0_244:notes"/>
           <p:cNvSpPr/>
           <p:nvPr>
             <p:ph idx="2" type="sldImg"/>
@@ -2650,7 +2650,7 @@
       </p:sp>
       <p:sp>
         <p:nvSpPr>
-          <p:cNvPr id="331" name="Google Shape;331;g1113c07b4bc_0_244:notes"/>
+          <p:cNvPr id="332" name="Google Shape;332;g1113c07b4bc_0_244:notes"/>
           <p:cNvSpPr txBox="1"/>
           <p:nvPr>
             <p:ph idx="1" type="body"/>
@@ -2700,7 +2700,7 @@
   <p:cSld>
     <p:spTree>
       <p:nvGrpSpPr>
-        <p:cNvPr id="339" name="Shape 339"/>
+        <p:cNvPr id="340" name="Shape 340"/>
         <p:cNvGrpSpPr/>
         <p:nvPr/>
       </p:nvGrpSpPr>
@@ -2714,7 +2714,7 @@
       </p:grpSpPr>
       <p:sp>
         <p:nvSpPr>
-          <p:cNvPr id="340" name="Google Shape;340;g1113c07b4bc_0_252:notes"/>
+          <p:cNvPr id="341" name="Google Shape;341;g1113c07b4bc_0_252:notes"/>
           <p:cNvSpPr/>
           <p:nvPr>
             <p:ph idx="2" type="sldImg"/>
@@ -2749,7 +2749,7 @@
       </p:sp>
       <p:sp>
         <p:nvSpPr>
-          <p:cNvPr id="341" name="Google Shape;341;g1113c07b4bc_0_252:notes"/>
+          <p:cNvPr id="342" name="Google Shape;342;g1113c07b4bc_0_252:notes"/>
           <p:cNvSpPr txBox="1"/>
           <p:nvPr>
             <p:ph idx="1" type="body"/>
@@ -2799,7 +2799,7 @@
   <p:cSld>
     <p:spTree>
       <p:nvGrpSpPr>
-        <p:cNvPr id="349" name="Shape 349"/>
+        <p:cNvPr id="350" name="Shape 350"/>
         <p:cNvGrpSpPr/>
         <p:nvPr/>
       </p:nvGrpSpPr>
@@ -2813,7 +2813,7 @@
       </p:grpSpPr>
       <p:sp>
         <p:nvSpPr>
-          <p:cNvPr id="350" name="Google Shape;350;g1113c07b4bc_0_260:notes"/>
+          <p:cNvPr id="351" name="Google Shape;351;g1113c07b4bc_0_260:notes"/>
           <p:cNvSpPr/>
           <p:nvPr>
             <p:ph idx="2" type="sldImg"/>
@@ -2848,7 +2848,7 @@
       </p:sp>
       <p:sp>
         <p:nvSpPr>
-          <p:cNvPr id="351" name="Google Shape;351;g1113c07b4bc_0_260:notes"/>
+          <p:cNvPr id="352" name="Google Shape;352;g1113c07b4bc_0_260:notes"/>
           <p:cNvSpPr txBox="1"/>
           <p:nvPr>
             <p:ph idx="1" type="body"/>
@@ -2898,7 +2898,7 @@
   <p:cSld>
     <p:spTree>
       <p:nvGrpSpPr>
-        <p:cNvPr id="357" name="Shape 357"/>
+        <p:cNvPr id="358" name="Shape 358"/>
         <p:cNvGrpSpPr/>
         <p:nvPr/>
       </p:nvGrpSpPr>
@@ -2912,7 +2912,7 @@
       </p:grpSpPr>
       <p:sp>
         <p:nvSpPr>
-          <p:cNvPr id="358" name="Google Shape;358;g1113c07b4bc_0_272:notes"/>
+          <p:cNvPr id="359" name="Google Shape;359;g1113c07b4bc_0_272:notes"/>
           <p:cNvSpPr/>
           <p:nvPr>
             <p:ph idx="2" type="sldImg"/>
@@ -2947,7 +2947,7 @@
       </p:sp>
       <p:sp>
         <p:nvSpPr>
-          <p:cNvPr id="359" name="Google Shape;359;g1113c07b4bc_0_272:notes"/>
+          <p:cNvPr id="360" name="Google Shape;360;g1113c07b4bc_0_272:notes"/>
           <p:cNvSpPr txBox="1"/>
           <p:nvPr>
             <p:ph idx="1" type="body"/>
@@ -2997,7 +2997,7 @@
   <p:cSld>
     <p:spTree>
       <p:nvGrpSpPr>
-        <p:cNvPr id="110" name="Shape 110"/>
+        <p:cNvPr id="111" name="Shape 111"/>
         <p:cNvGrpSpPr/>
         <p:nvPr/>
       </p:nvGrpSpPr>
@@ -3011,7 +3011,7 @@
       </p:grpSpPr>
       <p:sp>
         <p:nvSpPr>
-          <p:cNvPr id="111" name="Google Shape;111;g1280242e8f4_0_46:notes"/>
+          <p:cNvPr id="112" name="Google Shape;112;g1280242e8f4_0_46:notes"/>
           <p:cNvSpPr/>
           <p:nvPr>
             <p:ph idx="2" type="sldImg"/>
@@ -3046,7 +3046,7 @@
       </p:sp>
       <p:sp>
         <p:nvSpPr>
-          <p:cNvPr id="112" name="Google Shape;112;g1280242e8f4_0_46:notes"/>
+          <p:cNvPr id="113" name="Google Shape;113;g1280242e8f4_0_46:notes"/>
           <p:cNvSpPr txBox="1"/>
           <p:nvPr>
             <p:ph idx="1" type="body"/>
@@ -3096,7 +3096,7 @@
   <p:cSld>
     <p:spTree>
       <p:nvGrpSpPr>
-        <p:cNvPr id="368" name="Shape 368"/>
+        <p:cNvPr id="369" name="Shape 369"/>
         <p:cNvGrpSpPr/>
         <p:nvPr/>
       </p:nvGrpSpPr>
@@ -3110,7 +3110,7 @@
       </p:grpSpPr>
       <p:sp>
         <p:nvSpPr>
-          <p:cNvPr id="369" name="Google Shape;369;g127096e7529_0_0:notes"/>
+          <p:cNvPr id="370" name="Google Shape;370;g127096e7529_0_0:notes"/>
           <p:cNvSpPr/>
           <p:nvPr>
             <p:ph idx="2" type="sldImg"/>
@@ -3145,7 +3145,7 @@
       </p:sp>
       <p:sp>
         <p:nvSpPr>
-          <p:cNvPr id="370" name="Google Shape;370;g127096e7529_0_0:notes"/>
+          <p:cNvPr id="371" name="Google Shape;371;g127096e7529_0_0:notes"/>
           <p:cNvSpPr txBox="1"/>
           <p:nvPr>
             <p:ph idx="1" type="body"/>
@@ -3195,7 +3195,7 @@
   <p:cSld>
     <p:spTree>
       <p:nvGrpSpPr>
-        <p:cNvPr id="385" name="Shape 385"/>
+        <p:cNvPr id="386" name="Shape 386"/>
         <p:cNvGrpSpPr/>
         <p:nvPr/>
       </p:nvGrpSpPr>
@@ -3209,7 +3209,7 @@
       </p:grpSpPr>
       <p:sp>
         <p:nvSpPr>
-          <p:cNvPr id="386" name="Google Shape;386;g110cd4518f6_0_0:notes"/>
+          <p:cNvPr id="387" name="Google Shape;387;g110cd4518f6_0_0:notes"/>
           <p:cNvSpPr/>
           <p:nvPr>
             <p:ph idx="2" type="sldImg"/>
@@ -3244,7 +3244,7 @@
       </p:sp>
       <p:sp>
         <p:nvSpPr>
-          <p:cNvPr id="387" name="Google Shape;387;g110cd4518f6_0_0:notes"/>
+          <p:cNvPr id="388" name="Google Shape;388;g110cd4518f6_0_0:notes"/>
           <p:cNvSpPr txBox="1"/>
           <p:nvPr>
             <p:ph idx="1" type="body"/>
@@ -3294,7 +3294,7 @@
   <p:cSld>
     <p:spTree>
       <p:nvGrpSpPr>
-        <p:cNvPr id="119" name="Shape 119"/>
+        <p:cNvPr id="120" name="Shape 120"/>
         <p:cNvGrpSpPr/>
         <p:nvPr/>
       </p:nvGrpSpPr>
@@ -3308,7 +3308,7 @@
       </p:grpSpPr>
       <p:sp>
         <p:nvSpPr>
-          <p:cNvPr id="120" name="Google Shape;120;g129c2ea34bf_1_111:notes"/>
+          <p:cNvPr id="121" name="Google Shape;121;g129c2ea34bf_1_111:notes"/>
           <p:cNvSpPr/>
           <p:nvPr>
             <p:ph idx="2" type="sldImg"/>
@@ -3343,7 +3343,7 @@
       </p:sp>
       <p:sp>
         <p:nvSpPr>
-          <p:cNvPr id="121" name="Google Shape;121;g129c2ea34bf_1_111:notes"/>
+          <p:cNvPr id="122" name="Google Shape;122;g129c2ea34bf_1_111:notes"/>
           <p:cNvSpPr txBox="1"/>
           <p:nvPr>
             <p:ph idx="1" type="body"/>
@@ -3393,7 +3393,7 @@
   <p:cSld>
     <p:spTree>
       <p:nvGrpSpPr>
-        <p:cNvPr id="127" name="Shape 127"/>
+        <p:cNvPr id="128" name="Shape 128"/>
         <p:cNvGrpSpPr/>
         <p:nvPr/>
       </p:nvGrpSpPr>
@@ -3407,7 +3407,7 @@
       </p:grpSpPr>
       <p:sp>
         <p:nvSpPr>
-          <p:cNvPr id="128" name="Google Shape;128;g11c1e67c470_0_1:notes"/>
+          <p:cNvPr id="129" name="Google Shape;129;g11c1e67c470_0_1:notes"/>
           <p:cNvSpPr/>
           <p:nvPr>
             <p:ph idx="2" type="sldImg"/>
@@ -3442,7 +3442,7 @@
       </p:sp>
       <p:sp>
         <p:nvSpPr>
-          <p:cNvPr id="129" name="Google Shape;129;g11c1e67c470_0_1:notes"/>
+          <p:cNvPr id="130" name="Google Shape;130;g11c1e67c470_0_1:notes"/>
           <p:cNvSpPr txBox="1"/>
           <p:nvPr>
             <p:ph idx="1" type="body"/>
@@ -3492,7 +3492,7 @@
   <p:cSld>
     <p:spTree>
       <p:nvGrpSpPr>
-        <p:cNvPr id="136" name="Shape 136"/>
+        <p:cNvPr id="137" name="Shape 137"/>
         <p:cNvGrpSpPr/>
         <p:nvPr/>
       </p:nvGrpSpPr>
@@ -3506,7 +3506,7 @@
       </p:grpSpPr>
       <p:sp>
         <p:nvSpPr>
-          <p:cNvPr id="137" name="Google Shape;137;g110821d2d52_0_0:notes"/>
+          <p:cNvPr id="138" name="Google Shape;138;g110821d2d52_0_0:notes"/>
           <p:cNvSpPr/>
           <p:nvPr>
             <p:ph idx="2" type="sldImg"/>
@@ -3541,7 +3541,7 @@
       </p:sp>
       <p:sp>
         <p:nvSpPr>
-          <p:cNvPr id="138" name="Google Shape;138;g110821d2d52_0_0:notes"/>
+          <p:cNvPr id="139" name="Google Shape;139;g110821d2d52_0_0:notes"/>
           <p:cNvSpPr txBox="1"/>
           <p:nvPr>
             <p:ph idx="1" type="body"/>
@@ -3591,7 +3591,7 @@
   <p:cSld>
     <p:spTree>
       <p:nvGrpSpPr>
-        <p:cNvPr id="147" name="Shape 147"/>
+        <p:cNvPr id="148" name="Shape 148"/>
         <p:cNvGrpSpPr/>
         <p:nvPr/>
       </p:nvGrpSpPr>
@@ -3605,7 +3605,7 @@
       </p:grpSpPr>
       <p:sp>
         <p:nvSpPr>
-          <p:cNvPr id="148" name="Google Shape;148;g1113c07b4bc_0_2:notes"/>
+          <p:cNvPr id="149" name="Google Shape;149;g1113c07b4bc_0_2:notes"/>
           <p:cNvSpPr/>
           <p:nvPr>
             <p:ph idx="2" type="sldImg"/>
@@ -3640,7 +3640,7 @@
       </p:sp>
       <p:sp>
         <p:nvSpPr>
-          <p:cNvPr id="149" name="Google Shape;149;g1113c07b4bc_0_2:notes"/>
+          <p:cNvPr id="150" name="Google Shape;150;g1113c07b4bc_0_2:notes"/>
           <p:cNvSpPr txBox="1"/>
           <p:nvPr>
             <p:ph idx="1" type="body"/>
@@ -3690,7 +3690,7 @@
   <p:cSld>
     <p:spTree>
       <p:nvGrpSpPr>
-        <p:cNvPr id="155" name="Shape 155"/>
+        <p:cNvPr id="156" name="Shape 156"/>
         <p:cNvGrpSpPr/>
         <p:nvPr/>
       </p:nvGrpSpPr>
@@ -3704,7 +3704,7 @@
       </p:grpSpPr>
       <p:sp>
         <p:nvSpPr>
-          <p:cNvPr id="156" name="Google Shape;156;g1113c07b4bc_0_112:notes"/>
+          <p:cNvPr id="157" name="Google Shape;157;g1113c07b4bc_0_112:notes"/>
           <p:cNvSpPr/>
           <p:nvPr>
             <p:ph idx="2" type="sldImg"/>
@@ -3739,7 +3739,7 @@
       </p:sp>
       <p:sp>
         <p:nvSpPr>
-          <p:cNvPr id="157" name="Google Shape;157;g1113c07b4bc_0_112:notes"/>
+          <p:cNvPr id="158" name="Google Shape;158;g1113c07b4bc_0_112:notes"/>
           <p:cNvSpPr txBox="1"/>
           <p:nvPr>
             <p:ph idx="1" type="body"/>
@@ -3789,7 +3789,7 @@
   <p:cSld>
     <p:spTree>
       <p:nvGrpSpPr>
-        <p:cNvPr id="165" name="Shape 165"/>
+        <p:cNvPr id="166" name="Shape 166"/>
         <p:cNvGrpSpPr/>
         <p:nvPr/>
       </p:nvGrpSpPr>
@@ -3803,7 +3803,7 @@
       </p:grpSpPr>
       <p:sp>
         <p:nvSpPr>
-          <p:cNvPr id="166" name="Google Shape;166;g1113c07b4bc_0_127:notes"/>
+          <p:cNvPr id="167" name="Google Shape;167;g1113c07b4bc_0_127:notes"/>
           <p:cNvSpPr/>
           <p:nvPr>
             <p:ph idx="2" type="sldImg"/>
@@ -3838,7 +3838,7 @@
       </p:sp>
       <p:sp>
         <p:nvSpPr>
-          <p:cNvPr id="167" name="Google Shape;167;g1113c07b4bc_0_127:notes"/>
+          <p:cNvPr id="168" name="Google Shape;168;g1113c07b4bc_0_127:notes"/>
           <p:cNvSpPr txBox="1"/>
           <p:nvPr>
             <p:ph idx="1" type="body"/>
@@ -13597,6 +13597,34 @@
           </a:p>
         </p:txBody>
       </p:sp>
+      <p:pic>
+        <p:nvPicPr>
+          <p:cNvPr id="103" name="Google Shape;103;p25"/>
+          <p:cNvPicPr preferRelativeResize="0"/>
+          <p:nvPr/>
+        </p:nvPicPr>
+        <p:blipFill>
+          <a:blip r:embed="rId5">
+            <a:alphaModFix/>
+          </a:blip>
+          <a:stretch>
+            <a:fillRect/>
+          </a:stretch>
+        </p:blipFill>
+        <p:spPr>
+          <a:xfrm>
+            <a:off x="7959900" y="3603500"/>
+            <a:ext cx="872400" cy="872400"/>
+          </a:xfrm>
+          <a:prstGeom prst="rect">
+            <a:avLst/>
+          </a:prstGeom>
+          <a:noFill/>
+          <a:ln>
+            <a:noFill/>
+          </a:ln>
+        </p:spPr>
+      </p:pic>
     </p:spTree>
   </p:cSld>
   <p:clrMapOvr>
@@ -13610,7 +13638,7 @@
   <p:cSld>
     <p:spTree>
       <p:nvGrpSpPr>
-        <p:cNvPr id="178" name="Shape 178"/>
+        <p:cNvPr id="179" name="Shape 179"/>
         <p:cNvGrpSpPr/>
         <p:nvPr/>
       </p:nvGrpSpPr>
@@ -13624,7 +13652,7 @@
       </p:grpSpPr>
       <p:pic>
         <p:nvPicPr>
-          <p:cNvPr id="179" name="Google Shape;179;p34"/>
+          <p:cNvPr id="180" name="Google Shape;180;p34"/>
           <p:cNvPicPr preferRelativeResize="0"/>
           <p:nvPr/>
         </p:nvPicPr>
@@ -13651,7 +13679,7 @@
       </p:pic>
       <p:sp>
         <p:nvSpPr>
-          <p:cNvPr id="180" name="Google Shape;180;p34"/>
+          <p:cNvPr id="181" name="Google Shape;181;p34"/>
           <p:cNvSpPr txBox="1"/>
           <p:nvPr>
             <p:ph type="title"/>
@@ -13699,14 +13727,14 @@
       </p:sp>
       <p:sp>
         <p:nvSpPr>
-          <p:cNvPr id="181" name="Google Shape;181;p34"/>
+          <p:cNvPr id="182" name="Google Shape;182;p34"/>
           <p:cNvSpPr txBox="1"/>
           <p:nvPr/>
         </p:nvSpPr>
         <p:spPr>
           <a:xfrm>
-            <a:off x="311700" y="717650"/>
-            <a:ext cx="8697300" cy="4112700"/>
+            <a:off x="311700" y="597600"/>
+            <a:ext cx="8697300" cy="3867300"/>
           </a:xfrm>
           <a:prstGeom prst="rect">
             <a:avLst/>
@@ -13722,7 +13750,7 @@
           </a:bodyPr>
           <a:lstStyle/>
           <a:p>
-            <a:pPr indent="-330200" lvl="0" marL="457200" rtl="0" algn="l">
+            <a:pPr indent="-323850" lvl="0" marL="457200" rtl="0" algn="l">
               <a:lnSpc>
                 <a:spcPct val="115000"/>
               </a:lnSpc>
@@ -13732,17 +13760,17 @@
               <a:spcAft>
                 <a:spcPts val="0"/>
               </a:spcAft>
-              <a:buSzPts val="1600"/>
+              <a:buSzPts val="1500"/>
               <a:buChar char="●"/>
             </a:pPr>
             <a:r>
-              <a:rPr lang="en" sz="1600"/>
+              <a:rPr lang="en" sz="1500"/>
               <a:t>Supervised learning. </a:t>
             </a:r>
-            <a:endParaRPr sz="1600"/>
-          </a:p>
-          <a:p>
-            <a:pPr indent="-330200" lvl="0" marL="457200" rtl="0" algn="l">
+            <a:endParaRPr sz="1500"/>
+          </a:p>
+          <a:p>
+            <a:pPr indent="-323850" lvl="0" marL="457200" rtl="0" algn="l">
               <a:lnSpc>
                 <a:spcPct val="115000"/>
               </a:lnSpc>
@@ -13752,17 +13780,17 @@
               <a:spcAft>
                 <a:spcPts val="0"/>
               </a:spcAft>
-              <a:buSzPts val="1600"/>
+              <a:buSzPts val="1500"/>
               <a:buChar char="●"/>
             </a:pPr>
             <a:r>
-              <a:rPr lang="en" sz="1600"/>
+              <a:rPr lang="en" sz="1500"/>
               <a:t>The output of a classification model is normally a label or a category to which the input data point may belong.  It Involves a training set of data in which we have the data points labeled with their correct classes/categories.</a:t>
             </a:r>
-            <a:endParaRPr sz="1600"/>
-          </a:p>
-          <a:p>
-            <a:pPr indent="-330200" lvl="0" marL="457200" rtl="0" algn="l">
+            <a:endParaRPr sz="1500"/>
+          </a:p>
+          <a:p>
+            <a:pPr indent="-323850" lvl="0" marL="457200" rtl="0" algn="l">
               <a:lnSpc>
                 <a:spcPct val="115000"/>
               </a:lnSpc>
@@ -13772,17 +13800,17 @@
               <a:spcAft>
                 <a:spcPts val="0"/>
               </a:spcAft>
-              <a:buSzPts val="1600"/>
+              <a:buSzPts val="1500"/>
               <a:buChar char="●"/>
             </a:pPr>
             <a:r>
-              <a:rPr lang="en" sz="1600"/>
+              <a:rPr lang="en" sz="1500"/>
               <a:t>Typical classification models:</a:t>
             </a:r>
-            <a:endParaRPr sz="1600"/>
-          </a:p>
-          <a:p>
-            <a:pPr indent="-330200" lvl="1" marL="914400" rtl="0" algn="l">
+            <a:endParaRPr sz="1500"/>
+          </a:p>
+          <a:p>
+            <a:pPr indent="-323850" lvl="1" marL="914400" rtl="0" algn="l">
               <a:lnSpc>
                 <a:spcPct val="115000"/>
               </a:lnSpc>
@@ -13792,17 +13820,17 @@
               <a:spcAft>
                 <a:spcPts val="0"/>
               </a:spcAft>
-              <a:buSzPts val="1600"/>
+              <a:buSzPts val="1500"/>
               <a:buChar char="○"/>
             </a:pPr>
             <a:r>
-              <a:rPr lang="en" sz="1600"/>
+              <a:rPr lang="en" sz="1500"/>
               <a:t>Linear models (logistic regression, Naive Bayes, Support Vector Machine)</a:t>
             </a:r>
-            <a:endParaRPr sz="1600"/>
-          </a:p>
-          <a:p>
-            <a:pPr indent="-330200" lvl="1" marL="914400" rtl="0" algn="l">
+            <a:endParaRPr sz="1500"/>
+          </a:p>
+          <a:p>
+            <a:pPr indent="-323850" lvl="1" marL="914400" rtl="0" algn="l">
               <a:lnSpc>
                 <a:spcPct val="115000"/>
               </a:lnSpc>
@@ -13812,17 +13840,17 @@
               <a:spcAft>
                 <a:spcPts val="0"/>
               </a:spcAft>
-              <a:buSzPts val="1600"/>
+              <a:buSzPts val="1500"/>
               <a:buChar char="○"/>
             </a:pPr>
             <a:r>
-              <a:rPr lang="en" sz="1600"/>
+              <a:rPr lang="en" sz="1500"/>
               <a:t>Non-parametric models (K-nearest neighbors)</a:t>
             </a:r>
-            <a:endParaRPr sz="1600"/>
-          </a:p>
-          <a:p>
-            <a:pPr indent="-330200" lvl="1" marL="914400" rtl="0" algn="l">
+            <a:endParaRPr sz="1500"/>
+          </a:p>
+          <a:p>
+            <a:pPr indent="-323850" lvl="1" marL="914400" rtl="0" algn="l">
               <a:lnSpc>
                 <a:spcPct val="115000"/>
               </a:lnSpc>
@@ -13832,17 +13860,17 @@
               <a:spcAft>
                 <a:spcPts val="0"/>
               </a:spcAft>
-              <a:buSzPts val="1600"/>
+              <a:buSzPts val="1500"/>
               <a:buChar char="○"/>
             </a:pPr>
             <a:r>
-              <a:rPr lang="en" sz="1600"/>
+              <a:rPr lang="en" sz="1500"/>
               <a:t>Tree based methods (decision trees)</a:t>
             </a:r>
-            <a:endParaRPr sz="1600"/>
-          </a:p>
-          <a:p>
-            <a:pPr indent="-330200" lvl="1" marL="914400" rtl="0" algn="l">
+            <a:endParaRPr sz="1500"/>
+          </a:p>
+          <a:p>
+            <a:pPr indent="-323850" lvl="1" marL="914400" rtl="0" algn="l">
               <a:lnSpc>
                 <a:spcPct val="115000"/>
               </a:lnSpc>
@@ -13852,17 +13880,17 @@
               <a:spcAft>
                 <a:spcPts val="0"/>
               </a:spcAft>
-              <a:buSzPts val="1600"/>
+              <a:buSzPts val="1500"/>
               <a:buChar char="○"/>
             </a:pPr>
             <a:r>
-              <a:rPr lang="en" sz="1600"/>
+              <a:rPr lang="en" sz="1500"/>
               <a:t>Ensemble methods (random forests)</a:t>
             </a:r>
-            <a:endParaRPr sz="1600"/>
-          </a:p>
-          <a:p>
-            <a:pPr indent="-330200" lvl="1" marL="914400" rtl="0" algn="l">
+            <a:endParaRPr sz="1500"/>
+          </a:p>
+          <a:p>
+            <a:pPr indent="-323850" lvl="1" marL="914400" rtl="0" algn="l">
               <a:lnSpc>
                 <a:spcPct val="115000"/>
               </a:lnSpc>
@@ -13872,17 +13900,17 @@
               <a:spcAft>
                 <a:spcPts val="0"/>
               </a:spcAft>
-              <a:buSzPts val="1600"/>
+              <a:buSzPts val="1500"/>
               <a:buChar char="○"/>
             </a:pPr>
             <a:r>
-              <a:rPr lang="en" sz="1600"/>
+              <a:rPr lang="en" sz="1500"/>
               <a:t>Neural networks (MLPs)</a:t>
             </a:r>
-            <a:endParaRPr sz="1600"/>
-          </a:p>
-          <a:p>
-            <a:pPr indent="-330200" lvl="0" marL="457200" rtl="0" algn="l">
+            <a:endParaRPr sz="1500"/>
+          </a:p>
+          <a:p>
+            <a:pPr indent="-323850" lvl="0" marL="457200" rtl="0" algn="l">
               <a:lnSpc>
                 <a:spcPct val="115000"/>
               </a:lnSpc>
@@ -13892,17 +13920,17 @@
               <a:spcAft>
                 <a:spcPts val="0"/>
               </a:spcAft>
-              <a:buSzPts val="1600"/>
+              <a:buSzPts val="1500"/>
               <a:buChar char="●"/>
             </a:pPr>
             <a:r>
-              <a:rPr lang="en" sz="1600"/>
+              <a:rPr lang="en" sz="1500"/>
               <a:t>Classification objectives:</a:t>
             </a:r>
-            <a:endParaRPr sz="1600"/>
-          </a:p>
-          <a:p>
-            <a:pPr indent="-330200" lvl="1" marL="914400" rtl="0" algn="l">
+            <a:endParaRPr sz="1500"/>
+          </a:p>
+          <a:p>
+            <a:pPr indent="-323850" lvl="1" marL="914400" rtl="0" algn="l">
               <a:lnSpc>
                 <a:spcPct val="115000"/>
               </a:lnSpc>
@@ -13912,17 +13940,17 @@
               <a:spcAft>
                 <a:spcPts val="0"/>
               </a:spcAft>
-              <a:buSzPts val="1600"/>
+              <a:buSzPts val="1500"/>
               <a:buChar char="○"/>
             </a:pPr>
             <a:r>
-              <a:rPr lang="en" sz="1600"/>
+              <a:rPr lang="en" sz="1500"/>
               <a:t>Binary classification</a:t>
             </a:r>
-            <a:endParaRPr sz="1600"/>
-          </a:p>
-          <a:p>
-            <a:pPr indent="-330200" lvl="1" marL="914400" rtl="0" algn="l">
+            <a:endParaRPr sz="1500"/>
+          </a:p>
+          <a:p>
+            <a:pPr indent="-323850" lvl="1" marL="914400" rtl="0" algn="l">
               <a:lnSpc>
                 <a:spcPct val="115000"/>
               </a:lnSpc>
@@ -13932,17 +13960,17 @@
               <a:spcAft>
                 <a:spcPts val="0"/>
               </a:spcAft>
-              <a:buSzPts val="1600"/>
+              <a:buSzPts val="1500"/>
               <a:buChar char="○"/>
             </a:pPr>
             <a:r>
-              <a:rPr lang="en" sz="1600"/>
+              <a:rPr lang="en" sz="1500"/>
               <a:t>Multi-Class classification</a:t>
             </a:r>
-            <a:endParaRPr sz="1600"/>
-          </a:p>
-          <a:p>
-            <a:pPr indent="-330200" lvl="1" marL="914400" rtl="0" algn="l">
+            <a:endParaRPr sz="1500"/>
+          </a:p>
+          <a:p>
+            <a:pPr indent="-323850" lvl="1" marL="914400" rtl="0" algn="l">
               <a:lnSpc>
                 <a:spcPct val="115000"/>
               </a:lnSpc>
@@ -13952,20 +13980,20 @@
               <a:spcAft>
                 <a:spcPts val="0"/>
               </a:spcAft>
-              <a:buSzPts val="1600"/>
+              <a:buSzPts val="1500"/>
               <a:buChar char="○"/>
             </a:pPr>
             <a:r>
-              <a:rPr lang="en" sz="1600"/>
+              <a:rPr lang="en" sz="1500"/>
               <a:t>Multi-Label classification</a:t>
             </a:r>
-            <a:endParaRPr sz="1600"/>
+            <a:endParaRPr sz="1500"/>
           </a:p>
         </p:txBody>
       </p:sp>
       <p:sp>
         <p:nvSpPr>
-          <p:cNvPr id="182" name="Google Shape;182;p34"/>
+          <p:cNvPr id="183" name="Google Shape;183;p34"/>
           <p:cNvSpPr txBox="1"/>
           <p:nvPr>
             <p:ph idx="12" type="sldNum"/>
@@ -14032,7 +14060,7 @@
   <p:cSld>
     <p:spTree>
       <p:nvGrpSpPr>
-        <p:cNvPr id="186" name="Shape 186"/>
+        <p:cNvPr id="187" name="Shape 187"/>
         <p:cNvGrpSpPr/>
         <p:nvPr/>
       </p:nvGrpSpPr>
@@ -14046,7 +14074,7 @@
       </p:grpSpPr>
       <p:pic>
         <p:nvPicPr>
-          <p:cNvPr id="187" name="Google Shape;187;p35"/>
+          <p:cNvPr id="188" name="Google Shape;188;p35"/>
           <p:cNvPicPr preferRelativeResize="0"/>
           <p:nvPr/>
         </p:nvPicPr>
@@ -14073,7 +14101,7 @@
       </p:pic>
       <p:sp>
         <p:nvSpPr>
-          <p:cNvPr id="188" name="Google Shape;188;p35"/>
+          <p:cNvPr id="189" name="Google Shape;189;p35"/>
           <p:cNvSpPr txBox="1"/>
           <p:nvPr>
             <p:ph type="title"/>
@@ -14129,7 +14157,7 @@
       </p:sp>
       <p:sp>
         <p:nvSpPr>
-          <p:cNvPr id="189" name="Google Shape;189;p35"/>
+          <p:cNvPr id="190" name="Google Shape;190;p35"/>
           <p:cNvSpPr txBox="1"/>
           <p:nvPr/>
         </p:nvSpPr>
@@ -14279,7 +14307,7 @@
             </a:pPr>
             <a:r>
               <a:rPr lang="en" sz="1600"/>
-              <a:t>Binary(0/1, pass/fail)</a:t>
+              <a:t>Binary (0/1, pass/fail)</a:t>
             </a:r>
             <a:endParaRPr sz="1600"/>
           </a:p>
@@ -14299,7 +14327,7 @@
             </a:pPr>
             <a:r>
               <a:rPr lang="en" sz="1600"/>
-              <a:t>Multi(cats, dogs, lions)</a:t>
+              <a:t>Multi (cats, dogs, lions)</a:t>
             </a:r>
             <a:endParaRPr sz="1600"/>
           </a:p>
@@ -14319,7 +14347,7 @@
             </a:pPr>
             <a:r>
               <a:rPr lang="en" sz="1600"/>
-              <a:t>Ordinal(low, medium, high)</a:t>
+              <a:t>Ordinal (low, medium, high)</a:t>
             </a:r>
             <a:endParaRPr sz="1600"/>
           </a:p>
@@ -14327,7 +14355,7 @@
       </p:sp>
       <p:sp>
         <p:nvSpPr>
-          <p:cNvPr id="190" name="Google Shape;190;p35"/>
+          <p:cNvPr id="191" name="Google Shape;191;p35"/>
           <p:cNvSpPr txBox="1"/>
           <p:nvPr>
             <p:ph idx="12" type="sldNum"/>
@@ -14383,7 +14411,7 @@
       </p:sp>
       <p:sp>
         <p:nvSpPr>
-          <p:cNvPr id="191" name="Google Shape;191;p35"/>
+          <p:cNvPr id="192" name="Google Shape;192;p35"/>
           <p:cNvSpPr txBox="1"/>
           <p:nvPr/>
         </p:nvSpPr>
@@ -14435,7 +14463,7 @@
       </p:sp>
       <p:pic>
         <p:nvPicPr>
-          <p:cNvPr id="192" name="Google Shape;192;p35"/>
+          <p:cNvPr id="193" name="Google Shape;193;p35"/>
           <p:cNvPicPr preferRelativeResize="0"/>
           <p:nvPr/>
         </p:nvPicPr>
@@ -14474,7 +14502,7 @@
   <p:cSld>
     <p:spTree>
       <p:nvGrpSpPr>
-        <p:cNvPr id="196" name="Shape 196"/>
+        <p:cNvPr id="197" name="Shape 197"/>
         <p:cNvGrpSpPr/>
         <p:nvPr/>
       </p:nvGrpSpPr>
@@ -14488,7 +14516,7 @@
       </p:grpSpPr>
       <p:pic>
         <p:nvPicPr>
-          <p:cNvPr id="197" name="Google Shape;197;p36"/>
+          <p:cNvPr id="198" name="Google Shape;198;p36"/>
           <p:cNvPicPr preferRelativeResize="0"/>
           <p:nvPr/>
         </p:nvPicPr>
@@ -14515,7 +14543,7 @@
       </p:pic>
       <p:sp>
         <p:nvSpPr>
-          <p:cNvPr id="198" name="Google Shape;198;p36"/>
+          <p:cNvPr id="199" name="Google Shape;199;p36"/>
           <p:cNvSpPr txBox="1"/>
           <p:nvPr>
             <p:ph type="title"/>
@@ -14563,7 +14591,7 @@
       </p:sp>
       <p:sp>
         <p:nvSpPr>
-          <p:cNvPr id="199" name="Google Shape;199;p36"/>
+          <p:cNvPr id="200" name="Google Shape;200;p36"/>
           <p:cNvSpPr txBox="1"/>
           <p:nvPr/>
         </p:nvSpPr>
@@ -14709,7 +14737,7 @@
       </p:sp>
       <p:sp>
         <p:nvSpPr>
-          <p:cNvPr id="200" name="Google Shape;200;p36"/>
+          <p:cNvPr id="201" name="Google Shape;201;p36"/>
           <p:cNvSpPr txBox="1"/>
           <p:nvPr>
             <p:ph idx="12" type="sldNum"/>
@@ -14765,7 +14793,7 @@
       </p:sp>
       <p:sp>
         <p:nvSpPr>
-          <p:cNvPr id="201" name="Google Shape;201;p36"/>
+          <p:cNvPr id="202" name="Google Shape;202;p36"/>
           <p:cNvSpPr txBox="1"/>
           <p:nvPr/>
         </p:nvSpPr>
@@ -14817,7 +14845,7 @@
       </p:sp>
       <p:pic>
         <p:nvPicPr>
-          <p:cNvPr id="202" name="Google Shape;202;p36"/>
+          <p:cNvPr id="203" name="Google Shape;203;p36"/>
           <p:cNvPicPr preferRelativeResize="0"/>
           <p:nvPr/>
         </p:nvPicPr>
@@ -14856,7 +14884,7 @@
   <p:cSld>
     <p:spTree>
       <p:nvGrpSpPr>
-        <p:cNvPr id="206" name="Shape 206"/>
+        <p:cNvPr id="207" name="Shape 207"/>
         <p:cNvGrpSpPr/>
         <p:nvPr/>
       </p:nvGrpSpPr>
@@ -14870,7 +14898,7 @@
       </p:grpSpPr>
       <p:pic>
         <p:nvPicPr>
-          <p:cNvPr id="207" name="Google Shape;207;p37"/>
+          <p:cNvPr id="208" name="Google Shape;208;p37"/>
           <p:cNvPicPr preferRelativeResize="0"/>
           <p:nvPr/>
         </p:nvPicPr>
@@ -14897,7 +14925,7 @@
       </p:pic>
       <p:sp>
         <p:nvSpPr>
-          <p:cNvPr id="208" name="Google Shape;208;p37"/>
+          <p:cNvPr id="209" name="Google Shape;209;p37"/>
           <p:cNvSpPr txBox="1"/>
           <p:nvPr>
             <p:ph type="title"/>
@@ -14945,13 +14973,13 @@
       </p:sp>
       <p:sp>
         <p:nvSpPr>
-          <p:cNvPr id="209" name="Google Shape;209;p37"/>
+          <p:cNvPr id="210" name="Google Shape;210;p37"/>
           <p:cNvSpPr txBox="1"/>
           <p:nvPr/>
         </p:nvSpPr>
         <p:spPr>
           <a:xfrm>
-            <a:off x="3931225" y="538500"/>
+            <a:off x="3944875" y="427975"/>
             <a:ext cx="5077800" cy="4112700"/>
           </a:xfrm>
           <a:prstGeom prst="rect">
@@ -15079,7 +15107,7 @@
       </p:sp>
       <p:sp>
         <p:nvSpPr>
-          <p:cNvPr id="210" name="Google Shape;210;p37"/>
+          <p:cNvPr id="211" name="Google Shape;211;p37"/>
           <p:cNvSpPr txBox="1"/>
           <p:nvPr>
             <p:ph idx="12" type="sldNum"/>
@@ -15135,7 +15163,7 @@
       </p:sp>
       <p:sp>
         <p:nvSpPr>
-          <p:cNvPr id="211" name="Google Shape;211;p37"/>
+          <p:cNvPr id="212" name="Google Shape;212;p37"/>
           <p:cNvSpPr txBox="1"/>
           <p:nvPr/>
         </p:nvSpPr>
@@ -15187,7 +15215,7 @@
       </p:sp>
       <p:pic>
         <p:nvPicPr>
-          <p:cNvPr id="212" name="Google Shape;212;p37"/>
+          <p:cNvPr id="213" name="Google Shape;213;p37"/>
           <p:cNvPicPr preferRelativeResize="0"/>
           <p:nvPr/>
         </p:nvPicPr>
@@ -15226,7 +15254,7 @@
   <p:cSld>
     <p:spTree>
       <p:nvGrpSpPr>
-        <p:cNvPr id="216" name="Shape 216"/>
+        <p:cNvPr id="217" name="Shape 217"/>
         <p:cNvGrpSpPr/>
         <p:nvPr/>
       </p:nvGrpSpPr>
@@ -15240,7 +15268,7 @@
       </p:grpSpPr>
       <p:pic>
         <p:nvPicPr>
-          <p:cNvPr id="217" name="Google Shape;217;p38"/>
+          <p:cNvPr id="218" name="Google Shape;218;p38"/>
           <p:cNvPicPr preferRelativeResize="0"/>
           <p:nvPr/>
         </p:nvPicPr>
@@ -15267,7 +15295,7 @@
       </p:pic>
       <p:sp>
         <p:nvSpPr>
-          <p:cNvPr id="218" name="Google Shape;218;p38"/>
+          <p:cNvPr id="219" name="Google Shape;219;p38"/>
           <p:cNvSpPr txBox="1"/>
           <p:nvPr>
             <p:ph type="title"/>
@@ -15315,7 +15343,7 @@
       </p:sp>
       <p:sp>
         <p:nvSpPr>
-          <p:cNvPr id="219" name="Google Shape;219;p38"/>
+          <p:cNvPr id="220" name="Google Shape;220;p38"/>
           <p:cNvSpPr txBox="1"/>
           <p:nvPr/>
         </p:nvSpPr>
@@ -15417,7 +15445,7 @@
             </a:pPr>
             <a:r>
               <a:rPr lang="en" sz="1600"/>
-              <a:t>We can prevent Overfitting in the model by creating random subsets of the dataset.</a:t>
+              <a:t>We can prevent overfitting in the model by creating random subsets of the dataset.</a:t>
             </a:r>
             <a:endParaRPr sz="1600"/>
           </a:p>
@@ -15425,7 +15453,7 @@
       </p:sp>
       <p:sp>
         <p:nvSpPr>
-          <p:cNvPr id="220" name="Google Shape;220;p38"/>
+          <p:cNvPr id="221" name="Google Shape;221;p38"/>
           <p:cNvSpPr txBox="1"/>
           <p:nvPr>
             <p:ph idx="12" type="sldNum"/>
@@ -15481,7 +15509,7 @@
       </p:sp>
       <p:sp>
         <p:nvSpPr>
-          <p:cNvPr id="221" name="Google Shape;221;p38"/>
+          <p:cNvPr id="222" name="Google Shape;222;p38"/>
           <p:cNvSpPr txBox="1"/>
           <p:nvPr/>
         </p:nvSpPr>
@@ -15533,7 +15561,7 @@
       </p:sp>
       <p:pic>
         <p:nvPicPr>
-          <p:cNvPr id="222" name="Google Shape;222;p38"/>
+          <p:cNvPr id="223" name="Google Shape;223;p38"/>
           <p:cNvPicPr preferRelativeResize="0"/>
           <p:nvPr/>
         </p:nvPicPr>
@@ -15572,7 +15600,7 @@
   <p:cSld>
     <p:spTree>
       <p:nvGrpSpPr>
-        <p:cNvPr id="226" name="Shape 226"/>
+        <p:cNvPr id="227" name="Shape 227"/>
         <p:cNvGrpSpPr/>
         <p:nvPr/>
       </p:nvGrpSpPr>
@@ -15586,7 +15614,7 @@
       </p:grpSpPr>
       <p:pic>
         <p:nvPicPr>
-          <p:cNvPr id="227" name="Google Shape;227;p39"/>
+          <p:cNvPr id="228" name="Google Shape;228;p39"/>
           <p:cNvPicPr preferRelativeResize="0"/>
           <p:nvPr/>
         </p:nvPicPr>
@@ -15613,7 +15641,7 @@
       </p:pic>
       <p:sp>
         <p:nvSpPr>
-          <p:cNvPr id="228" name="Google Shape;228;p39"/>
+          <p:cNvPr id="229" name="Google Shape;229;p39"/>
           <p:cNvSpPr txBox="1"/>
           <p:nvPr>
             <p:ph type="title"/>
@@ -15669,14 +15697,14 @@
       </p:sp>
       <p:sp>
         <p:nvSpPr>
-          <p:cNvPr id="229" name="Google Shape;229;p39"/>
+          <p:cNvPr id="230" name="Google Shape;230;p39"/>
           <p:cNvSpPr txBox="1"/>
           <p:nvPr/>
         </p:nvSpPr>
         <p:spPr>
           <a:xfrm>
             <a:off x="311700" y="717650"/>
-            <a:ext cx="8697300" cy="2413500"/>
+            <a:ext cx="8697300" cy="2552700"/>
           </a:xfrm>
           <a:prstGeom prst="rect">
             <a:avLst/>
@@ -15692,7 +15720,7 @@
           </a:bodyPr>
           <a:lstStyle/>
           <a:p>
-            <a:pPr indent="-330200" lvl="0" marL="457200" rtl="0" algn="l">
+            <a:pPr indent="-336550" lvl="0" marL="457200" rtl="0" algn="l">
               <a:lnSpc>
                 <a:spcPct val="115000"/>
               </a:lnSpc>
@@ -15702,21 +15730,21 @@
               <a:spcAft>
                 <a:spcPts val="0"/>
               </a:spcAft>
-              <a:buSzPts val="1600"/>
+              <a:buSzPts val="1700"/>
               <a:buChar char="●"/>
             </a:pPr>
             <a:r>
-              <a:rPr lang="en" sz="1600"/>
+              <a:rPr lang="en" sz="1700"/>
               <a:t>Uns</a:t>
             </a:r>
             <a:r>
-              <a:rPr lang="en" sz="1600"/>
+              <a:rPr lang="en" sz="1700"/>
               <a:t>upervised learning. </a:t>
             </a:r>
-            <a:endParaRPr sz="1600"/>
-          </a:p>
-          <a:p>
-            <a:pPr indent="-330200" lvl="0" marL="457200" rtl="0" algn="l">
+            <a:endParaRPr sz="1700"/>
+          </a:p>
+          <a:p>
+            <a:pPr indent="-336550" lvl="0" marL="457200" rtl="0" algn="l">
               <a:lnSpc>
                 <a:spcPct val="115000"/>
               </a:lnSpc>
@@ -15726,17 +15754,17 @@
               <a:spcAft>
                 <a:spcPts val="0"/>
               </a:spcAft>
-              <a:buSzPts val="1600"/>
+              <a:buSzPts val="1700"/>
               <a:buChar char="●"/>
             </a:pPr>
             <a:r>
-              <a:rPr lang="en" sz="1600"/>
+              <a:rPr lang="en" sz="1700"/>
               <a:t>A process of grouping similar data points together that do not have any pre-labeled classes or categories. The output is segregated group of data points. We don’t have pre-labeled data to train and build our model.</a:t>
             </a:r>
-            <a:endParaRPr sz="1600"/>
-          </a:p>
-          <a:p>
-            <a:pPr indent="-330200" lvl="0" marL="457200" rtl="0" algn="l">
+            <a:endParaRPr sz="1700"/>
+          </a:p>
+          <a:p>
+            <a:pPr indent="-336550" lvl="0" marL="457200" rtl="0" algn="l">
               <a:lnSpc>
                 <a:spcPct val="115000"/>
               </a:lnSpc>
@@ -15746,17 +15774,17 @@
               <a:spcAft>
                 <a:spcPts val="0"/>
               </a:spcAft>
-              <a:buSzPts val="1600"/>
+              <a:buSzPts val="1700"/>
               <a:buChar char="●"/>
             </a:pPr>
             <a:r>
-              <a:rPr lang="en" sz="1600"/>
+              <a:rPr lang="en" sz="1700"/>
               <a:t>Types of clustering algorithms:</a:t>
             </a:r>
-            <a:endParaRPr sz="1600"/>
-          </a:p>
-          <a:p>
-            <a:pPr indent="-330200" lvl="1" marL="914400" rtl="0" algn="l">
+            <a:endParaRPr sz="1700"/>
+          </a:p>
+          <a:p>
+            <a:pPr indent="-336550" lvl="1" marL="914400" rtl="0" algn="l">
               <a:lnSpc>
                 <a:spcPct val="115000"/>
               </a:lnSpc>
@@ -15766,17 +15794,17 @@
               <a:spcAft>
                 <a:spcPts val="0"/>
               </a:spcAft>
-              <a:buSzPts val="1600"/>
+              <a:buSzPts val="1700"/>
               <a:buChar char="○"/>
             </a:pPr>
             <a:r>
-              <a:rPr lang="en" sz="1600"/>
+              <a:rPr lang="en" sz="1700"/>
               <a:t>Partition based clustering </a:t>
             </a:r>
-            <a:endParaRPr sz="1600"/>
-          </a:p>
-          <a:p>
-            <a:pPr indent="-330200" lvl="1" marL="914400" rtl="0" algn="l">
+            <a:endParaRPr sz="1700"/>
+          </a:p>
+          <a:p>
+            <a:pPr indent="-336550" lvl="1" marL="914400" rtl="0" algn="l">
               <a:lnSpc>
                 <a:spcPct val="115000"/>
               </a:lnSpc>
@@ -15786,17 +15814,17 @@
               <a:spcAft>
                 <a:spcPts val="0"/>
               </a:spcAft>
-              <a:buSzPts val="1600"/>
+              <a:buSzPts val="1700"/>
               <a:buChar char="○"/>
             </a:pPr>
             <a:r>
-              <a:rPr lang="en" sz="1600"/>
+              <a:rPr lang="en" sz="1700"/>
               <a:t>Hierarchical clustering</a:t>
             </a:r>
-            <a:endParaRPr sz="1600"/>
-          </a:p>
-          <a:p>
-            <a:pPr indent="-330200" lvl="1" marL="914400" rtl="0" algn="l">
+            <a:endParaRPr sz="1700"/>
+          </a:p>
+          <a:p>
+            <a:pPr indent="-336550" lvl="1" marL="914400" rtl="0" algn="l">
               <a:lnSpc>
                 <a:spcPct val="115000"/>
               </a:lnSpc>
@@ -15806,20 +15834,20 @@
               <a:spcAft>
                 <a:spcPts val="0"/>
               </a:spcAft>
-              <a:buSzPts val="1600"/>
+              <a:buSzPts val="1700"/>
               <a:buChar char="○"/>
             </a:pPr>
             <a:r>
-              <a:rPr lang="en" sz="1600"/>
+              <a:rPr lang="en" sz="1700"/>
               <a:t>Density based clustering</a:t>
             </a:r>
-            <a:endParaRPr sz="1600"/>
+            <a:endParaRPr sz="1700"/>
           </a:p>
         </p:txBody>
       </p:sp>
       <p:sp>
         <p:nvSpPr>
-          <p:cNvPr id="230" name="Google Shape;230;p39"/>
+          <p:cNvPr id="231" name="Google Shape;231;p39"/>
           <p:cNvSpPr txBox="1"/>
           <p:nvPr>
             <p:ph idx="12" type="sldNum"/>
@@ -15886,7 +15914,7 @@
   <p:cSld>
     <p:spTree>
       <p:nvGrpSpPr>
-        <p:cNvPr id="234" name="Shape 234"/>
+        <p:cNvPr id="235" name="Shape 235"/>
         <p:cNvGrpSpPr/>
         <p:nvPr/>
       </p:nvGrpSpPr>
@@ -15900,7 +15928,7 @@
       </p:grpSpPr>
       <p:pic>
         <p:nvPicPr>
-          <p:cNvPr id="235" name="Google Shape;235;p40"/>
+          <p:cNvPr id="236" name="Google Shape;236;p40"/>
           <p:cNvPicPr preferRelativeResize="0"/>
           <p:nvPr/>
         </p:nvPicPr>
@@ -15927,7 +15955,7 @@
       </p:pic>
       <p:sp>
         <p:nvSpPr>
-          <p:cNvPr id="236" name="Google Shape;236;p40"/>
+          <p:cNvPr id="237" name="Google Shape;237;p40"/>
           <p:cNvSpPr txBox="1"/>
           <p:nvPr>
             <p:ph type="title"/>
@@ -15975,7 +16003,7 @@
       </p:sp>
       <p:sp>
         <p:nvSpPr>
-          <p:cNvPr id="237" name="Google Shape;237;p40"/>
+          <p:cNvPr id="238" name="Google Shape;238;p40"/>
           <p:cNvSpPr txBox="1"/>
           <p:nvPr/>
         </p:nvSpPr>
@@ -16061,7 +16089,7 @@
             </a:pPr>
             <a:r>
               <a:rPr lang="en" sz="1600"/>
-              <a:t>The dataset is divided into a set of k groups, where K is used to define the number of pre-defined groups.</a:t>
+              <a:t>The dataset is divided into a set of K groups, where K is used to define the number of pre-defined groups.</a:t>
             </a:r>
             <a:endParaRPr sz="1600"/>
           </a:p>
@@ -16089,7 +16117,7 @@
       </p:sp>
       <p:sp>
         <p:nvSpPr>
-          <p:cNvPr id="238" name="Google Shape;238;p40"/>
+          <p:cNvPr id="239" name="Google Shape;239;p40"/>
           <p:cNvSpPr txBox="1"/>
           <p:nvPr>
             <p:ph idx="12" type="sldNum"/>
@@ -16145,7 +16173,7 @@
       </p:sp>
       <p:sp>
         <p:nvSpPr>
-          <p:cNvPr id="239" name="Google Shape;239;p40"/>
+          <p:cNvPr id="240" name="Google Shape;240;p40"/>
           <p:cNvSpPr txBox="1"/>
           <p:nvPr/>
         </p:nvSpPr>
@@ -16197,7 +16225,7 @@
       </p:sp>
       <p:pic>
         <p:nvPicPr>
-          <p:cNvPr id="240" name="Google Shape;240;p40"/>
+          <p:cNvPr id="241" name="Google Shape;241;p40"/>
           <p:cNvPicPr preferRelativeResize="0"/>
           <p:nvPr/>
         </p:nvPicPr>
@@ -16236,7 +16264,7 @@
   <p:cSld>
     <p:spTree>
       <p:nvGrpSpPr>
-        <p:cNvPr id="244" name="Shape 244"/>
+        <p:cNvPr id="245" name="Shape 245"/>
         <p:cNvGrpSpPr/>
         <p:nvPr/>
       </p:nvGrpSpPr>
@@ -16250,7 +16278,7 @@
       </p:grpSpPr>
       <p:pic>
         <p:nvPicPr>
-          <p:cNvPr id="245" name="Google Shape;245;p41"/>
+          <p:cNvPr id="246" name="Google Shape;246;p41"/>
           <p:cNvPicPr preferRelativeResize="0"/>
           <p:nvPr/>
         </p:nvPicPr>
@@ -16277,7 +16305,7 @@
       </p:pic>
       <p:sp>
         <p:nvSpPr>
-          <p:cNvPr id="246" name="Google Shape;246;p41"/>
+          <p:cNvPr id="247" name="Google Shape;247;p41"/>
           <p:cNvSpPr txBox="1"/>
           <p:nvPr>
             <p:ph type="title"/>
@@ -16333,7 +16361,7 @@
       </p:sp>
       <p:sp>
         <p:nvSpPr>
-          <p:cNvPr id="247" name="Google Shape;247;p41"/>
+          <p:cNvPr id="248" name="Google Shape;248;p41"/>
           <p:cNvSpPr txBox="1"/>
           <p:nvPr/>
         </p:nvSpPr>
@@ -16463,7 +16491,7 @@
       </p:sp>
       <p:sp>
         <p:nvSpPr>
-          <p:cNvPr id="248" name="Google Shape;248;p41"/>
+          <p:cNvPr id="249" name="Google Shape;249;p41"/>
           <p:cNvSpPr txBox="1"/>
           <p:nvPr>
             <p:ph idx="12" type="sldNum"/>
@@ -16519,7 +16547,7 @@
       </p:sp>
       <p:sp>
         <p:nvSpPr>
-          <p:cNvPr id="249" name="Google Shape;249;p41"/>
+          <p:cNvPr id="250" name="Google Shape;250;p41"/>
           <p:cNvSpPr txBox="1"/>
           <p:nvPr/>
         </p:nvSpPr>
@@ -16571,7 +16599,7 @@
       </p:sp>
       <p:pic>
         <p:nvPicPr>
-          <p:cNvPr id="250" name="Google Shape;250;p41"/>
+          <p:cNvPr id="251" name="Google Shape;251;p41"/>
           <p:cNvPicPr preferRelativeResize="0"/>
           <p:nvPr/>
         </p:nvPicPr>
@@ -16610,7 +16638,7 @@
   <p:cSld>
     <p:spTree>
       <p:nvGrpSpPr>
-        <p:cNvPr id="254" name="Shape 254"/>
+        <p:cNvPr id="255" name="Shape 255"/>
         <p:cNvGrpSpPr/>
         <p:nvPr/>
       </p:nvGrpSpPr>
@@ -16624,7 +16652,7 @@
       </p:grpSpPr>
       <p:pic>
         <p:nvPicPr>
-          <p:cNvPr id="255" name="Google Shape;255;p42"/>
+          <p:cNvPr id="256" name="Google Shape;256;p42"/>
           <p:cNvPicPr preferRelativeResize="0"/>
           <p:nvPr/>
         </p:nvPicPr>
@@ -16651,7 +16679,7 @@
       </p:pic>
       <p:sp>
         <p:nvSpPr>
-          <p:cNvPr id="256" name="Google Shape;256;p42"/>
+          <p:cNvPr id="257" name="Google Shape;257;p42"/>
           <p:cNvSpPr txBox="1"/>
           <p:nvPr>
             <p:ph type="title"/>
@@ -16707,7 +16735,7 @@
       </p:sp>
       <p:sp>
         <p:nvSpPr>
-          <p:cNvPr id="257" name="Google Shape;257;p42"/>
+          <p:cNvPr id="258" name="Google Shape;258;p42"/>
           <p:cNvSpPr txBox="1"/>
           <p:nvPr/>
         </p:nvSpPr>
@@ -16813,7 +16841,7 @@
       </p:sp>
       <p:sp>
         <p:nvSpPr>
-          <p:cNvPr id="258" name="Google Shape;258;p42"/>
+          <p:cNvPr id="259" name="Google Shape;259;p42"/>
           <p:cNvSpPr txBox="1"/>
           <p:nvPr>
             <p:ph idx="12" type="sldNum"/>
@@ -16869,7 +16897,7 @@
       </p:sp>
       <p:sp>
         <p:nvSpPr>
-          <p:cNvPr id="259" name="Google Shape;259;p42"/>
+          <p:cNvPr id="260" name="Google Shape;260;p42"/>
           <p:cNvSpPr txBox="1"/>
           <p:nvPr/>
         </p:nvSpPr>
@@ -16921,7 +16949,7 @@
       </p:sp>
       <p:pic>
         <p:nvPicPr>
-          <p:cNvPr id="260" name="Google Shape;260;p42"/>
+          <p:cNvPr id="261" name="Google Shape;261;p42"/>
           <p:cNvPicPr preferRelativeResize="0"/>
           <p:nvPr/>
         </p:nvPicPr>
@@ -16960,7 +16988,7 @@
   <p:cSld>
     <p:spTree>
       <p:nvGrpSpPr>
-        <p:cNvPr id="264" name="Shape 264"/>
+        <p:cNvPr id="265" name="Shape 265"/>
         <p:cNvGrpSpPr/>
         <p:nvPr/>
       </p:nvGrpSpPr>
@@ -16974,7 +17002,7 @@
       </p:grpSpPr>
       <p:pic>
         <p:nvPicPr>
-          <p:cNvPr id="265" name="Google Shape;265;p43"/>
+          <p:cNvPr id="266" name="Google Shape;266;p43"/>
           <p:cNvPicPr preferRelativeResize="0"/>
           <p:nvPr/>
         </p:nvPicPr>
@@ -17001,7 +17029,7 @@
       </p:pic>
       <p:sp>
         <p:nvSpPr>
-          <p:cNvPr id="266" name="Google Shape;266;p43"/>
+          <p:cNvPr id="267" name="Google Shape;267;p43"/>
           <p:cNvSpPr txBox="1"/>
           <p:nvPr>
             <p:ph type="title"/>
@@ -17049,7 +17077,7 @@
       </p:sp>
       <p:sp>
         <p:nvSpPr>
-          <p:cNvPr id="267" name="Google Shape;267;p43"/>
+          <p:cNvPr id="268" name="Google Shape;268;p43"/>
           <p:cNvSpPr txBox="1"/>
           <p:nvPr/>
         </p:nvSpPr>
@@ -17135,7 +17163,7 @@
       </p:sp>
       <p:sp>
         <p:nvSpPr>
-          <p:cNvPr id="268" name="Google Shape;268;p43"/>
+          <p:cNvPr id="269" name="Google Shape;269;p43"/>
           <p:cNvSpPr txBox="1"/>
           <p:nvPr>
             <p:ph idx="12" type="sldNum"/>
@@ -17191,7 +17219,7 @@
       </p:sp>
       <p:pic>
         <p:nvPicPr>
-          <p:cNvPr id="269" name="Google Shape;269;p43"/>
+          <p:cNvPr id="270" name="Google Shape;270;p43"/>
           <p:cNvPicPr preferRelativeResize="0"/>
           <p:nvPr/>
         </p:nvPicPr>
@@ -17230,7 +17258,7 @@
   <p:cSld>
     <p:spTree>
       <p:nvGrpSpPr>
-        <p:cNvPr id="106" name="Shape 106"/>
+        <p:cNvPr id="107" name="Shape 107"/>
         <p:cNvGrpSpPr/>
         <p:nvPr/>
       </p:nvGrpSpPr>
@@ -17244,7 +17272,7 @@
       </p:grpSpPr>
       <p:sp>
         <p:nvSpPr>
-          <p:cNvPr id="107" name="Google Shape;107;p26"/>
+          <p:cNvPr id="108" name="Google Shape;108;p26"/>
           <p:cNvSpPr txBox="1"/>
           <p:nvPr>
             <p:ph type="ctrTitle"/>
@@ -17292,7 +17320,7 @@
       </p:sp>
       <p:pic>
         <p:nvPicPr>
-          <p:cNvPr id="108" name="Google Shape;108;p26"/>
+          <p:cNvPr id="109" name="Google Shape;109;p26"/>
           <p:cNvPicPr preferRelativeResize="0"/>
           <p:nvPr/>
         </p:nvPicPr>
@@ -17320,7 +17348,7 @@
       </p:pic>
       <p:sp>
         <p:nvSpPr>
-          <p:cNvPr id="109" name="Google Shape;109;p26"/>
+          <p:cNvPr id="110" name="Google Shape;110;p26"/>
           <p:cNvSpPr txBox="1"/>
           <p:nvPr>
             <p:ph idx="12" type="sldNum"/>
@@ -17371,7 +17399,7 @@
   <p:cSld>
     <p:spTree>
       <p:nvGrpSpPr>
-        <p:cNvPr id="273" name="Shape 273"/>
+        <p:cNvPr id="274" name="Shape 274"/>
         <p:cNvGrpSpPr/>
         <p:nvPr/>
       </p:nvGrpSpPr>
@@ -17385,7 +17413,7 @@
       </p:grpSpPr>
       <p:pic>
         <p:nvPicPr>
-          <p:cNvPr id="274" name="Google Shape;274;p44"/>
+          <p:cNvPr id="275" name="Google Shape;275;p44"/>
           <p:cNvPicPr preferRelativeResize="0"/>
           <p:nvPr/>
         </p:nvPicPr>
@@ -17412,7 +17440,7 @@
       </p:pic>
       <p:sp>
         <p:nvSpPr>
-          <p:cNvPr id="275" name="Google Shape;275;p44"/>
+          <p:cNvPr id="276" name="Google Shape;276;p44"/>
           <p:cNvSpPr txBox="1"/>
           <p:nvPr>
             <p:ph type="title"/>
@@ -17460,7 +17488,7 @@
       </p:sp>
       <p:sp>
         <p:nvSpPr>
-          <p:cNvPr id="276" name="Google Shape;276;p44"/>
+          <p:cNvPr id="277" name="Google Shape;277;p44"/>
           <p:cNvSpPr txBox="1"/>
           <p:nvPr/>
         </p:nvSpPr>
@@ -17624,7 +17652,7 @@
       </p:sp>
       <p:sp>
         <p:nvSpPr>
-          <p:cNvPr id="277" name="Google Shape;277;p44"/>
+          <p:cNvPr id="278" name="Google Shape;278;p44"/>
           <p:cNvSpPr txBox="1"/>
           <p:nvPr>
             <p:ph idx="12" type="sldNum"/>
@@ -17672,7 +17700,7 @@
       </p:sp>
       <p:pic>
         <p:nvPicPr>
-          <p:cNvPr id="278" name="Google Shape;278;p44"/>
+          <p:cNvPr id="279" name="Google Shape;279;p44"/>
           <p:cNvPicPr preferRelativeResize="0"/>
           <p:nvPr/>
         </p:nvPicPr>
@@ -17710,7 +17738,7 @@
   <p:cSld>
     <p:spTree>
       <p:nvGrpSpPr>
-        <p:cNvPr id="282" name="Shape 282"/>
+        <p:cNvPr id="283" name="Shape 283"/>
         <p:cNvGrpSpPr/>
         <p:nvPr/>
       </p:nvGrpSpPr>
@@ -17724,7 +17752,7 @@
       </p:grpSpPr>
       <p:pic>
         <p:nvPicPr>
-          <p:cNvPr id="283" name="Google Shape;283;p45"/>
+          <p:cNvPr id="284" name="Google Shape;284;p45"/>
           <p:cNvPicPr preferRelativeResize="0"/>
           <p:nvPr/>
         </p:nvPicPr>
@@ -17751,7 +17779,7 @@
       </p:pic>
       <p:sp>
         <p:nvSpPr>
-          <p:cNvPr id="284" name="Google Shape;284;p45"/>
+          <p:cNvPr id="285" name="Google Shape;285;p45"/>
           <p:cNvSpPr txBox="1"/>
           <p:nvPr>
             <p:ph type="title"/>
@@ -17799,7 +17827,7 @@
       </p:sp>
       <p:sp>
         <p:nvSpPr>
-          <p:cNvPr id="285" name="Google Shape;285;p45"/>
+          <p:cNvPr id="286" name="Google Shape;286;p45"/>
           <p:cNvSpPr txBox="1"/>
           <p:nvPr/>
         </p:nvSpPr>
@@ -17905,7 +17933,7 @@
       </p:sp>
       <p:sp>
         <p:nvSpPr>
-          <p:cNvPr id="286" name="Google Shape;286;p45"/>
+          <p:cNvPr id="287" name="Google Shape;287;p45"/>
           <p:cNvSpPr txBox="1"/>
           <p:nvPr>
             <p:ph idx="12" type="sldNum"/>
@@ -17961,7 +17989,7 @@
       </p:sp>
       <p:pic>
         <p:nvPicPr>
-          <p:cNvPr id="287" name="Google Shape;287;p45"/>
+          <p:cNvPr id="288" name="Google Shape;288;p45"/>
           <p:cNvPicPr preferRelativeResize="0"/>
           <p:nvPr/>
         </p:nvPicPr>
@@ -17989,7 +18017,7 @@
       </p:pic>
       <p:sp>
         <p:nvSpPr>
-          <p:cNvPr id="288" name="Google Shape;288;p45"/>
+          <p:cNvPr id="289" name="Google Shape;289;p45"/>
           <p:cNvSpPr txBox="1"/>
           <p:nvPr/>
         </p:nvSpPr>
@@ -18052,7 +18080,7 @@
   <p:cSld>
     <p:spTree>
       <p:nvGrpSpPr>
-        <p:cNvPr id="292" name="Shape 292"/>
+        <p:cNvPr id="293" name="Shape 293"/>
         <p:cNvGrpSpPr/>
         <p:nvPr/>
       </p:nvGrpSpPr>
@@ -18066,7 +18094,7 @@
       </p:grpSpPr>
       <p:pic>
         <p:nvPicPr>
-          <p:cNvPr id="293" name="Google Shape;293;p46"/>
+          <p:cNvPr id="294" name="Google Shape;294;p46"/>
           <p:cNvPicPr preferRelativeResize="0"/>
           <p:nvPr/>
         </p:nvPicPr>
@@ -18093,7 +18121,7 @@
       </p:pic>
       <p:sp>
         <p:nvSpPr>
-          <p:cNvPr id="294" name="Google Shape;294;p46"/>
+          <p:cNvPr id="295" name="Google Shape;295;p46"/>
           <p:cNvSpPr txBox="1"/>
           <p:nvPr>
             <p:ph type="title"/>
@@ -18141,7 +18169,7 @@
       </p:sp>
       <p:sp>
         <p:nvSpPr>
-          <p:cNvPr id="295" name="Google Shape;295;p46"/>
+          <p:cNvPr id="296" name="Google Shape;296;p46"/>
           <p:cNvSpPr txBox="1"/>
           <p:nvPr/>
         </p:nvSpPr>
@@ -18247,7 +18275,7 @@
       </p:sp>
       <p:sp>
         <p:nvSpPr>
-          <p:cNvPr id="296" name="Google Shape;296;p46"/>
+          <p:cNvPr id="297" name="Google Shape;297;p46"/>
           <p:cNvSpPr txBox="1"/>
           <p:nvPr>
             <p:ph idx="12" type="sldNum"/>
@@ -18303,7 +18331,7 @@
       </p:sp>
       <p:sp>
         <p:nvSpPr>
-          <p:cNvPr id="297" name="Google Shape;297;p46"/>
+          <p:cNvPr id="298" name="Google Shape;298;p46"/>
           <p:cNvSpPr txBox="1"/>
           <p:nvPr/>
         </p:nvSpPr>
@@ -18355,7 +18383,7 @@
       </p:sp>
       <p:pic>
         <p:nvPicPr>
-          <p:cNvPr id="298" name="Google Shape;298;p46"/>
+          <p:cNvPr id="299" name="Google Shape;299;p46"/>
           <p:cNvPicPr preferRelativeResize="0"/>
           <p:nvPr/>
         </p:nvPicPr>
@@ -18394,7 +18422,7 @@
   <p:cSld>
     <p:spTree>
       <p:nvGrpSpPr>
-        <p:cNvPr id="302" name="Shape 302"/>
+        <p:cNvPr id="303" name="Shape 303"/>
         <p:cNvGrpSpPr/>
         <p:nvPr/>
       </p:nvGrpSpPr>
@@ -18408,7 +18436,7 @@
       </p:grpSpPr>
       <p:pic>
         <p:nvPicPr>
-          <p:cNvPr id="303" name="Google Shape;303;p47"/>
+          <p:cNvPr id="304" name="Google Shape;304;p47"/>
           <p:cNvPicPr preferRelativeResize="0"/>
           <p:nvPr/>
         </p:nvPicPr>
@@ -18435,7 +18463,7 @@
       </p:pic>
       <p:pic>
         <p:nvPicPr>
-          <p:cNvPr id="304" name="Google Shape;304;p47"/>
+          <p:cNvPr id="305" name="Google Shape;305;p47"/>
           <p:cNvPicPr preferRelativeResize="0"/>
           <p:nvPr/>
         </p:nvPicPr>
@@ -18463,7 +18491,7 @@
       </p:pic>
       <p:sp>
         <p:nvSpPr>
-          <p:cNvPr id="305" name="Google Shape;305;p47"/>
+          <p:cNvPr id="306" name="Google Shape;306;p47"/>
           <p:cNvSpPr txBox="1"/>
           <p:nvPr>
             <p:ph type="title"/>
@@ -18511,7 +18539,7 @@
       </p:sp>
       <p:sp>
         <p:nvSpPr>
-          <p:cNvPr id="306" name="Google Shape;306;p47"/>
+          <p:cNvPr id="307" name="Google Shape;307;p47"/>
           <p:cNvSpPr txBox="1"/>
           <p:nvPr/>
         </p:nvSpPr>
@@ -18601,7 +18629,7 @@
       </p:sp>
       <p:sp>
         <p:nvSpPr>
-          <p:cNvPr id="307" name="Google Shape;307;p47"/>
+          <p:cNvPr id="308" name="Google Shape;308;p47"/>
           <p:cNvSpPr txBox="1"/>
           <p:nvPr>
             <p:ph idx="12" type="sldNum"/>
@@ -18657,7 +18685,7 @@
       </p:sp>
       <p:pic>
         <p:nvPicPr>
-          <p:cNvPr id="308" name="Google Shape;308;p47"/>
+          <p:cNvPr id="309" name="Google Shape;309;p47"/>
           <p:cNvPicPr preferRelativeResize="0"/>
           <p:nvPr/>
         </p:nvPicPr>
@@ -18685,7 +18713,7 @@
       </p:pic>
       <p:sp>
         <p:nvSpPr>
-          <p:cNvPr id="309" name="Google Shape;309;p47"/>
+          <p:cNvPr id="310" name="Google Shape;310;p47"/>
           <p:cNvSpPr txBox="1"/>
           <p:nvPr/>
         </p:nvSpPr>
@@ -18806,7 +18834,7 @@
   <p:cSld>
     <p:spTree>
       <p:nvGrpSpPr>
-        <p:cNvPr id="313" name="Shape 313"/>
+        <p:cNvPr id="314" name="Shape 314"/>
         <p:cNvGrpSpPr/>
         <p:nvPr/>
       </p:nvGrpSpPr>
@@ -18820,7 +18848,7 @@
       </p:grpSpPr>
       <p:pic>
         <p:nvPicPr>
-          <p:cNvPr id="314" name="Google Shape;314;p48"/>
+          <p:cNvPr id="315" name="Google Shape;315;p48"/>
           <p:cNvPicPr preferRelativeResize="0"/>
           <p:nvPr/>
         </p:nvPicPr>
@@ -18847,7 +18875,7 @@
       </p:pic>
       <p:sp>
         <p:nvSpPr>
-          <p:cNvPr id="315" name="Google Shape;315;p48"/>
+          <p:cNvPr id="316" name="Google Shape;316;p48"/>
           <p:cNvSpPr txBox="1"/>
           <p:nvPr>
             <p:ph type="title"/>
@@ -18895,7 +18923,7 @@
       </p:sp>
       <p:sp>
         <p:nvSpPr>
-          <p:cNvPr id="316" name="Google Shape;316;p48"/>
+          <p:cNvPr id="317" name="Google Shape;317;p48"/>
           <p:cNvSpPr txBox="1"/>
           <p:nvPr/>
         </p:nvSpPr>
@@ -19005,7 +19033,7 @@
       </p:sp>
       <p:sp>
         <p:nvSpPr>
-          <p:cNvPr id="317" name="Google Shape;317;p48"/>
+          <p:cNvPr id="318" name="Google Shape;318;p48"/>
           <p:cNvSpPr txBox="1"/>
           <p:nvPr>
             <p:ph idx="12" type="sldNum"/>
@@ -19061,7 +19089,7 @@
       </p:sp>
       <p:sp>
         <p:nvSpPr>
-          <p:cNvPr id="318" name="Google Shape;318;p48"/>
+          <p:cNvPr id="319" name="Google Shape;319;p48"/>
           <p:cNvSpPr txBox="1"/>
           <p:nvPr/>
         </p:nvSpPr>
@@ -19151,7 +19179,7 @@
       </p:sp>
       <p:pic>
         <p:nvPicPr>
-          <p:cNvPr id="319" name="Google Shape;319;p48"/>
+          <p:cNvPr id="320" name="Google Shape;320;p48"/>
           <p:cNvPicPr preferRelativeResize="0"/>
           <p:nvPr/>
         </p:nvPicPr>
@@ -19179,7 +19207,7 @@
       </p:pic>
       <p:pic>
         <p:nvPicPr>
-          <p:cNvPr id="320" name="Google Shape;320;p48"/>
+          <p:cNvPr id="321" name="Google Shape;321;p48"/>
           <p:cNvPicPr preferRelativeResize="0"/>
           <p:nvPr/>
         </p:nvPicPr>
@@ -19218,7 +19246,7 @@
   <p:cSld>
     <p:spTree>
       <p:nvGrpSpPr>
-        <p:cNvPr id="324" name="Shape 324"/>
+        <p:cNvPr id="325" name="Shape 325"/>
         <p:cNvGrpSpPr/>
         <p:nvPr/>
       </p:nvGrpSpPr>
@@ -19232,7 +19260,7 @@
       </p:grpSpPr>
       <p:pic>
         <p:nvPicPr>
-          <p:cNvPr id="325" name="Google Shape;325;p49"/>
+          <p:cNvPr id="326" name="Google Shape;326;p49"/>
           <p:cNvPicPr preferRelativeResize="0"/>
           <p:nvPr/>
         </p:nvPicPr>
@@ -19259,7 +19287,7 @@
       </p:pic>
       <p:sp>
         <p:nvSpPr>
-          <p:cNvPr id="326" name="Google Shape;326;p49"/>
+          <p:cNvPr id="327" name="Google Shape;327;p49"/>
           <p:cNvSpPr txBox="1"/>
           <p:nvPr>
             <p:ph type="title"/>
@@ -19307,7 +19335,7 @@
       </p:sp>
       <p:sp>
         <p:nvSpPr>
-          <p:cNvPr id="327" name="Google Shape;327;p49"/>
+          <p:cNvPr id="328" name="Google Shape;328;p49"/>
           <p:cNvSpPr txBox="1"/>
           <p:nvPr/>
         </p:nvSpPr>
@@ -19413,7 +19441,7 @@
       </p:sp>
       <p:sp>
         <p:nvSpPr>
-          <p:cNvPr id="328" name="Google Shape;328;p49"/>
+          <p:cNvPr id="329" name="Google Shape;329;p49"/>
           <p:cNvSpPr txBox="1"/>
           <p:nvPr>
             <p:ph idx="12" type="sldNum"/>
@@ -19480,7 +19508,7 @@
   <p:cSld>
     <p:spTree>
       <p:nvGrpSpPr>
-        <p:cNvPr id="332" name="Shape 332"/>
+        <p:cNvPr id="333" name="Shape 333"/>
         <p:cNvGrpSpPr/>
         <p:nvPr/>
       </p:nvGrpSpPr>
@@ -19494,7 +19522,7 @@
       </p:grpSpPr>
       <p:pic>
         <p:nvPicPr>
-          <p:cNvPr id="333" name="Google Shape;333;p50"/>
+          <p:cNvPr id="334" name="Google Shape;334;p50"/>
           <p:cNvPicPr preferRelativeResize="0"/>
           <p:nvPr/>
         </p:nvPicPr>
@@ -19521,7 +19549,7 @@
       </p:pic>
       <p:sp>
         <p:nvSpPr>
-          <p:cNvPr id="334" name="Google Shape;334;p50"/>
+          <p:cNvPr id="335" name="Google Shape;335;p50"/>
           <p:cNvSpPr txBox="1"/>
           <p:nvPr>
             <p:ph type="title"/>
@@ -19569,14 +19597,14 @@
       </p:sp>
       <p:sp>
         <p:nvSpPr>
-          <p:cNvPr id="335" name="Google Shape;335;p50"/>
+          <p:cNvPr id="336" name="Google Shape;336;p50"/>
           <p:cNvSpPr txBox="1"/>
           <p:nvPr/>
         </p:nvSpPr>
         <p:spPr>
           <a:xfrm>
-            <a:off x="3654125" y="717650"/>
-            <a:ext cx="5335800" cy="3869700"/>
+            <a:off x="3654125" y="622150"/>
+            <a:ext cx="5335800" cy="4066500"/>
           </a:xfrm>
           <a:prstGeom prst="rect">
             <a:avLst/>
@@ -19592,7 +19620,7 @@
           </a:bodyPr>
           <a:lstStyle/>
           <a:p>
-            <a:pPr indent="-317500" lvl="0" marL="457200" rtl="0" algn="l">
+            <a:pPr indent="-311150" lvl="0" marL="457200" rtl="0" algn="l">
               <a:lnSpc>
                 <a:spcPct val="115000"/>
               </a:lnSpc>
@@ -19602,17 +19630,17 @@
               <a:spcAft>
                 <a:spcPts val="0"/>
               </a:spcAft>
-              <a:buSzPts val="1400"/>
+              <a:buSzPts val="1300"/>
               <a:buChar char="●"/>
             </a:pPr>
             <a:r>
-              <a:rPr lang="en"/>
+              <a:rPr lang="en" sz="1300"/>
               <a:t>Order the outputs of the classifier by their scores (or the probability of being the positive class).</a:t>
             </a:r>
-            <a:endParaRPr/>
-          </a:p>
-          <a:p>
-            <a:pPr indent="-317500" lvl="0" marL="457200" rtl="0" algn="l">
+            <a:endParaRPr sz="1300"/>
+          </a:p>
+          <a:p>
+            <a:pPr indent="-311150" lvl="0" marL="457200" rtl="0" algn="l">
               <a:lnSpc>
                 <a:spcPct val="115000"/>
               </a:lnSpc>
@@ -19622,17 +19650,17 @@
               <a:spcAft>
                 <a:spcPts val="0"/>
               </a:spcAft>
-              <a:buSzPts val="1400"/>
+              <a:buSzPts val="1300"/>
               <a:buChar char="●"/>
             </a:pPr>
             <a:r>
-              <a:rPr lang="en"/>
+              <a:rPr lang="en" sz="1300"/>
               <a:t>Start at the (0,0) coordinate.</a:t>
             </a:r>
-            <a:endParaRPr/>
-          </a:p>
-          <a:p>
-            <a:pPr indent="-317500" lvl="0" marL="457200" rtl="0" algn="l">
+            <a:endParaRPr sz="1300"/>
+          </a:p>
+          <a:p>
+            <a:pPr indent="-311150" lvl="0" marL="457200" rtl="0" algn="l">
               <a:lnSpc>
                 <a:spcPct val="115000"/>
               </a:lnSpc>
@@ -19642,17 +19670,17 @@
               <a:spcAft>
                 <a:spcPts val="0"/>
               </a:spcAft>
-              <a:buSzPts val="1400"/>
+              <a:buSzPts val="1300"/>
               <a:buChar char="●"/>
             </a:pPr>
             <a:r>
-              <a:rPr lang="en"/>
+              <a:rPr lang="en" sz="1300"/>
               <a:t>For each example x in the sorted order:</a:t>
             </a:r>
-            <a:endParaRPr/>
-          </a:p>
-          <a:p>
-            <a:pPr indent="-317500" lvl="1" marL="914400" rtl="0" algn="l">
+            <a:endParaRPr sz="1300"/>
+          </a:p>
+          <a:p>
+            <a:pPr indent="-311150" lvl="1" marL="914400" rtl="0" algn="l">
               <a:lnSpc>
                 <a:spcPct val="115000"/>
               </a:lnSpc>
@@ -19662,17 +19690,17 @@
               <a:spcAft>
                 <a:spcPts val="0"/>
               </a:spcAft>
-              <a:buSzPts val="1400"/>
+              <a:buSzPts val="1300"/>
               <a:buChar char="○"/>
             </a:pPr>
             <a:r>
-              <a:rPr lang="en"/>
+              <a:rPr lang="en" sz="1300"/>
               <a:t>If x is positive, move 1/pos up</a:t>
             </a:r>
-            <a:endParaRPr/>
-          </a:p>
-          <a:p>
-            <a:pPr indent="-317500" lvl="1" marL="914400" rtl="0" algn="l">
+            <a:endParaRPr sz="1300"/>
+          </a:p>
+          <a:p>
+            <a:pPr indent="-311150" lvl="1" marL="914400" rtl="0" algn="l">
               <a:lnSpc>
                 <a:spcPct val="115000"/>
               </a:lnSpc>
@@ -19682,17 +19710,17 @@
               <a:spcAft>
                 <a:spcPts val="0"/>
               </a:spcAft>
-              <a:buSzPts val="1400"/>
+              <a:buSzPts val="1300"/>
               <a:buChar char="○"/>
             </a:pPr>
             <a:r>
-              <a:rPr lang="en"/>
+              <a:rPr lang="en" sz="1300"/>
               <a:t>If x is negative more 1/neg right</a:t>
             </a:r>
-            <a:endParaRPr/>
-          </a:p>
-          <a:p>
-            <a:pPr indent="-317500" lvl="0" marL="457200" rtl="0" algn="l">
+            <a:endParaRPr sz="1300"/>
+          </a:p>
+          <a:p>
+            <a:pPr indent="-311150" lvl="1" marL="914400" rtl="0" algn="l">
               <a:lnSpc>
                 <a:spcPct val="115000"/>
               </a:lnSpc>
@@ -19702,17 +19730,17 @@
               <a:spcAft>
                 <a:spcPts val="0"/>
               </a:spcAft>
-              <a:buSzPts val="1400"/>
-              <a:buChar char="●"/>
-            </a:pPr>
-            <a:r>
-              <a:rPr lang="en"/>
-              <a:t>ROC space is between points (0,0) and (1,1)</a:t>
-            </a:r>
-            <a:endParaRPr/>
-          </a:p>
-          <a:p>
-            <a:pPr indent="-317500" lvl="0" marL="457200" rtl="0" algn="l">
+              <a:buSzPts val="1300"/>
+              <a:buChar char="○"/>
+            </a:pPr>
+            <a:r>
+              <a:rPr lang="en" sz="1300"/>
+              <a:t>Here pos and neg are the fraction of positive and negative examples respectively</a:t>
+            </a:r>
+            <a:endParaRPr sz="1300"/>
+          </a:p>
+          <a:p>
+            <a:pPr indent="-311150" lvl="0" marL="457200" rtl="0" algn="l">
               <a:lnSpc>
                 <a:spcPct val="115000"/>
               </a:lnSpc>
@@ -19722,17 +19750,17 @@
               <a:spcAft>
                 <a:spcPts val="0"/>
               </a:spcAft>
-              <a:buSzPts val="1400"/>
+              <a:buSzPts val="1300"/>
               <a:buChar char="●"/>
             </a:pPr>
             <a:r>
-              <a:rPr lang="en"/>
-              <a:t>Each prediction result from the confusion matrix occupies a point in this ROC space.</a:t>
-            </a:r>
-            <a:endParaRPr/>
-          </a:p>
-          <a:p>
-            <a:pPr indent="-317500" lvl="0" marL="457200" rtl="0" algn="l">
+              <a:rPr lang="en" sz="1300"/>
+              <a:t>ROC space is between points (0,0) and (1,1)</a:t>
+            </a:r>
+            <a:endParaRPr sz="1300"/>
+          </a:p>
+          <a:p>
+            <a:pPr indent="-311150" lvl="0" marL="457200" rtl="0" algn="l">
               <a:lnSpc>
                 <a:spcPct val="115000"/>
               </a:lnSpc>
@@ -19742,17 +19770,17 @@
               <a:spcAft>
                 <a:spcPts val="0"/>
               </a:spcAft>
-              <a:buSzPts val="1400"/>
+              <a:buSzPts val="1300"/>
               <a:buChar char="●"/>
             </a:pPr>
             <a:r>
-              <a:rPr lang="en"/>
-              <a:t>The best prediction model would give a point on the top left corner (0,1) indicating perfect classification (100% sensitivity and specificity)</a:t>
-            </a:r>
-            <a:endParaRPr/>
-          </a:p>
-          <a:p>
-            <a:pPr indent="-317500" lvl="0" marL="457200" rtl="0" algn="l">
+              <a:rPr lang="en" sz="1300"/>
+              <a:t>Each prediction result from the confusion matrix occupies a point in this ROC space.</a:t>
+            </a:r>
+            <a:endParaRPr sz="1300"/>
+          </a:p>
+          <a:p>
+            <a:pPr indent="-311150" lvl="0" marL="457200" rtl="0" algn="l">
               <a:lnSpc>
                 <a:spcPct val="115000"/>
               </a:lnSpc>
@@ -19762,17 +19790,17 @@
               <a:spcAft>
                 <a:spcPts val="0"/>
               </a:spcAft>
-              <a:buSzPts val="1400"/>
+              <a:buSzPts val="1300"/>
               <a:buChar char="●"/>
             </a:pPr>
             <a:r>
-              <a:rPr lang="en"/>
-              <a:t>A diagonal line depicts a classifier does a random guess.</a:t>
-            </a:r>
-            <a:endParaRPr/>
-          </a:p>
-          <a:p>
-            <a:pPr indent="-317500" lvl="0" marL="457200" rtl="0" algn="l">
+              <a:rPr lang="en" sz="1300"/>
+              <a:t>The best prediction model would give a point on the top left corner (0,1) indicating perfect classification (100% sensitivity and specificity)</a:t>
+            </a:r>
+            <a:endParaRPr sz="1300"/>
+          </a:p>
+          <a:p>
+            <a:pPr indent="-311150" lvl="0" marL="457200" rtl="0" algn="l">
               <a:lnSpc>
                 <a:spcPct val="115000"/>
               </a:lnSpc>
@@ -19782,20 +19810,40 @@
               <a:spcAft>
                 <a:spcPts val="0"/>
               </a:spcAft>
-              <a:buSzPts val="1400"/>
+              <a:buSzPts val="1300"/>
               <a:buChar char="●"/>
             </a:pPr>
             <a:r>
-              <a:rPr lang="en"/>
+              <a:rPr lang="en" sz="1300"/>
+              <a:t>A diagonal line depicts a classifier does a random guess.</a:t>
+            </a:r>
+            <a:endParaRPr sz="1300"/>
+          </a:p>
+          <a:p>
+            <a:pPr indent="-311150" lvl="0" marL="457200" rtl="0" algn="l">
+              <a:lnSpc>
+                <a:spcPct val="115000"/>
+              </a:lnSpc>
+              <a:spcBef>
+                <a:spcPts val="0"/>
+              </a:spcBef>
+              <a:spcAft>
+                <a:spcPts val="0"/>
+              </a:spcAft>
+              <a:buSzPts val="1300"/>
+              <a:buChar char="●"/>
+            </a:pPr>
+            <a:r>
+              <a:rPr lang="en" sz="1300"/>
               <a:t>ROC curve in the top half indicates a classifier better than average</a:t>
             </a:r>
-            <a:endParaRPr/>
+            <a:endParaRPr sz="1300"/>
           </a:p>
         </p:txBody>
       </p:sp>
       <p:sp>
         <p:nvSpPr>
-          <p:cNvPr id="336" name="Google Shape;336;p50"/>
+          <p:cNvPr id="337" name="Google Shape;337;p50"/>
           <p:cNvSpPr txBox="1"/>
           <p:nvPr>
             <p:ph idx="12" type="sldNum"/>
@@ -19851,7 +19899,7 @@
       </p:sp>
       <p:pic>
         <p:nvPicPr>
-          <p:cNvPr id="337" name="Google Shape;337;p50"/>
+          <p:cNvPr id="338" name="Google Shape;338;p50"/>
           <p:cNvPicPr preferRelativeResize="0"/>
           <p:nvPr/>
         </p:nvPicPr>
@@ -19879,7 +19927,7 @@
       </p:pic>
       <p:sp>
         <p:nvSpPr>
-          <p:cNvPr id="338" name="Google Shape;338;p50"/>
+          <p:cNvPr id="339" name="Google Shape;339;p50"/>
           <p:cNvSpPr txBox="1"/>
           <p:nvPr/>
         </p:nvSpPr>
@@ -19918,7 +19966,25 @@
                 <a:cs typeface="Roboto"/>
                 <a:sym typeface="Roboto"/>
               </a:rPr>
-              <a:t>(https://scikit-learn.org/stable/modules/model_evaluation.html#roc-metrics)</a:t>
+              <a:t>(https://scikit-learn.org/</a:t>
+            </a:r>
+            <a:r>
+              <a:rPr lang="en">
+                <a:latin typeface="Roboto"/>
+                <a:ea typeface="Roboto"/>
+                <a:cs typeface="Roboto"/>
+                <a:sym typeface="Roboto"/>
+              </a:rPr>
+              <a:t>stable/modules/model_evaluation.html#roc-metrics</a:t>
+            </a:r>
+            <a:r>
+              <a:rPr lang="en">
+                <a:latin typeface="Roboto"/>
+                <a:ea typeface="Roboto"/>
+                <a:cs typeface="Roboto"/>
+                <a:sym typeface="Roboto"/>
+              </a:rPr>
+              <a:t>)</a:t>
             </a:r>
             <a:endParaRPr>
               <a:latin typeface="Roboto"/>
@@ -19942,7 +20008,7 @@
   <p:cSld>
     <p:spTree>
       <p:nvGrpSpPr>
-        <p:cNvPr id="342" name="Shape 342"/>
+        <p:cNvPr id="343" name="Shape 343"/>
         <p:cNvGrpSpPr/>
         <p:nvPr/>
       </p:nvGrpSpPr>
@@ -19956,7 +20022,7 @@
       </p:grpSpPr>
       <p:pic>
         <p:nvPicPr>
-          <p:cNvPr id="343" name="Google Shape;343;p51"/>
+          <p:cNvPr id="344" name="Google Shape;344;p51"/>
           <p:cNvPicPr preferRelativeResize="0"/>
           <p:nvPr/>
         </p:nvPicPr>
@@ -19983,7 +20049,7 @@
       </p:pic>
       <p:sp>
         <p:nvSpPr>
-          <p:cNvPr id="344" name="Google Shape;344;p51"/>
+          <p:cNvPr id="345" name="Google Shape;345;p51"/>
           <p:cNvSpPr txBox="1"/>
           <p:nvPr>
             <p:ph type="title"/>
@@ -20031,7 +20097,7 @@
       </p:sp>
       <p:sp>
         <p:nvSpPr>
-          <p:cNvPr id="345" name="Google Shape;345;p51"/>
+          <p:cNvPr id="346" name="Google Shape;346;p51"/>
           <p:cNvSpPr txBox="1"/>
           <p:nvPr/>
         </p:nvSpPr>
@@ -20184,7 +20250,7 @@
       </p:sp>
       <p:sp>
         <p:nvSpPr>
-          <p:cNvPr id="346" name="Google Shape;346;p51"/>
+          <p:cNvPr id="347" name="Google Shape;347;p51"/>
           <p:cNvSpPr txBox="1"/>
           <p:nvPr>
             <p:ph idx="12" type="sldNum"/>
@@ -20240,7 +20306,7 @@
       </p:sp>
       <p:pic>
         <p:nvPicPr>
-          <p:cNvPr id="347" name="Google Shape;347;p51"/>
+          <p:cNvPr id="348" name="Google Shape;348;p51"/>
           <p:cNvPicPr preferRelativeResize="0"/>
           <p:nvPr/>
         </p:nvPicPr>
@@ -20268,7 +20334,7 @@
       </p:pic>
       <p:sp>
         <p:nvSpPr>
-          <p:cNvPr id="348" name="Google Shape;348;p51"/>
+          <p:cNvPr id="349" name="Google Shape;349;p51"/>
           <p:cNvSpPr txBox="1"/>
           <p:nvPr/>
         </p:nvSpPr>
@@ -20331,7 +20397,7 @@
   <p:cSld>
     <p:spTree>
       <p:nvGrpSpPr>
-        <p:cNvPr id="352" name="Shape 352"/>
+        <p:cNvPr id="353" name="Shape 353"/>
         <p:cNvGrpSpPr/>
         <p:nvPr/>
       </p:nvGrpSpPr>
@@ -20345,7 +20411,7 @@
       </p:grpSpPr>
       <p:pic>
         <p:nvPicPr>
-          <p:cNvPr id="353" name="Google Shape;353;p52"/>
+          <p:cNvPr id="354" name="Google Shape;354;p52"/>
           <p:cNvPicPr preferRelativeResize="0"/>
           <p:nvPr/>
         </p:nvPicPr>
@@ -20372,7 +20438,7 @@
       </p:pic>
       <p:sp>
         <p:nvSpPr>
-          <p:cNvPr id="354" name="Google Shape;354;p52"/>
+          <p:cNvPr id="355" name="Google Shape;355;p52"/>
           <p:cNvSpPr txBox="1"/>
           <p:nvPr>
             <p:ph type="title"/>
@@ -20420,7 +20486,7 @@
       </p:sp>
       <p:sp>
         <p:nvSpPr>
-          <p:cNvPr id="355" name="Google Shape;355;p52"/>
+          <p:cNvPr id="356" name="Google Shape;356;p52"/>
           <p:cNvSpPr txBox="1"/>
           <p:nvPr/>
         </p:nvSpPr>
@@ -20606,7 +20672,7 @@
             </a:r>
             <a:r>
               <a:rPr lang="en" sz="1500"/>
-              <a:t> I.e. two groups/clusters have as large distance among them as possible.</a:t>
+              <a:t> i.e. two groups/clusters have as large distance among them as possible.</a:t>
             </a:r>
             <a:endParaRPr sz="1500"/>
           </a:p>
@@ -20614,7 +20680,7 @@
       </p:sp>
       <p:sp>
         <p:nvSpPr>
-          <p:cNvPr id="356" name="Google Shape;356;p52"/>
+          <p:cNvPr id="357" name="Google Shape;357;p52"/>
           <p:cNvSpPr txBox="1"/>
           <p:nvPr>
             <p:ph idx="12" type="sldNum"/>
@@ -20681,7 +20747,7 @@
   <p:cSld>
     <p:spTree>
       <p:nvGrpSpPr>
-        <p:cNvPr id="360" name="Shape 360"/>
+        <p:cNvPr id="361" name="Shape 361"/>
         <p:cNvGrpSpPr/>
         <p:nvPr/>
       </p:nvGrpSpPr>
@@ -20695,7 +20761,7 @@
       </p:grpSpPr>
       <p:pic>
         <p:nvPicPr>
-          <p:cNvPr id="361" name="Google Shape;361;p53"/>
+          <p:cNvPr id="362" name="Google Shape;362;p53"/>
           <p:cNvPicPr preferRelativeResize="0"/>
           <p:nvPr/>
         </p:nvPicPr>
@@ -20722,7 +20788,7 @@
       </p:pic>
       <p:sp>
         <p:nvSpPr>
-          <p:cNvPr id="362" name="Google Shape;362;p53"/>
+          <p:cNvPr id="363" name="Google Shape;363;p53"/>
           <p:cNvSpPr txBox="1"/>
           <p:nvPr>
             <p:ph type="title"/>
@@ -20770,7 +20836,7 @@
       </p:sp>
       <p:sp>
         <p:nvSpPr>
-          <p:cNvPr id="363" name="Google Shape;363;p53"/>
+          <p:cNvPr id="364" name="Google Shape;364;p53"/>
           <p:cNvSpPr txBox="1"/>
           <p:nvPr/>
         </p:nvSpPr>
@@ -20864,7 +20930,7 @@
       </p:sp>
       <p:sp>
         <p:nvSpPr>
-          <p:cNvPr id="364" name="Google Shape;364;p53"/>
+          <p:cNvPr id="365" name="Google Shape;365;p53"/>
           <p:cNvSpPr txBox="1"/>
           <p:nvPr>
             <p:ph idx="12" type="sldNum"/>
@@ -20920,7 +20986,7 @@
       </p:sp>
       <p:pic>
         <p:nvPicPr>
-          <p:cNvPr id="365" name="Google Shape;365;p53"/>
+          <p:cNvPr id="366" name="Google Shape;366;p53"/>
           <p:cNvPicPr preferRelativeResize="0"/>
           <p:nvPr/>
         </p:nvPicPr>
@@ -20948,7 +21014,7 @@
       </p:pic>
       <p:sp>
         <p:nvSpPr>
-          <p:cNvPr id="366" name="Google Shape;366;p53"/>
+          <p:cNvPr id="367" name="Google Shape;367;p53"/>
           <p:cNvSpPr txBox="1"/>
           <p:nvPr/>
         </p:nvSpPr>
@@ -21038,7 +21104,7 @@
       </p:sp>
       <p:pic>
         <p:nvPicPr>
-          <p:cNvPr id="367" name="Google Shape;367;p53"/>
+          <p:cNvPr id="368" name="Google Shape;368;p53"/>
           <p:cNvPicPr preferRelativeResize="0"/>
           <p:nvPr/>
         </p:nvPicPr>
@@ -21077,7 +21143,7 @@
   <p:cSld>
     <p:spTree>
       <p:nvGrpSpPr>
-        <p:cNvPr id="113" name="Shape 113"/>
+        <p:cNvPr id="114" name="Shape 114"/>
         <p:cNvGrpSpPr/>
         <p:nvPr/>
       </p:nvGrpSpPr>
@@ -21091,7 +21157,7 @@
       </p:grpSpPr>
       <p:pic>
         <p:nvPicPr>
-          <p:cNvPr id="114" name="Google Shape;114;p27"/>
+          <p:cNvPr id="115" name="Google Shape;115;p27"/>
           <p:cNvPicPr preferRelativeResize="0"/>
           <p:nvPr/>
         </p:nvPicPr>
@@ -21118,7 +21184,7 @@
       </p:pic>
       <p:sp>
         <p:nvSpPr>
-          <p:cNvPr id="115" name="Google Shape;115;p27"/>
+          <p:cNvPr id="116" name="Google Shape;116;p27"/>
           <p:cNvSpPr txBox="1"/>
           <p:nvPr>
             <p:ph type="title"/>
@@ -21166,7 +21232,7 @@
       </p:sp>
       <p:sp>
         <p:nvSpPr>
-          <p:cNvPr id="116" name="Google Shape;116;p27"/>
+          <p:cNvPr id="117" name="Google Shape;117;p27"/>
           <p:cNvSpPr txBox="1"/>
           <p:nvPr/>
         </p:nvSpPr>
@@ -21330,7 +21396,7 @@
       </p:sp>
       <p:sp>
         <p:nvSpPr>
-          <p:cNvPr id="117" name="Google Shape;117;p27"/>
+          <p:cNvPr id="118" name="Google Shape;118;p27"/>
           <p:cNvSpPr txBox="1"/>
           <p:nvPr>
             <p:ph idx="12" type="sldNum"/>
@@ -21378,7 +21444,7 @@
       </p:sp>
       <p:pic>
         <p:nvPicPr>
-          <p:cNvPr id="118" name="Google Shape;118;p27"/>
+          <p:cNvPr id="119" name="Google Shape;119;p27"/>
           <p:cNvPicPr preferRelativeResize="0"/>
           <p:nvPr/>
         </p:nvPicPr>
@@ -21416,7 +21482,7 @@
   <p:cSld>
     <p:spTree>
       <p:nvGrpSpPr>
-        <p:cNvPr id="371" name="Shape 371"/>
+        <p:cNvPr id="372" name="Shape 372"/>
         <p:cNvGrpSpPr/>
         <p:nvPr/>
       </p:nvGrpSpPr>
@@ -21430,7 +21496,7 @@
       </p:grpSpPr>
       <p:pic>
         <p:nvPicPr>
-          <p:cNvPr id="372" name="Google Shape;372;p54"/>
+          <p:cNvPr id="373" name="Google Shape;373;p54"/>
           <p:cNvPicPr preferRelativeResize="0"/>
           <p:nvPr/>
         </p:nvPicPr>
@@ -21458,7 +21524,7 @@
       </p:pic>
       <p:sp>
         <p:nvSpPr>
-          <p:cNvPr id="373" name="Google Shape;373;p54"/>
+          <p:cNvPr id="374" name="Google Shape;374;p54"/>
           <p:cNvSpPr txBox="1"/>
           <p:nvPr>
             <p:ph type="title"/>
@@ -21506,7 +21572,7 @@
       </p:sp>
       <p:sp>
         <p:nvSpPr>
-          <p:cNvPr id="374" name="Google Shape;374;p54"/>
+          <p:cNvPr id="375" name="Google Shape;375;p54"/>
           <p:cNvSpPr txBox="1"/>
           <p:nvPr>
             <p:ph idx="12" type="sldNum"/>
@@ -21541,69 +21607,6 @@
               <a:t>‹#›</a:t>
             </a:fld>
             <a:endParaRPr/>
-          </a:p>
-        </p:txBody>
-      </p:sp>
-      <p:sp>
-        <p:nvSpPr>
-          <p:cNvPr id="375" name="Google Shape;375;p54"/>
-          <p:cNvSpPr txBox="1"/>
-          <p:nvPr/>
-        </p:nvSpPr>
-        <p:spPr>
-          <a:xfrm>
-            <a:off x="405900" y="579225"/>
-            <a:ext cx="8332200" cy="461700"/>
-          </a:xfrm>
-          <a:prstGeom prst="rect">
-            <a:avLst/>
-          </a:prstGeom>
-          <a:noFill/>
-          <a:ln>
-            <a:noFill/>
-          </a:ln>
-        </p:spPr>
-        <p:txBody>
-          <a:bodyPr anchorCtr="0" anchor="t" bIns="91425" lIns="91425" spcFirstLastPara="1" rIns="91425" wrap="square" tIns="91425">
-            <a:spAutoFit/>
-          </a:bodyPr>
-          <a:lstStyle/>
-          <a:p>
-            <a:pPr indent="-342900" lvl="0" marL="457200" rtl="0" algn="l">
-              <a:spcBef>
-                <a:spcPts val="0"/>
-              </a:spcBef>
-              <a:spcAft>
-                <a:spcPts val="0"/>
-              </a:spcAft>
-              <a:buSzPts val="1800"/>
-              <a:buFont typeface="Roboto"/>
-              <a:buChar char="●"/>
-            </a:pPr>
-            <a:r>
-              <a:rPr lang="en" sz="1800">
-                <a:latin typeface="Roboto"/>
-                <a:ea typeface="Roboto"/>
-                <a:cs typeface="Roboto"/>
-                <a:sym typeface="Roboto"/>
-              </a:rPr>
-              <a:t>What is the drawback of decision tree</a:t>
-            </a:r>
-            <a:r>
-              <a:rPr lang="en" sz="1800">
-                <a:latin typeface="Roboto"/>
-                <a:ea typeface="Roboto"/>
-                <a:cs typeface="Roboto"/>
-                <a:sym typeface="Roboto"/>
-              </a:rPr>
-              <a:t>?</a:t>
-            </a:r>
-            <a:endParaRPr sz="1800">
-              <a:latin typeface="Roboto"/>
-              <a:ea typeface="Roboto"/>
-              <a:cs typeface="Roboto"/>
-              <a:sym typeface="Roboto"/>
-            </a:endParaRPr>
           </a:p>
         </p:txBody>
       </p:sp>
@@ -21615,8 +21618,8 @@
         </p:nvSpPr>
         <p:spPr>
           <a:xfrm>
-            <a:off x="661900" y="1378950"/>
-            <a:ext cx="7143000" cy="400200"/>
+            <a:off x="405900" y="579225"/>
+            <a:ext cx="8332200" cy="461700"/>
           </a:xfrm>
           <a:prstGeom prst="rect">
             <a:avLst/>
@@ -21632,19 +21635,41 @@
           </a:bodyPr>
           <a:lstStyle/>
           <a:p>
-            <a:pPr indent="0" lvl="0" marL="0" rtl="0" algn="l">
-              <a:spcBef>
-                <a:spcPts val="0"/>
-              </a:spcBef>
-              <a:spcAft>
-                <a:spcPts val="0"/>
-              </a:spcAft>
-              <a:buNone/>
-            </a:pPr>
-            <a:r>
-              <a:t/>
-            </a:r>
-            <a:endParaRPr/>
+            <a:pPr indent="-342900" lvl="0" marL="457200" rtl="0" algn="l">
+              <a:spcBef>
+                <a:spcPts val="0"/>
+              </a:spcBef>
+              <a:spcAft>
+                <a:spcPts val="0"/>
+              </a:spcAft>
+              <a:buSzPts val="1800"/>
+              <a:buFont typeface="Roboto"/>
+              <a:buChar char="●"/>
+            </a:pPr>
+            <a:r>
+              <a:rPr lang="en" sz="1800">
+                <a:latin typeface="Roboto"/>
+                <a:ea typeface="Roboto"/>
+                <a:cs typeface="Roboto"/>
+                <a:sym typeface="Roboto"/>
+              </a:rPr>
+              <a:t>What is the drawback of decision tree</a:t>
+            </a:r>
+            <a:r>
+              <a:rPr lang="en" sz="1800">
+                <a:latin typeface="Roboto"/>
+                <a:ea typeface="Roboto"/>
+                <a:cs typeface="Roboto"/>
+                <a:sym typeface="Roboto"/>
+              </a:rPr>
+              <a:t>?</a:t>
+            </a:r>
+            <a:endParaRPr sz="1800">
+              <a:latin typeface="Roboto"/>
+              <a:ea typeface="Roboto"/>
+              <a:cs typeface="Roboto"/>
+              <a:sym typeface="Roboto"/>
+            </a:endParaRPr>
           </a:p>
         </p:txBody>
       </p:sp>
@@ -21656,8 +21681,8 @@
         </p:nvSpPr>
         <p:spPr>
           <a:xfrm>
-            <a:off x="548700" y="900500"/>
-            <a:ext cx="7694700" cy="1046700"/>
+            <a:off x="661900" y="1378950"/>
+            <a:ext cx="7143000" cy="400200"/>
           </a:xfrm>
           <a:prstGeom prst="rect">
             <a:avLst/>
@@ -21673,70 +21698,17 @@
           </a:bodyPr>
           <a:lstStyle/>
           <a:p>
-            <a:pPr indent="-317500" lvl="0" marL="457200" rtl="0" algn="l">
-              <a:spcBef>
-                <a:spcPts val="0"/>
-              </a:spcBef>
-              <a:spcAft>
-                <a:spcPts val="0"/>
-              </a:spcAft>
-              <a:buSzPts val="1400"/>
-              <a:buChar char="❏"/>
-            </a:pPr>
-            <a:r>
-              <a:rPr lang="en"/>
-              <a:t>Works for both regression and classification problems</a:t>
-            </a:r>
-            <a:endParaRPr/>
-          </a:p>
-          <a:p>
-            <a:pPr indent="-317500" lvl="0" marL="457200" rtl="0" algn="l">
-              <a:spcBef>
-                <a:spcPts val="0"/>
-              </a:spcBef>
-              <a:spcAft>
-                <a:spcPts val="0"/>
-              </a:spcAft>
-              <a:buSzPts val="1400"/>
-              <a:buChar char="❏"/>
-            </a:pPr>
-            <a:r>
-              <a:rPr lang="en"/>
-              <a:t>Works for both categorical and numerical data</a:t>
-            </a:r>
-            <a:endParaRPr/>
-          </a:p>
-          <a:p>
-            <a:pPr indent="-317500" lvl="0" marL="457200" rtl="0" algn="l">
-              <a:spcBef>
-                <a:spcPts val="0"/>
-              </a:spcBef>
-              <a:spcAft>
-                <a:spcPts val="0"/>
-              </a:spcAft>
-              <a:buSzPts val="1400"/>
-              <a:buChar char="❏"/>
-            </a:pPr>
-            <a:r>
-              <a:rPr lang="en"/>
-              <a:t>Results are interpretable</a:t>
-            </a:r>
-            <a:endParaRPr/>
-          </a:p>
-          <a:p>
-            <a:pPr indent="-317500" lvl="0" marL="457200" rtl="0" algn="l">
-              <a:spcBef>
-                <a:spcPts val="0"/>
-              </a:spcBef>
-              <a:spcAft>
-                <a:spcPts val="0"/>
-              </a:spcAft>
-              <a:buSzPts val="1400"/>
-              <a:buChar char="❏"/>
-            </a:pPr>
-            <a:r>
-              <a:rPr lang="en"/>
-              <a:t>Prone to overfitting</a:t>
+            <a:pPr indent="0" lvl="0" marL="0" rtl="0" algn="l">
+              <a:spcBef>
+                <a:spcPts val="0"/>
+              </a:spcBef>
+              <a:spcAft>
+                <a:spcPts val="0"/>
+              </a:spcAft>
+              <a:buNone/>
+            </a:pPr>
+            <a:r>
+              <a:t/>
             </a:r>
             <a:endParaRPr/>
           </a:p>
@@ -21750,8 +21722,8 @@
         </p:nvSpPr>
         <p:spPr>
           <a:xfrm>
-            <a:off x="405900" y="1821625"/>
-            <a:ext cx="8584800" cy="431100"/>
+            <a:off x="548700" y="900500"/>
+            <a:ext cx="7694700" cy="1046700"/>
           </a:xfrm>
           <a:prstGeom prst="rect">
             <a:avLst/>
@@ -21767,32 +21739,72 @@
           </a:bodyPr>
           <a:lstStyle/>
           <a:p>
-            <a:pPr indent="-330200" lvl="0" marL="457200" rtl="0" algn="l">
-              <a:spcBef>
-                <a:spcPts val="0"/>
-              </a:spcBef>
-              <a:spcAft>
-                <a:spcPts val="0"/>
-              </a:spcAft>
-              <a:buSzPts val="1600"/>
-              <a:buFont typeface="Roboto"/>
-              <a:buChar char="●"/>
-            </a:pPr>
-            <a:r>
-              <a:rPr lang="en" sz="1600">
-                <a:latin typeface="Roboto"/>
-                <a:ea typeface="Roboto"/>
-                <a:cs typeface="Roboto"/>
-                <a:sym typeface="Roboto"/>
-              </a:rPr>
-              <a:t>Which of the followings are most widely used metrics to assess a classification model?</a:t>
-            </a:r>
-            <a:endParaRPr sz="1600">
-              <a:latin typeface="Roboto"/>
-              <a:ea typeface="Roboto"/>
-              <a:cs typeface="Roboto"/>
-              <a:sym typeface="Roboto"/>
-            </a:endParaRPr>
+            <a:pPr indent="-317500" lvl="0" marL="457200" rtl="0" algn="l">
+              <a:spcBef>
+                <a:spcPts val="0"/>
+              </a:spcBef>
+              <a:spcAft>
+                <a:spcPts val="0"/>
+              </a:spcAft>
+              <a:buSzPts val="1400"/>
+              <a:buChar char="❏"/>
+            </a:pPr>
+            <a:r>
+              <a:rPr lang="en"/>
+              <a:t>Works for both regression and classification problems</a:t>
+            </a:r>
+            <a:endParaRPr/>
+          </a:p>
+          <a:p>
+            <a:pPr indent="-317500" lvl="0" marL="457200" rtl="0" algn="l">
+              <a:spcBef>
+                <a:spcPts val="0"/>
+              </a:spcBef>
+              <a:spcAft>
+                <a:spcPts val="0"/>
+              </a:spcAft>
+              <a:buSzPts val="1400"/>
+              <a:buChar char="❏"/>
+            </a:pPr>
+            <a:r>
+              <a:rPr lang="en"/>
+              <a:t>Works for both categorical and numerical data</a:t>
+            </a:r>
+            <a:endParaRPr/>
+          </a:p>
+          <a:p>
+            <a:pPr indent="-317500" lvl="0" marL="457200" rtl="0" algn="l">
+              <a:spcBef>
+                <a:spcPts val="0"/>
+              </a:spcBef>
+              <a:spcAft>
+                <a:spcPts val="0"/>
+              </a:spcAft>
+              <a:buSzPts val="1400"/>
+              <a:buChar char="❏"/>
+            </a:pPr>
+            <a:r>
+              <a:rPr lang="en"/>
+              <a:t>Results are interpretable</a:t>
+            </a:r>
+            <a:endParaRPr/>
+          </a:p>
+          <a:p>
+            <a:pPr indent="-317500" lvl="0" marL="457200" rtl="0" algn="l">
+              <a:spcBef>
+                <a:spcPts val="0"/>
+              </a:spcBef>
+              <a:spcAft>
+                <a:spcPts val="0"/>
+              </a:spcAft>
+              <a:buSzPts val="1400"/>
+              <a:buChar char="❏"/>
+            </a:pPr>
+            <a:r>
+              <a:rPr lang="en"/>
+              <a:t>Prone to overfitting</a:t>
+            </a:r>
+            <a:endParaRPr/>
           </a:p>
         </p:txBody>
       </p:sp>
@@ -21804,8 +21816,8 @@
         </p:nvSpPr>
         <p:spPr>
           <a:xfrm>
-            <a:off x="548700" y="2199288"/>
-            <a:ext cx="7694700" cy="1046700"/>
+            <a:off x="405900" y="1821625"/>
+            <a:ext cx="8584800" cy="431100"/>
           </a:xfrm>
           <a:prstGeom prst="rect">
             <a:avLst/>
@@ -21821,72 +21833,32 @@
           </a:bodyPr>
           <a:lstStyle/>
           <a:p>
-            <a:pPr indent="-317500" lvl="0" marL="457200" rtl="0" algn="l">
-              <a:spcBef>
-                <a:spcPts val="0"/>
-              </a:spcBef>
-              <a:spcAft>
-                <a:spcPts val="0"/>
-              </a:spcAft>
-              <a:buSzPts val="1400"/>
-              <a:buChar char="❏"/>
-            </a:pPr>
-            <a:r>
-              <a:rPr lang="en"/>
-              <a:t>Confusion matrix</a:t>
-            </a:r>
-            <a:endParaRPr/>
-          </a:p>
-          <a:p>
-            <a:pPr indent="-317500" lvl="0" marL="457200" rtl="0" algn="l">
-              <a:spcBef>
-                <a:spcPts val="0"/>
-              </a:spcBef>
-              <a:spcAft>
-                <a:spcPts val="0"/>
-              </a:spcAft>
-              <a:buSzPts val="1400"/>
-              <a:buChar char="❏"/>
-            </a:pPr>
-            <a:r>
-              <a:rPr lang="en"/>
-              <a:t>F1-score</a:t>
-            </a:r>
-            <a:endParaRPr/>
-          </a:p>
-          <a:p>
-            <a:pPr indent="-317500" lvl="0" marL="457200" rtl="0" algn="l">
-              <a:spcBef>
-                <a:spcPts val="0"/>
-              </a:spcBef>
-              <a:spcAft>
-                <a:spcPts val="0"/>
-              </a:spcAft>
-              <a:buSzPts val="1400"/>
-              <a:buChar char="❏"/>
-            </a:pPr>
-            <a:r>
-              <a:rPr lang="en"/>
-              <a:t>Area under the ROC curve</a:t>
-            </a:r>
-            <a:endParaRPr/>
-          </a:p>
-          <a:p>
-            <a:pPr indent="-317500" lvl="0" marL="457200" rtl="0" algn="l">
-              <a:spcBef>
-                <a:spcPts val="0"/>
-              </a:spcBef>
-              <a:spcAft>
-                <a:spcPts val="0"/>
-              </a:spcAft>
-              <a:buSzPts val="1400"/>
-              <a:buChar char="❏"/>
-            </a:pPr>
-            <a:r>
-              <a:rPr lang="en"/>
-              <a:t>All of the above</a:t>
-            </a:r>
-            <a:endParaRPr/>
+            <a:pPr indent="-330200" lvl="0" marL="457200" rtl="0" algn="l">
+              <a:spcBef>
+                <a:spcPts val="0"/>
+              </a:spcBef>
+              <a:spcAft>
+                <a:spcPts val="0"/>
+              </a:spcAft>
+              <a:buSzPts val="1600"/>
+              <a:buFont typeface="Roboto"/>
+              <a:buChar char="●"/>
+            </a:pPr>
+            <a:r>
+              <a:rPr lang="en" sz="1600">
+                <a:latin typeface="Roboto"/>
+                <a:ea typeface="Roboto"/>
+                <a:cs typeface="Roboto"/>
+                <a:sym typeface="Roboto"/>
+              </a:rPr>
+              <a:t>Which of the followings are widely used metrics to assess a classification model?</a:t>
+            </a:r>
+            <a:endParaRPr sz="1600">
+              <a:latin typeface="Roboto"/>
+              <a:ea typeface="Roboto"/>
+              <a:cs typeface="Roboto"/>
+              <a:sym typeface="Roboto"/>
+            </a:endParaRPr>
           </a:p>
         </p:txBody>
       </p:sp>
@@ -21898,8 +21870,8 @@
         </p:nvSpPr>
         <p:spPr>
           <a:xfrm>
-            <a:off x="405900" y="3197025"/>
-            <a:ext cx="8584800" cy="461700"/>
+            <a:off x="548700" y="2199288"/>
+            <a:ext cx="7694700" cy="1046700"/>
           </a:xfrm>
           <a:prstGeom prst="rect">
             <a:avLst/>
@@ -21915,32 +21887,72 @@
           </a:bodyPr>
           <a:lstStyle/>
           <a:p>
-            <a:pPr indent="-342900" lvl="0" marL="457200" rtl="0" algn="l">
-              <a:spcBef>
-                <a:spcPts val="0"/>
-              </a:spcBef>
-              <a:spcAft>
-                <a:spcPts val="0"/>
-              </a:spcAft>
-              <a:buSzPts val="1800"/>
-              <a:buFont typeface="Roboto"/>
-              <a:buChar char="●"/>
-            </a:pPr>
-            <a:r>
-              <a:rPr lang="en" sz="1800">
-                <a:latin typeface="Roboto"/>
-                <a:ea typeface="Roboto"/>
-                <a:cs typeface="Roboto"/>
-                <a:sym typeface="Roboto"/>
-              </a:rPr>
-              <a:t>Which of the following is not good for evaluating clustering algorithm?</a:t>
-            </a:r>
-            <a:endParaRPr sz="1800">
-              <a:latin typeface="Roboto"/>
-              <a:ea typeface="Roboto"/>
-              <a:cs typeface="Roboto"/>
-              <a:sym typeface="Roboto"/>
-            </a:endParaRPr>
+            <a:pPr indent="-317500" lvl="0" marL="457200" rtl="0" algn="l">
+              <a:spcBef>
+                <a:spcPts val="0"/>
+              </a:spcBef>
+              <a:spcAft>
+                <a:spcPts val="0"/>
+              </a:spcAft>
+              <a:buSzPts val="1400"/>
+              <a:buChar char="❏"/>
+            </a:pPr>
+            <a:r>
+              <a:rPr lang="en"/>
+              <a:t>Confusion matrix</a:t>
+            </a:r>
+            <a:endParaRPr/>
+          </a:p>
+          <a:p>
+            <a:pPr indent="-317500" lvl="0" marL="457200" rtl="0" algn="l">
+              <a:spcBef>
+                <a:spcPts val="0"/>
+              </a:spcBef>
+              <a:spcAft>
+                <a:spcPts val="0"/>
+              </a:spcAft>
+              <a:buSzPts val="1400"/>
+              <a:buChar char="❏"/>
+            </a:pPr>
+            <a:r>
+              <a:rPr lang="en"/>
+              <a:t>F1-score</a:t>
+            </a:r>
+            <a:endParaRPr/>
+          </a:p>
+          <a:p>
+            <a:pPr indent="-317500" lvl="0" marL="457200" rtl="0" algn="l">
+              <a:spcBef>
+                <a:spcPts val="0"/>
+              </a:spcBef>
+              <a:spcAft>
+                <a:spcPts val="0"/>
+              </a:spcAft>
+              <a:buSzPts val="1400"/>
+              <a:buChar char="❏"/>
+            </a:pPr>
+            <a:r>
+              <a:rPr lang="en"/>
+              <a:t>Area under the ROC curve</a:t>
+            </a:r>
+            <a:endParaRPr/>
+          </a:p>
+          <a:p>
+            <a:pPr indent="-317500" lvl="0" marL="457200" rtl="0" algn="l">
+              <a:spcBef>
+                <a:spcPts val="0"/>
+              </a:spcBef>
+              <a:spcAft>
+                <a:spcPts val="0"/>
+              </a:spcAft>
+              <a:buSzPts val="1400"/>
+              <a:buChar char="❏"/>
+            </a:pPr>
+            <a:r>
+              <a:rPr lang="en"/>
+              <a:t>All of the above</a:t>
+            </a:r>
+            <a:endParaRPr/>
           </a:p>
         </p:txBody>
       </p:sp>
@@ -21952,8 +21964,8 @@
         </p:nvSpPr>
         <p:spPr>
           <a:xfrm>
-            <a:off x="548700" y="3545488"/>
-            <a:ext cx="7694700" cy="1046700"/>
+            <a:off x="405900" y="3197025"/>
+            <a:ext cx="8584800" cy="461700"/>
           </a:xfrm>
           <a:prstGeom prst="rect">
             <a:avLst/>
@@ -21969,72 +21981,32 @@
           </a:bodyPr>
           <a:lstStyle/>
           <a:p>
-            <a:pPr indent="-317500" lvl="0" marL="457200" rtl="0" algn="l">
-              <a:spcBef>
-                <a:spcPts val="0"/>
-              </a:spcBef>
-              <a:spcAft>
-                <a:spcPts val="0"/>
-              </a:spcAft>
-              <a:buSzPts val="1400"/>
-              <a:buChar char="❏"/>
-            </a:pPr>
-            <a:r>
-              <a:rPr lang="en"/>
-              <a:t>Accuracy</a:t>
-            </a:r>
-            <a:endParaRPr/>
-          </a:p>
-          <a:p>
-            <a:pPr indent="-317500" lvl="0" marL="457200" rtl="0" algn="l">
-              <a:spcBef>
-                <a:spcPts val="0"/>
-              </a:spcBef>
-              <a:spcAft>
-                <a:spcPts val="0"/>
-              </a:spcAft>
-              <a:buSzPts val="1400"/>
-              <a:buChar char="❏"/>
-            </a:pPr>
-            <a:r>
-              <a:rPr lang="en"/>
-              <a:t>Homogeneity</a:t>
-            </a:r>
-            <a:endParaRPr/>
-          </a:p>
-          <a:p>
-            <a:pPr indent="-317500" lvl="0" marL="457200" rtl="0" algn="l">
-              <a:spcBef>
-                <a:spcPts val="0"/>
-              </a:spcBef>
-              <a:spcAft>
-                <a:spcPts val="0"/>
-              </a:spcAft>
-              <a:buSzPts val="1400"/>
-              <a:buChar char="❏"/>
-            </a:pPr>
-            <a:r>
-              <a:rPr lang="en"/>
-              <a:t>Completeness</a:t>
-            </a:r>
-            <a:endParaRPr/>
-          </a:p>
-          <a:p>
-            <a:pPr indent="-317500" lvl="0" marL="457200" rtl="0" algn="l">
-              <a:spcBef>
-                <a:spcPts val="0"/>
-              </a:spcBef>
-              <a:spcAft>
-                <a:spcPts val="0"/>
-              </a:spcAft>
-              <a:buSzPts val="1400"/>
-              <a:buChar char="❏"/>
-            </a:pPr>
-            <a:r>
-              <a:rPr lang="en"/>
-              <a:t>V-measure</a:t>
-            </a:r>
-            <a:endParaRPr/>
+            <a:pPr indent="-342900" lvl="0" marL="457200" rtl="0" algn="l">
+              <a:spcBef>
+                <a:spcPts val="0"/>
+              </a:spcBef>
+              <a:spcAft>
+                <a:spcPts val="0"/>
+              </a:spcAft>
+              <a:buSzPts val="1800"/>
+              <a:buFont typeface="Roboto"/>
+              <a:buChar char="●"/>
+            </a:pPr>
+            <a:r>
+              <a:rPr lang="en" sz="1800">
+                <a:latin typeface="Roboto"/>
+                <a:ea typeface="Roboto"/>
+                <a:cs typeface="Roboto"/>
+                <a:sym typeface="Roboto"/>
+              </a:rPr>
+              <a:t>Which of the following is not good for evaluating clustering algorithm?</a:t>
+            </a:r>
+            <a:endParaRPr sz="1800">
+              <a:latin typeface="Roboto"/>
+              <a:ea typeface="Roboto"/>
+              <a:cs typeface="Roboto"/>
+              <a:sym typeface="Roboto"/>
+            </a:endParaRPr>
           </a:p>
         </p:txBody>
       </p:sp>
@@ -22046,8 +22018,8 @@
         </p:nvSpPr>
         <p:spPr>
           <a:xfrm>
-            <a:off x="661900" y="1499600"/>
-            <a:ext cx="427500" cy="400200"/>
+            <a:off x="548700" y="3545488"/>
+            <a:ext cx="7694700" cy="1046700"/>
           </a:xfrm>
           <a:prstGeom prst="rect">
             <a:avLst/>
@@ -22063,18 +22035,70 @@
           </a:bodyPr>
           <a:lstStyle/>
           <a:p>
-            <a:pPr indent="0" lvl="0" marL="0" rtl="0" algn="l">
-              <a:spcBef>
-                <a:spcPts val="0"/>
-              </a:spcBef>
-              <a:spcAft>
-                <a:spcPts val="0"/>
-              </a:spcAft>
-              <a:buNone/>
+            <a:pPr indent="-317500" lvl="0" marL="457200" rtl="0" algn="l">
+              <a:spcBef>
+                <a:spcPts val="0"/>
+              </a:spcBef>
+              <a:spcAft>
+                <a:spcPts val="0"/>
+              </a:spcAft>
+              <a:buSzPts val="1400"/>
+              <a:buChar char="❏"/>
             </a:pPr>
             <a:r>
               <a:rPr lang="en"/>
-              <a:t>✔</a:t>
+              <a:t>Accuracy</a:t>
+            </a:r>
+            <a:endParaRPr/>
+          </a:p>
+          <a:p>
+            <a:pPr indent="-317500" lvl="0" marL="457200" rtl="0" algn="l">
+              <a:spcBef>
+                <a:spcPts val="0"/>
+              </a:spcBef>
+              <a:spcAft>
+                <a:spcPts val="0"/>
+              </a:spcAft>
+              <a:buSzPts val="1400"/>
+              <a:buChar char="❏"/>
+            </a:pPr>
+            <a:r>
+              <a:rPr lang="en"/>
+              <a:t>Homogeneity</a:t>
+            </a:r>
+            <a:endParaRPr/>
+          </a:p>
+          <a:p>
+            <a:pPr indent="-317500" lvl="0" marL="457200" rtl="0" algn="l">
+              <a:spcBef>
+                <a:spcPts val="0"/>
+              </a:spcBef>
+              <a:spcAft>
+                <a:spcPts val="0"/>
+              </a:spcAft>
+              <a:buSzPts val="1400"/>
+              <a:buChar char="❏"/>
+            </a:pPr>
+            <a:r>
+              <a:rPr lang="en"/>
+              <a:t>Completeness</a:t>
+            </a:r>
+            <a:endParaRPr/>
+          </a:p>
+          <a:p>
+            <a:pPr indent="-317500" lvl="0" marL="457200" rtl="0" algn="l">
+              <a:spcBef>
+                <a:spcPts val="0"/>
+              </a:spcBef>
+              <a:spcAft>
+                <a:spcPts val="0"/>
+              </a:spcAft>
+              <a:buSzPts val="1400"/>
+              <a:buChar char="❏"/>
+            </a:pPr>
+            <a:r>
+              <a:rPr lang="en"/>
+              <a:t>V-measure</a:t>
             </a:r>
             <a:endParaRPr/>
           </a:p>
@@ -22088,7 +22112,7 @@
         </p:nvSpPr>
         <p:spPr>
           <a:xfrm>
-            <a:off x="661900" y="2835900"/>
+            <a:off x="661900" y="1499600"/>
             <a:ext cx="427500" cy="400200"/>
           </a:xfrm>
           <a:prstGeom prst="rect">
@@ -22125,6 +22149,48 @@
       <p:sp>
         <p:nvSpPr>
           <p:cNvPr id="384" name="Google Shape;384;p54"/>
+          <p:cNvSpPr txBox="1"/>
+          <p:nvPr/>
+        </p:nvSpPr>
+        <p:spPr>
+          <a:xfrm>
+            <a:off x="661900" y="2835900"/>
+            <a:ext cx="427500" cy="400200"/>
+          </a:xfrm>
+          <a:prstGeom prst="rect">
+            <a:avLst/>
+          </a:prstGeom>
+          <a:noFill/>
+          <a:ln>
+            <a:noFill/>
+          </a:ln>
+        </p:spPr>
+        <p:txBody>
+          <a:bodyPr anchorCtr="0" anchor="t" bIns="91425" lIns="91425" spcFirstLastPara="1" rIns="91425" wrap="square" tIns="91425">
+            <a:spAutoFit/>
+          </a:bodyPr>
+          <a:lstStyle/>
+          <a:p>
+            <a:pPr indent="0" lvl="0" marL="0" rtl="0" algn="l">
+              <a:spcBef>
+                <a:spcPts val="0"/>
+              </a:spcBef>
+              <a:spcAft>
+                <a:spcPts val="0"/>
+              </a:spcAft>
+              <a:buNone/>
+            </a:pPr>
+            <a:r>
+              <a:rPr lang="en"/>
+              <a:t>✔</a:t>
+            </a:r>
+            <a:endParaRPr/>
+          </a:p>
+        </p:txBody>
+      </p:sp>
+      <p:sp>
+        <p:nvSpPr>
+          <p:cNvPr id="385" name="Google Shape;385;p54"/>
           <p:cNvSpPr txBox="1"/>
           <p:nvPr/>
         </p:nvSpPr>
@@ -22177,59 +22243,6 @@
             <p:seq concurrent="1" nextAc="seek">
               <p:cTn dur="indefinite" id="2" nodeType="mainSeq">
                 <p:childTnLst>
-                  <p:par>
-                    <p:cTn fill="hold">
-                      <p:stCondLst>
-                        <p:cond delay="indefinite"/>
-                      </p:stCondLst>
-                      <p:childTnLst>
-                        <p:par>
-                          <p:cTn fill="hold">
-                            <p:stCondLst>
-                              <p:cond delay="0"/>
-                            </p:stCondLst>
-                            <p:childTnLst>
-                              <p:par>
-                                <p:cTn fill="hold" nodeType="clickEffect" presetClass="entr" presetID="10" presetSubtype="0">
-                                  <p:stCondLst>
-                                    <p:cond delay="0"/>
-                                  </p:stCondLst>
-                                  <p:childTnLst>
-                                    <p:set>
-                                      <p:cBhvr>
-                                        <p:cTn dur="1" fill="hold">
-                                          <p:stCondLst>
-                                            <p:cond delay="0"/>
-                                          </p:stCondLst>
-                                        </p:cTn>
-                                        <p:tgtEl>
-                                          <p:spTgt spid="382"/>
-                                        </p:tgtEl>
-                                        <p:attrNameLst>
-                                          <p:attrName>style.visibility</p:attrName>
-                                        </p:attrNameLst>
-                                      </p:cBhvr>
-                                      <p:to>
-                                        <p:strVal val="visible"/>
-                                      </p:to>
-                                    </p:set>
-                                    <p:animEffect filter="fade" transition="in">
-                                      <p:cBhvr>
-                                        <p:cTn dur="1000"/>
-                                        <p:tgtEl>
-                                          <p:spTgt spid="382"/>
-                                        </p:tgtEl>
-                                      </p:cBhvr>
-                                    </p:animEffect>
-                                  </p:childTnLst>
-                                </p:cTn>
-                              </p:par>
-                            </p:childTnLst>
-                          </p:cTn>
-                        </p:par>
-                      </p:childTnLst>
-                    </p:cTn>
-                  </p:par>
                   <p:par>
                     <p:cTn fill="hold">
                       <p:stCondLst>
@@ -22336,6 +22349,59 @@
                       </p:childTnLst>
                     </p:cTn>
                   </p:par>
+                  <p:par>
+                    <p:cTn fill="hold">
+                      <p:stCondLst>
+                        <p:cond delay="indefinite"/>
+                      </p:stCondLst>
+                      <p:childTnLst>
+                        <p:par>
+                          <p:cTn fill="hold">
+                            <p:stCondLst>
+                              <p:cond delay="0"/>
+                            </p:stCondLst>
+                            <p:childTnLst>
+                              <p:par>
+                                <p:cTn fill="hold" nodeType="clickEffect" presetClass="entr" presetID="10" presetSubtype="0">
+                                  <p:stCondLst>
+                                    <p:cond delay="0"/>
+                                  </p:stCondLst>
+                                  <p:childTnLst>
+                                    <p:set>
+                                      <p:cBhvr>
+                                        <p:cTn dur="1" fill="hold">
+                                          <p:stCondLst>
+                                            <p:cond delay="0"/>
+                                          </p:stCondLst>
+                                        </p:cTn>
+                                        <p:tgtEl>
+                                          <p:spTgt spid="385"/>
+                                        </p:tgtEl>
+                                        <p:attrNameLst>
+                                          <p:attrName>style.visibility</p:attrName>
+                                        </p:attrNameLst>
+                                      </p:cBhvr>
+                                      <p:to>
+                                        <p:strVal val="visible"/>
+                                      </p:to>
+                                    </p:set>
+                                    <p:animEffect filter="fade" transition="in">
+                                      <p:cBhvr>
+                                        <p:cTn dur="1000"/>
+                                        <p:tgtEl>
+                                          <p:spTgt spid="385"/>
+                                        </p:tgtEl>
+                                      </p:cBhvr>
+                                    </p:animEffect>
+                                  </p:childTnLst>
+                                </p:cTn>
+                              </p:par>
+                            </p:childTnLst>
+                          </p:cTn>
+                        </p:par>
+                      </p:childTnLst>
+                    </p:cTn>
+                  </p:par>
                 </p:childTnLst>
               </p:cTn>
               <p:prevCondLst>
@@ -22366,7 +22432,7 @@
   <p:cSld>
     <p:spTree>
       <p:nvGrpSpPr>
-        <p:cNvPr id="388" name="Shape 388"/>
+        <p:cNvPr id="389" name="Shape 389"/>
         <p:cNvGrpSpPr/>
         <p:nvPr/>
       </p:nvGrpSpPr>
@@ -22380,7 +22446,7 @@
       </p:grpSpPr>
       <p:pic>
         <p:nvPicPr>
-          <p:cNvPr id="389" name="Google Shape;389;p55"/>
+          <p:cNvPr id="390" name="Google Shape;390;p55"/>
           <p:cNvPicPr preferRelativeResize="0"/>
           <p:nvPr/>
         </p:nvPicPr>
@@ -22407,7 +22473,7 @@
       </p:pic>
       <p:sp>
         <p:nvSpPr>
-          <p:cNvPr id="390" name="Google Shape;390;p55"/>
+          <p:cNvPr id="391" name="Google Shape;391;p55"/>
           <p:cNvSpPr txBox="1"/>
           <p:nvPr>
             <p:ph type="title"/>
@@ -22455,7 +22521,7 @@
       </p:sp>
       <p:sp>
         <p:nvSpPr>
-          <p:cNvPr id="391" name="Google Shape;391;p55"/>
+          <p:cNvPr id="392" name="Google Shape;392;p55"/>
           <p:cNvSpPr txBox="1"/>
           <p:nvPr/>
         </p:nvSpPr>
@@ -22541,7 +22607,7 @@
       </p:sp>
       <p:sp>
         <p:nvSpPr>
-          <p:cNvPr id="392" name="Google Shape;392;p55"/>
+          <p:cNvPr id="393" name="Google Shape;393;p55"/>
           <p:cNvSpPr txBox="1"/>
           <p:nvPr>
             <p:ph idx="12" type="sldNum"/>
@@ -22608,7 +22674,7 @@
   <p:cSld>
     <p:spTree>
       <p:nvGrpSpPr>
-        <p:cNvPr id="122" name="Shape 122"/>
+        <p:cNvPr id="123" name="Shape 123"/>
         <p:cNvGrpSpPr/>
         <p:nvPr/>
       </p:nvGrpSpPr>
@@ -22622,7 +22688,7 @@
       </p:grpSpPr>
       <p:pic>
         <p:nvPicPr>
-          <p:cNvPr id="123" name="Google Shape;123;p28"/>
+          <p:cNvPr id="124" name="Google Shape;124;p28"/>
           <p:cNvPicPr preferRelativeResize="0"/>
           <p:nvPr/>
         </p:nvPicPr>
@@ -22649,7 +22715,7 @@
       </p:pic>
       <p:sp>
         <p:nvSpPr>
-          <p:cNvPr id="124" name="Google Shape;124;p28"/>
+          <p:cNvPr id="125" name="Google Shape;125;p28"/>
           <p:cNvSpPr txBox="1"/>
           <p:nvPr>
             <p:ph type="title"/>
@@ -22697,7 +22763,7 @@
       </p:sp>
       <p:sp>
         <p:nvSpPr>
-          <p:cNvPr id="125" name="Google Shape;125;p28"/>
+          <p:cNvPr id="126" name="Google Shape;126;p28"/>
           <p:cNvSpPr txBox="1"/>
           <p:nvPr/>
         </p:nvSpPr>
@@ -23180,7 +23246,7 @@
       </p:sp>
       <p:sp>
         <p:nvSpPr>
-          <p:cNvPr id="126" name="Google Shape;126;p28"/>
+          <p:cNvPr id="127" name="Google Shape;127;p28"/>
           <p:cNvSpPr txBox="1"/>
           <p:nvPr>
             <p:ph idx="12" type="sldNum"/>
@@ -23239,7 +23305,7 @@
   <p:cSld>
     <p:spTree>
       <p:nvGrpSpPr>
-        <p:cNvPr id="130" name="Shape 130"/>
+        <p:cNvPr id="131" name="Shape 131"/>
         <p:cNvGrpSpPr/>
         <p:nvPr/>
       </p:nvGrpSpPr>
@@ -23253,7 +23319,7 @@
       </p:grpSpPr>
       <p:pic>
         <p:nvPicPr>
-          <p:cNvPr id="131" name="Google Shape;131;p29"/>
+          <p:cNvPr id="132" name="Google Shape;132;p29"/>
           <p:cNvPicPr preferRelativeResize="0"/>
           <p:nvPr/>
         </p:nvPicPr>
@@ -23280,7 +23346,7 @@
       </p:pic>
       <p:sp>
         <p:nvSpPr>
-          <p:cNvPr id="132" name="Google Shape;132;p29"/>
+          <p:cNvPr id="133" name="Google Shape;133;p29"/>
           <p:cNvSpPr txBox="1"/>
           <p:nvPr>
             <p:ph type="title"/>
@@ -23328,7 +23394,7 @@
       </p:sp>
       <p:sp>
         <p:nvSpPr>
-          <p:cNvPr id="133" name="Google Shape;133;p29"/>
+          <p:cNvPr id="134" name="Google Shape;134;p29"/>
           <p:cNvSpPr txBox="1"/>
           <p:nvPr/>
         </p:nvSpPr>
@@ -23492,7 +23558,7 @@
       </p:sp>
       <p:sp>
         <p:nvSpPr>
-          <p:cNvPr id="134" name="Google Shape;134;p29"/>
+          <p:cNvPr id="135" name="Google Shape;135;p29"/>
           <p:cNvSpPr txBox="1"/>
           <p:nvPr>
             <p:ph idx="12" type="sldNum"/>
@@ -23540,7 +23606,7 @@
       </p:sp>
       <p:pic>
         <p:nvPicPr>
-          <p:cNvPr id="135" name="Google Shape;135;p29"/>
+          <p:cNvPr id="136" name="Google Shape;136;p29"/>
           <p:cNvPicPr preferRelativeResize="0"/>
           <p:nvPr/>
         </p:nvPicPr>
@@ -23578,7 +23644,7 @@
   <p:cSld>
     <p:spTree>
       <p:nvGrpSpPr>
-        <p:cNvPr id="139" name="Shape 139"/>
+        <p:cNvPr id="140" name="Shape 140"/>
         <p:cNvGrpSpPr/>
         <p:nvPr/>
       </p:nvGrpSpPr>
@@ -23592,7 +23658,7 @@
       </p:grpSpPr>
       <p:pic>
         <p:nvPicPr>
-          <p:cNvPr id="140" name="Google Shape;140;p30"/>
+          <p:cNvPr id="141" name="Google Shape;141;p30"/>
           <p:cNvPicPr preferRelativeResize="0"/>
           <p:nvPr/>
         </p:nvPicPr>
@@ -23619,7 +23685,7 @@
       </p:pic>
       <p:sp>
         <p:nvSpPr>
-          <p:cNvPr id="141" name="Google Shape;141;p30"/>
+          <p:cNvPr id="142" name="Google Shape;142;p30"/>
           <p:cNvSpPr txBox="1"/>
           <p:nvPr>
             <p:ph type="title"/>
@@ -23667,7 +23733,7 @@
       </p:sp>
       <p:sp>
         <p:nvSpPr>
-          <p:cNvPr id="142" name="Google Shape;142;p30"/>
+          <p:cNvPr id="143" name="Google Shape;143;p30"/>
           <p:cNvSpPr txBox="1"/>
           <p:nvPr/>
         </p:nvSpPr>
@@ -23753,7 +23819,7 @@
       </p:sp>
       <p:sp>
         <p:nvSpPr>
-          <p:cNvPr id="143" name="Google Shape;143;p30"/>
+          <p:cNvPr id="144" name="Google Shape;144;p30"/>
           <p:cNvSpPr txBox="1"/>
           <p:nvPr>
             <p:ph idx="12" type="sldNum"/>
@@ -23809,7 +23875,7 @@
       </p:sp>
       <p:pic>
         <p:nvPicPr>
-          <p:cNvPr id="144" name="Google Shape;144;p30"/>
+          <p:cNvPr id="145" name="Google Shape;145;p30"/>
           <p:cNvPicPr preferRelativeResize="0"/>
           <p:nvPr/>
         </p:nvPicPr>
@@ -23823,8 +23889,8 @@
         </p:blipFill>
         <p:spPr>
           <a:xfrm>
-            <a:off x="4509212" y="2259975"/>
-            <a:ext cx="3951212" cy="2133550"/>
+            <a:off x="4311275" y="2155575"/>
+            <a:ext cx="4749375" cy="2442200"/>
           </a:xfrm>
           <a:prstGeom prst="rect">
             <a:avLst/>
@@ -23837,7 +23903,7 @@
       </p:pic>
       <p:sp>
         <p:nvSpPr>
-          <p:cNvPr id="145" name="Google Shape;145;p30"/>
+          <p:cNvPr id="146" name="Google Shape;146;p30"/>
           <p:cNvSpPr txBox="1"/>
           <p:nvPr/>
         </p:nvSpPr>
@@ -23889,13 +23955,13 @@
       </p:sp>
       <p:sp>
         <p:nvSpPr>
-          <p:cNvPr id="146" name="Google Shape;146;p30"/>
+          <p:cNvPr id="147" name="Google Shape;147;p30"/>
           <p:cNvSpPr txBox="1"/>
           <p:nvPr/>
         </p:nvSpPr>
         <p:spPr>
           <a:xfrm>
-            <a:off x="311700" y="2397200"/>
+            <a:off x="311700" y="2289250"/>
             <a:ext cx="4086000" cy="1569900"/>
           </a:xfrm>
           <a:prstGeom prst="rect">
@@ -23943,7 +24009,7 @@
   <p:cSld>
     <p:spTree>
       <p:nvGrpSpPr>
-        <p:cNvPr id="150" name="Shape 150"/>
+        <p:cNvPr id="151" name="Shape 151"/>
         <p:cNvGrpSpPr/>
         <p:nvPr/>
       </p:nvGrpSpPr>
@@ -23957,7 +24023,7 @@
       </p:grpSpPr>
       <p:pic>
         <p:nvPicPr>
-          <p:cNvPr id="151" name="Google Shape;151;p31"/>
+          <p:cNvPr id="152" name="Google Shape;152;p31"/>
           <p:cNvPicPr preferRelativeResize="0"/>
           <p:nvPr/>
         </p:nvPicPr>
@@ -23984,7 +24050,7 @@
       </p:pic>
       <p:sp>
         <p:nvSpPr>
-          <p:cNvPr id="152" name="Google Shape;152;p31"/>
+          <p:cNvPr id="153" name="Google Shape;153;p31"/>
           <p:cNvSpPr txBox="1"/>
           <p:nvPr>
             <p:ph type="title"/>
@@ -24040,7 +24106,7 @@
       </p:sp>
       <p:sp>
         <p:nvSpPr>
-          <p:cNvPr id="153" name="Google Shape;153;p31"/>
+          <p:cNvPr id="154" name="Google Shape;154;p31"/>
           <p:cNvSpPr txBox="1"/>
           <p:nvPr/>
         </p:nvSpPr>
@@ -24246,7 +24312,7 @@
       </p:sp>
       <p:sp>
         <p:nvSpPr>
-          <p:cNvPr id="154" name="Google Shape;154;p31"/>
+          <p:cNvPr id="155" name="Google Shape;155;p31"/>
           <p:cNvSpPr txBox="1"/>
           <p:nvPr>
             <p:ph idx="12" type="sldNum"/>
@@ -24313,7 +24379,7 @@
   <p:cSld>
     <p:spTree>
       <p:nvGrpSpPr>
-        <p:cNvPr id="158" name="Shape 158"/>
+        <p:cNvPr id="159" name="Shape 159"/>
         <p:cNvGrpSpPr/>
         <p:nvPr/>
       </p:nvGrpSpPr>
@@ -24327,7 +24393,7 @@
       </p:grpSpPr>
       <p:pic>
         <p:nvPicPr>
-          <p:cNvPr id="159" name="Google Shape;159;p32"/>
+          <p:cNvPr id="160" name="Google Shape;160;p32"/>
           <p:cNvPicPr preferRelativeResize="0"/>
           <p:nvPr/>
         </p:nvPicPr>
@@ -24354,7 +24420,7 @@
       </p:pic>
       <p:sp>
         <p:nvSpPr>
-          <p:cNvPr id="160" name="Google Shape;160;p32"/>
+          <p:cNvPr id="161" name="Google Shape;161;p32"/>
           <p:cNvSpPr txBox="1"/>
           <p:nvPr>
             <p:ph type="title"/>
@@ -24410,14 +24476,14 @@
       </p:sp>
       <p:sp>
         <p:nvSpPr>
-          <p:cNvPr id="161" name="Google Shape;161;p32"/>
+          <p:cNvPr id="162" name="Google Shape;162;p32"/>
           <p:cNvSpPr txBox="1"/>
           <p:nvPr/>
         </p:nvSpPr>
         <p:spPr>
           <a:xfrm>
             <a:off x="4572000" y="643275"/>
-            <a:ext cx="4437000" cy="3867300"/>
+            <a:ext cx="4437000" cy="3336300"/>
           </a:xfrm>
           <a:prstGeom prst="rect">
             <a:avLst/>
@@ -24548,47 +24614,7 @@
             </a:pPr>
             <a:r>
               <a:rPr lang="en" sz="1500"/>
-              <a:t>Sales estimates</a:t>
-            </a:r>
-            <a:endParaRPr sz="1500"/>
-          </a:p>
-          <a:p>
-            <a:pPr indent="-323850" lvl="1" marL="914400" rtl="0" algn="l">
-              <a:lnSpc>
-                <a:spcPct val="115000"/>
-              </a:lnSpc>
-              <a:spcBef>
-                <a:spcPts val="0"/>
-              </a:spcBef>
-              <a:spcAft>
-                <a:spcPts val="0"/>
-              </a:spcAft>
-              <a:buSzPts val="1500"/>
-              <a:buChar char="○"/>
-            </a:pPr>
-            <a:r>
-              <a:rPr lang="en" sz="1500"/>
-              <a:t>Salary forecasting</a:t>
-            </a:r>
-            <a:endParaRPr sz="1500"/>
-          </a:p>
-          <a:p>
-            <a:pPr indent="-323850" lvl="1" marL="914400" rtl="0" algn="l">
-              <a:lnSpc>
-                <a:spcPct val="115000"/>
-              </a:lnSpc>
-              <a:spcBef>
-                <a:spcPts val="0"/>
-              </a:spcBef>
-              <a:spcAft>
-                <a:spcPts val="0"/>
-              </a:spcAft>
-              <a:buSzPts val="1500"/>
-              <a:buChar char="○"/>
-            </a:pPr>
-            <a:r>
-              <a:rPr lang="en" sz="1500"/>
-              <a:t>Real estate prediction</a:t>
+              <a:t>Forecasting/prediction</a:t>
             </a:r>
             <a:endParaRPr sz="1500"/>
           </a:p>
@@ -24596,7 +24622,7 @@
       </p:sp>
       <p:sp>
         <p:nvSpPr>
-          <p:cNvPr id="162" name="Google Shape;162;p32"/>
+          <p:cNvPr id="163" name="Google Shape;163;p32"/>
           <p:cNvSpPr txBox="1"/>
           <p:nvPr>
             <p:ph idx="12" type="sldNum"/>
@@ -24652,7 +24678,7 @@
       </p:sp>
       <p:pic>
         <p:nvPicPr>
-          <p:cNvPr id="163" name="Google Shape;163;p32"/>
+          <p:cNvPr id="164" name="Google Shape;164;p32"/>
           <p:cNvPicPr preferRelativeResize="0"/>
           <p:nvPr/>
         </p:nvPicPr>
@@ -24680,7 +24706,7 @@
       </p:pic>
       <p:sp>
         <p:nvSpPr>
-          <p:cNvPr id="164" name="Google Shape;164;p32"/>
+          <p:cNvPr id="165" name="Google Shape;165;p32"/>
           <p:cNvSpPr txBox="1"/>
           <p:nvPr/>
         </p:nvSpPr>
@@ -24743,7 +24769,7 @@
   <p:cSld>
     <p:spTree>
       <p:nvGrpSpPr>
-        <p:cNvPr id="168" name="Shape 168"/>
+        <p:cNvPr id="169" name="Shape 169"/>
         <p:cNvGrpSpPr/>
         <p:nvPr/>
       </p:nvGrpSpPr>
@@ -24757,7 +24783,7 @@
       </p:grpSpPr>
       <p:pic>
         <p:nvPicPr>
-          <p:cNvPr id="169" name="Google Shape;169;p33"/>
+          <p:cNvPr id="170" name="Google Shape;170;p33"/>
           <p:cNvPicPr preferRelativeResize="0"/>
           <p:nvPr/>
         </p:nvPicPr>
@@ -24784,7 +24810,7 @@
       </p:pic>
       <p:sp>
         <p:nvSpPr>
-          <p:cNvPr id="170" name="Google Shape;170;p33"/>
+          <p:cNvPr id="171" name="Google Shape;171;p33"/>
           <p:cNvSpPr txBox="1"/>
           <p:nvPr>
             <p:ph type="title"/>
@@ -24832,7 +24858,7 @@
       </p:sp>
       <p:sp>
         <p:nvSpPr>
-          <p:cNvPr id="171" name="Google Shape;171;p33"/>
+          <p:cNvPr id="172" name="Google Shape;172;p33"/>
           <p:cNvSpPr txBox="1"/>
           <p:nvPr/>
         </p:nvSpPr>
@@ -24926,7 +24952,7 @@
       </p:sp>
       <p:sp>
         <p:nvSpPr>
-          <p:cNvPr id="172" name="Google Shape;172;p33"/>
+          <p:cNvPr id="173" name="Google Shape;173;p33"/>
           <p:cNvSpPr txBox="1"/>
           <p:nvPr>
             <p:ph idx="12" type="sldNum"/>
@@ -24982,7 +25008,7 @@
       </p:sp>
       <p:sp>
         <p:nvSpPr>
-          <p:cNvPr id="173" name="Google Shape;173;p33"/>
+          <p:cNvPr id="174" name="Google Shape;174;p33"/>
           <p:cNvSpPr txBox="1"/>
           <p:nvPr/>
         </p:nvSpPr>
@@ -25034,7 +25060,7 @@
       </p:sp>
       <p:pic>
         <p:nvPicPr>
-          <p:cNvPr id="174" name="Google Shape;174;p33"/>
+          <p:cNvPr id="175" name="Google Shape;175;p33"/>
           <p:cNvPicPr preferRelativeResize="0"/>
           <p:nvPr/>
         </p:nvPicPr>

</xml_diff>

<commit_message>
update Day 4 contents before day 4 workshop
</commit_message>
<xml_diff>
--- a/Day_4/Lectures/Day_4_Lecture_1_ML_Models_and_Model_Evaluation.pptx
+++ b/Day_4/Lectures/Day_4_Lecture_1_ML_Models_and_Model_Evaluation.pptx
@@ -3054,7 +3054,7 @@
   <p:cSld>
     <p:spTree>
       <p:nvGrpSpPr>
-        <p:cNvPr id="366" name="Shape 366"/>
+        <p:cNvPr id="367" name="Shape 367"/>
         <p:cNvGrpSpPr/>
         <p:nvPr/>
       </p:nvGrpSpPr>
@@ -3068,7 +3068,7 @@
       </p:grpSpPr>
       <p:sp>
         <p:nvSpPr>
-          <p:cNvPr id="367" name="Google Shape;367;g131a5be19e5_26_29:notes"/>
+          <p:cNvPr id="368" name="Google Shape;368;g131a5be19e5_26_29:notes"/>
           <p:cNvSpPr/>
           <p:nvPr>
             <p:ph idx="2" type="sldImg"/>
@@ -3103,7 +3103,7 @@
       </p:sp>
       <p:sp>
         <p:nvSpPr>
-          <p:cNvPr id="368" name="Google Shape;368;g131a5be19e5_26_29:notes"/>
+          <p:cNvPr id="369" name="Google Shape;369;g131a5be19e5_26_29:notes"/>
           <p:cNvSpPr txBox="1"/>
           <p:nvPr>
             <p:ph idx="1" type="body"/>
@@ -3153,7 +3153,7 @@
   <p:cSld>
     <p:spTree>
       <p:nvGrpSpPr>
-        <p:cNvPr id="376" name="Shape 376"/>
+        <p:cNvPr id="377" name="Shape 377"/>
         <p:cNvGrpSpPr/>
         <p:nvPr/>
       </p:nvGrpSpPr>
@@ -3167,7 +3167,7 @@
       </p:grpSpPr>
       <p:sp>
         <p:nvSpPr>
-          <p:cNvPr id="377" name="Google Shape;377;g1113c07b4bc_0_272:notes"/>
+          <p:cNvPr id="378" name="Google Shape;378;g1113c07b4bc_0_272:notes"/>
           <p:cNvSpPr/>
           <p:nvPr>
             <p:ph idx="2" type="sldImg"/>
@@ -3202,7 +3202,7 @@
       </p:sp>
       <p:sp>
         <p:nvSpPr>
-          <p:cNvPr id="378" name="Google Shape;378;g1113c07b4bc_0_272:notes"/>
+          <p:cNvPr id="379" name="Google Shape;379;g1113c07b4bc_0_272:notes"/>
           <p:cNvSpPr txBox="1"/>
           <p:nvPr>
             <p:ph idx="1" type="body"/>
@@ -3252,7 +3252,7 @@
   <p:cSld>
     <p:spTree>
       <p:nvGrpSpPr>
-        <p:cNvPr id="387" name="Shape 387"/>
+        <p:cNvPr id="388" name="Shape 388"/>
         <p:cNvGrpSpPr/>
         <p:nvPr/>
       </p:nvGrpSpPr>
@@ -3266,7 +3266,7 @@
       </p:grpSpPr>
       <p:sp>
         <p:nvSpPr>
-          <p:cNvPr id="388" name="Google Shape;388;g1113c07b4bc_0_260:notes"/>
+          <p:cNvPr id="389" name="Google Shape;389;g1113c07b4bc_0_260:notes"/>
           <p:cNvSpPr/>
           <p:nvPr>
             <p:ph idx="2" type="sldImg"/>
@@ -3301,7 +3301,7 @@
       </p:sp>
       <p:sp>
         <p:nvSpPr>
-          <p:cNvPr id="389" name="Google Shape;389;g1113c07b4bc_0_260:notes"/>
+          <p:cNvPr id="390" name="Google Shape;390;g1113c07b4bc_0_260:notes"/>
           <p:cNvSpPr txBox="1"/>
           <p:nvPr>
             <p:ph idx="1" type="body"/>
@@ -3450,7 +3450,7 @@
   <p:cSld>
     <p:spTree>
       <p:nvGrpSpPr>
-        <p:cNvPr id="395" name="Shape 395"/>
+        <p:cNvPr id="396" name="Shape 396"/>
         <p:cNvGrpSpPr/>
         <p:nvPr/>
       </p:nvGrpSpPr>
@@ -3464,7 +3464,7 @@
       </p:grpSpPr>
       <p:sp>
         <p:nvSpPr>
-          <p:cNvPr id="396" name="Google Shape;396;g127096e7529_0_0:notes"/>
+          <p:cNvPr id="397" name="Google Shape;397;g127096e7529_0_0:notes"/>
           <p:cNvSpPr/>
           <p:nvPr>
             <p:ph idx="2" type="sldImg"/>
@@ -3499,7 +3499,7 @@
       </p:sp>
       <p:sp>
         <p:nvSpPr>
-          <p:cNvPr id="397" name="Google Shape;397;g127096e7529_0_0:notes"/>
+          <p:cNvPr id="398" name="Google Shape;398;g127096e7529_0_0:notes"/>
           <p:cNvSpPr txBox="1"/>
           <p:nvPr>
             <p:ph idx="1" type="body"/>
@@ -3549,7 +3549,7 @@
   <p:cSld>
     <p:spTree>
       <p:nvGrpSpPr>
-        <p:cNvPr id="414" name="Shape 414"/>
+        <p:cNvPr id="415" name="Shape 415"/>
         <p:cNvGrpSpPr/>
         <p:nvPr/>
       </p:nvGrpSpPr>
@@ -3563,7 +3563,7 @@
       </p:grpSpPr>
       <p:sp>
         <p:nvSpPr>
-          <p:cNvPr id="415" name="Google Shape;415;g110cd4518f6_0_0:notes"/>
+          <p:cNvPr id="416" name="Google Shape;416;g110cd4518f6_0_0:notes"/>
           <p:cNvSpPr/>
           <p:nvPr>
             <p:ph idx="2" type="sldImg"/>
@@ -3598,7 +3598,7 @@
       </p:sp>
       <p:sp>
         <p:nvSpPr>
-          <p:cNvPr id="416" name="Google Shape;416;g110cd4518f6_0_0:notes"/>
+          <p:cNvPr id="417" name="Google Shape;417;g110cd4518f6_0_0:notes"/>
           <p:cNvSpPr txBox="1"/>
           <p:nvPr>
             <p:ph idx="1" type="body"/>
@@ -3648,7 +3648,7 @@
   <p:cSld>
     <p:spTree>
       <p:nvGrpSpPr>
-        <p:cNvPr id="423" name="Shape 423"/>
+        <p:cNvPr id="424" name="Shape 424"/>
         <p:cNvGrpSpPr/>
         <p:nvPr/>
       </p:nvGrpSpPr>
@@ -3662,7 +3662,7 @@
       </p:grpSpPr>
       <p:sp>
         <p:nvSpPr>
-          <p:cNvPr id="424" name="Google Shape;424;g132298e23d2_0_0:notes"/>
+          <p:cNvPr id="425" name="Google Shape;425;g132298e23d2_0_0:notes"/>
           <p:cNvSpPr/>
           <p:nvPr>
             <p:ph idx="2" type="sldImg"/>
@@ -3697,7 +3697,7 @@
       </p:sp>
       <p:sp>
         <p:nvSpPr>
-          <p:cNvPr id="425" name="Google Shape;425;g132298e23d2_0_0:notes"/>
+          <p:cNvPr id="426" name="Google Shape;426;g132298e23d2_0_0:notes"/>
           <p:cNvSpPr txBox="1"/>
           <p:nvPr>
             <p:ph idx="1" type="body"/>
@@ -21030,9 +21030,203 @@
           </a:p>
         </p:txBody>
       </p:sp>
+      <p:sp>
+        <p:nvSpPr>
+          <p:cNvPr id="362" name="Google Shape;362;p50"/>
+          <p:cNvSpPr txBox="1"/>
+          <p:nvPr/>
+        </p:nvSpPr>
+        <p:spPr>
+          <a:xfrm>
+            <a:off x="3810800" y="873625"/>
+            <a:ext cx="5141700" cy="714300"/>
+          </a:xfrm>
+          <a:prstGeom prst="rect">
+            <a:avLst/>
+          </a:prstGeom>
+          <a:noFill/>
+          <a:ln>
+            <a:noFill/>
+          </a:ln>
+        </p:spPr>
+        <p:txBody>
+          <a:bodyPr anchorCtr="0" anchor="t" bIns="91425" lIns="91425" spcFirstLastPara="1" rIns="91425" wrap="square" tIns="91425">
+            <a:spAutoFit/>
+          </a:bodyPr>
+          <a:lstStyle/>
+          <a:p>
+            <a:pPr indent="-330200" lvl="0" marL="457200" rtl="0" algn="l">
+              <a:lnSpc>
+                <a:spcPct val="115000"/>
+              </a:lnSpc>
+              <a:spcBef>
+                <a:spcPts val="0"/>
+              </a:spcBef>
+              <a:spcAft>
+                <a:spcPts val="1000"/>
+              </a:spcAft>
+              <a:buClr>
+                <a:schemeClr val="dk1"/>
+              </a:buClr>
+              <a:buSzPts val="1600"/>
+              <a:buChar char="●"/>
+            </a:pPr>
+            <a:r>
+              <a:rPr lang="en" sz="1600">
+                <a:solidFill>
+                  <a:schemeClr val="dk1"/>
+                </a:solidFill>
+              </a:rPr>
+              <a:t>Created by plotting the fraction of True Positive Rate (TPR) vs. False Positive Rate (FPR)</a:t>
+            </a:r>
+            <a:endParaRPr/>
+          </a:p>
+        </p:txBody>
+      </p:sp>
+      <p:sp>
+        <p:nvSpPr>
+          <p:cNvPr id="363" name="Google Shape;363;p50"/>
+          <p:cNvSpPr txBox="1"/>
+          <p:nvPr/>
+        </p:nvSpPr>
+        <p:spPr>
+          <a:xfrm>
+            <a:off x="3840950" y="1445800"/>
+            <a:ext cx="5081400" cy="1975200"/>
+          </a:xfrm>
+          <a:prstGeom prst="rect">
+            <a:avLst/>
+          </a:prstGeom>
+          <a:noFill/>
+          <a:ln>
+            <a:noFill/>
+          </a:ln>
+        </p:spPr>
+        <p:txBody>
+          <a:bodyPr anchorCtr="0" anchor="t" bIns="91425" lIns="91425" spcFirstLastPara="1" rIns="91425" wrap="square" tIns="91425">
+            <a:spAutoFit/>
+          </a:bodyPr>
+          <a:lstStyle/>
+          <a:p>
+            <a:pPr indent="-330200" lvl="0" marL="457200" rtl="0" algn="l">
+              <a:lnSpc>
+                <a:spcPct val="115000"/>
+              </a:lnSpc>
+              <a:spcBef>
+                <a:spcPts val="0"/>
+              </a:spcBef>
+              <a:spcAft>
+                <a:spcPts val="0"/>
+              </a:spcAft>
+              <a:buClr>
+                <a:schemeClr val="dk1"/>
+              </a:buClr>
+              <a:buSzPts val="1600"/>
+              <a:buChar char="●"/>
+            </a:pPr>
+            <a:r>
+              <a:rPr lang="en" sz="1600">
+                <a:solidFill>
+                  <a:schemeClr val="dk1"/>
+                </a:solidFill>
+              </a:rPr>
+              <a:t>TPR is known as sensitivity or recall, which is the total number of correct positive results predicted among all the positive samples.</a:t>
+            </a:r>
+            <a:endParaRPr sz="1600">
+              <a:solidFill>
+                <a:schemeClr val="dk1"/>
+              </a:solidFill>
+            </a:endParaRPr>
+          </a:p>
+          <a:p>
+            <a:pPr indent="-330200" lvl="0" marL="457200" rtl="0" algn="l">
+              <a:lnSpc>
+                <a:spcPct val="115000"/>
+              </a:lnSpc>
+              <a:spcBef>
+                <a:spcPts val="1000"/>
+              </a:spcBef>
+              <a:spcAft>
+                <a:spcPts val="1000"/>
+              </a:spcAft>
+              <a:buClr>
+                <a:schemeClr val="dk1"/>
+              </a:buClr>
+              <a:buSzPts val="1600"/>
+              <a:buChar char="●"/>
+            </a:pPr>
+            <a:r>
+              <a:rPr lang="en" sz="1600">
+                <a:solidFill>
+                  <a:schemeClr val="dk1"/>
+                </a:solidFill>
+              </a:rPr>
+              <a:t>FPR is known as false alarms or (1 - specificity), determining the total number of incorrect positive predictions among all negative samples.</a:t>
+            </a:r>
+            <a:endParaRPr/>
+          </a:p>
+        </p:txBody>
+      </p:sp>
+      <p:sp>
+        <p:nvSpPr>
+          <p:cNvPr id="364" name="Google Shape;364;p50"/>
+          <p:cNvSpPr txBox="1"/>
+          <p:nvPr/>
+        </p:nvSpPr>
+        <p:spPr>
+          <a:xfrm>
+            <a:off x="3840950" y="3249950"/>
+            <a:ext cx="5245200" cy="1563900"/>
+          </a:xfrm>
+          <a:prstGeom prst="rect">
+            <a:avLst/>
+          </a:prstGeom>
+          <a:noFill/>
+          <a:ln>
+            <a:noFill/>
+          </a:ln>
+        </p:spPr>
+        <p:txBody>
+          <a:bodyPr anchorCtr="0" anchor="t" bIns="91425" lIns="91425" spcFirstLastPara="1" rIns="91425" wrap="square" tIns="91425">
+            <a:spAutoFit/>
+          </a:bodyPr>
+          <a:lstStyle/>
+          <a:p>
+            <a:pPr indent="-330200" lvl="0" marL="457200" rtl="0" algn="l">
+              <a:lnSpc>
+                <a:spcPct val="115000"/>
+              </a:lnSpc>
+              <a:spcBef>
+                <a:spcPts val="0"/>
+              </a:spcBef>
+              <a:spcAft>
+                <a:spcPts val="0"/>
+              </a:spcAft>
+              <a:buClr>
+                <a:schemeClr val="dk1"/>
+              </a:buClr>
+              <a:buSzPts val="1600"/>
+              <a:buChar char="●"/>
+            </a:pPr>
+            <a:r>
+              <a:rPr lang="en" sz="1600">
+                <a:solidFill>
+                  <a:schemeClr val="dk1"/>
+                </a:solidFill>
+              </a:rPr>
+              <a:t>Ideally, the best prediction model would give a point on the top left corner (0, 1) indicating perfect classification (100% sensitivity &amp; specificity). A diagonal line depicts a classifier that does a random guess.</a:t>
+            </a:r>
+            <a:endParaRPr sz="1600">
+              <a:solidFill>
+                <a:schemeClr val="dk1"/>
+              </a:solidFill>
+            </a:endParaRPr>
+          </a:p>
+        </p:txBody>
+      </p:sp>
       <p:pic>
         <p:nvPicPr>
-          <p:cNvPr id="362" name="Google Shape;362;p50"/>
+          <p:cNvPr id="365" name="Google Shape;365;p50"/>
           <p:cNvPicPr preferRelativeResize="0"/>
           <p:nvPr/>
         </p:nvPicPr>
@@ -21046,8 +21240,8 @@
         </p:blipFill>
         <p:spPr>
           <a:xfrm>
-            <a:off x="548700" y="1445800"/>
-            <a:ext cx="3609218" cy="3023575"/>
+            <a:off x="381000" y="1362600"/>
+            <a:ext cx="3454250" cy="2702726"/>
           </a:xfrm>
           <a:prstGeom prst="rect">
             <a:avLst/>
@@ -21060,14 +21254,14 @@
       </p:pic>
       <p:sp>
         <p:nvSpPr>
-          <p:cNvPr id="363" name="Google Shape;363;p50"/>
+          <p:cNvPr id="366" name="Google Shape;366;p50"/>
           <p:cNvSpPr txBox="1"/>
           <p:nvPr/>
         </p:nvSpPr>
         <p:spPr>
           <a:xfrm>
-            <a:off x="3810800" y="986250"/>
-            <a:ext cx="5141700" cy="714300"/>
+            <a:off x="775856" y="4310100"/>
+            <a:ext cx="3065100" cy="400200"/>
           </a:xfrm>
           <a:prstGeom prst="rect">
             <a:avLst/>
@@ -21083,195 +21277,30 @@
           </a:bodyPr>
           <a:lstStyle/>
           <a:p>
-            <a:pPr indent="-330200" lvl="0" marL="457200" rtl="0" algn="l">
-              <a:lnSpc>
-                <a:spcPct val="115000"/>
-              </a:lnSpc>
-              <a:spcBef>
-                <a:spcPts val="0"/>
-              </a:spcBef>
-              <a:spcAft>
-                <a:spcPts val="1000"/>
-              </a:spcAft>
-              <a:buClr>
-                <a:schemeClr val="dk1"/>
-              </a:buClr>
-              <a:buSzPts val="1600"/>
-              <a:buChar char="●"/>
-            </a:pPr>
-            <a:r>
-              <a:rPr lang="en" sz="1600">
-                <a:solidFill>
-                  <a:schemeClr val="dk1"/>
-                </a:solidFill>
+            <a:pPr indent="0" lvl="0" marL="0" rtl="0" algn="l">
+              <a:spcBef>
+                <a:spcPts val="0"/>
+              </a:spcBef>
+              <a:spcAft>
+                <a:spcPts val="0"/>
+              </a:spcAft>
+              <a:buNone/>
+            </a:pPr>
+            <a:r>
+              <a:rPr lang="en">
+                <a:latin typeface="Roboto"/>
+                <a:ea typeface="Roboto"/>
+                <a:cs typeface="Roboto"/>
+                <a:sym typeface="Roboto"/>
               </a:rPr>
-              <a:t>Created by plotting the fraction of True Positive Rate (TPR) vs. False Positive Rate (FPR)</a:t>
-            </a:r>
-            <a:endParaRPr/>
-          </a:p>
-        </p:txBody>
-      </p:sp>
-      <p:sp>
-        <p:nvSpPr>
-          <p:cNvPr id="364" name="Google Shape;364;p50"/>
-          <p:cNvSpPr txBox="1"/>
-          <p:nvPr/>
-        </p:nvSpPr>
-        <p:spPr>
-          <a:xfrm>
-            <a:off x="3840950" y="1833363"/>
-            <a:ext cx="5081400" cy="1975200"/>
-          </a:xfrm>
-          <a:prstGeom prst="rect">
-            <a:avLst/>
-          </a:prstGeom>
-          <a:noFill/>
-          <a:ln>
-            <a:noFill/>
-          </a:ln>
-        </p:spPr>
-        <p:txBody>
-          <a:bodyPr anchorCtr="0" anchor="t" bIns="91425" lIns="91425" spcFirstLastPara="1" rIns="91425" wrap="square" tIns="91425">
-            <a:spAutoFit/>
-          </a:bodyPr>
-          <a:lstStyle/>
-          <a:p>
-            <a:pPr indent="-330200" lvl="0" marL="457200" rtl="0" algn="l">
-              <a:lnSpc>
-                <a:spcPct val="115000"/>
-              </a:lnSpc>
-              <a:spcBef>
-                <a:spcPts val="0"/>
-              </a:spcBef>
-              <a:spcAft>
-                <a:spcPts val="0"/>
-              </a:spcAft>
-              <a:buClr>
-                <a:schemeClr val="dk1"/>
-              </a:buClr>
-              <a:buSzPts val="1600"/>
-              <a:buChar char="●"/>
-            </a:pPr>
-            <a:r>
-              <a:rPr lang="en" sz="1600">
-                <a:solidFill>
-                  <a:schemeClr val="dk1"/>
-                </a:solidFill>
-              </a:rPr>
-              <a:t>TPR is known as sensitivity or recall, which is the total number of correct positive results predicted among all the positive samples.</a:t>
-            </a:r>
-            <a:endParaRPr sz="1600">
-              <a:solidFill>
-                <a:schemeClr val="dk1"/>
-              </a:solidFill>
+              <a:t>(source: Sarkar et al. 2018)</a:t>
+            </a:r>
+            <a:endParaRPr>
+              <a:latin typeface="Roboto"/>
+              <a:ea typeface="Roboto"/>
+              <a:cs typeface="Roboto"/>
+              <a:sym typeface="Roboto"/>
             </a:endParaRPr>
-          </a:p>
-          <a:p>
-            <a:pPr indent="-330200" lvl="0" marL="457200" rtl="0" algn="l">
-              <a:lnSpc>
-                <a:spcPct val="115000"/>
-              </a:lnSpc>
-              <a:spcBef>
-                <a:spcPts val="1000"/>
-              </a:spcBef>
-              <a:spcAft>
-                <a:spcPts val="1000"/>
-              </a:spcAft>
-              <a:buClr>
-                <a:schemeClr val="dk1"/>
-              </a:buClr>
-              <a:buSzPts val="1600"/>
-              <a:buChar char="●"/>
-            </a:pPr>
-            <a:r>
-              <a:rPr lang="en" sz="1600">
-                <a:solidFill>
-                  <a:schemeClr val="dk1"/>
-                </a:solidFill>
-              </a:rPr>
-              <a:t>FPR is known as false alarms or (1 - specificity), determining the total number of incorrect positive predictions among all negative samples.</a:t>
-            </a:r>
-            <a:endParaRPr/>
-          </a:p>
-        </p:txBody>
-      </p:sp>
-      <p:sp>
-        <p:nvSpPr>
-          <p:cNvPr id="365" name="Google Shape;365;p50"/>
-          <p:cNvSpPr txBox="1"/>
-          <p:nvPr/>
-        </p:nvSpPr>
-        <p:spPr>
-          <a:xfrm>
-            <a:off x="3805850" y="3941375"/>
-            <a:ext cx="4999200" cy="714300"/>
-          </a:xfrm>
-          <a:prstGeom prst="rect">
-            <a:avLst/>
-          </a:prstGeom>
-          <a:noFill/>
-          <a:ln>
-            <a:noFill/>
-          </a:ln>
-        </p:spPr>
-        <p:txBody>
-          <a:bodyPr anchorCtr="0" anchor="t" bIns="91425" lIns="91425" spcFirstLastPara="1" rIns="91425" wrap="square" tIns="91425">
-            <a:spAutoFit/>
-          </a:bodyPr>
-          <a:lstStyle/>
-          <a:p>
-            <a:pPr indent="-330200" lvl="0" marL="457200" rtl="0" algn="l">
-              <a:lnSpc>
-                <a:spcPct val="115000"/>
-              </a:lnSpc>
-              <a:spcBef>
-                <a:spcPts val="0"/>
-              </a:spcBef>
-              <a:spcAft>
-                <a:spcPts val="0"/>
-              </a:spcAft>
-              <a:buClr>
-                <a:schemeClr val="dk1"/>
-              </a:buClr>
-              <a:buSzPts val="1600"/>
-              <a:buChar char="●"/>
-            </a:pPr>
-            <a:r>
-              <a:rPr lang="en" sz="1600">
-                <a:solidFill>
-                  <a:schemeClr val="dk1"/>
-                </a:solidFill>
-              </a:rPr>
-              <a:t>ROC curve is an important tool for visually</a:t>
-            </a:r>
-            <a:endParaRPr sz="1600">
-              <a:solidFill>
-                <a:schemeClr val="dk1"/>
-              </a:solidFill>
-            </a:endParaRPr>
-          </a:p>
-          <a:p>
-            <a:pPr indent="0" lvl="0" marL="457200" rtl="0" algn="l">
-              <a:lnSpc>
-                <a:spcPct val="115000"/>
-              </a:lnSpc>
-              <a:spcBef>
-                <a:spcPts val="0"/>
-              </a:spcBef>
-              <a:spcAft>
-                <a:spcPts val="0"/>
-              </a:spcAft>
-              <a:buNone/>
-            </a:pPr>
-            <a:r>
-              <a:rPr lang="en" sz="1600">
-                <a:solidFill>
-                  <a:schemeClr val="dk1"/>
-                </a:solidFill>
-              </a:rPr>
-              <a:t>interpreting classification models.</a:t>
-            </a:r>
-            <a:endParaRPr/>
           </a:p>
         </p:txBody>
       </p:sp>
@@ -21288,7 +21317,7 @@
   <p:cSld>
     <p:spTree>
       <p:nvGrpSpPr>
-        <p:cNvPr id="369" name="Shape 369"/>
+        <p:cNvPr id="370" name="Shape 370"/>
         <p:cNvGrpSpPr/>
         <p:nvPr/>
       </p:nvGrpSpPr>
@@ -21302,7 +21331,7 @@
       </p:grpSpPr>
       <p:pic>
         <p:nvPicPr>
-          <p:cNvPr id="370" name="Google Shape;370;p51"/>
+          <p:cNvPr id="371" name="Google Shape;371;p51"/>
           <p:cNvPicPr preferRelativeResize="0"/>
           <p:nvPr/>
         </p:nvPicPr>
@@ -21329,7 +21358,7 @@
       </p:pic>
       <p:sp>
         <p:nvSpPr>
-          <p:cNvPr id="371" name="Google Shape;371;p51"/>
+          <p:cNvPr id="372" name="Google Shape;372;p51"/>
           <p:cNvSpPr txBox="1"/>
           <p:nvPr>
             <p:ph type="title"/>
@@ -21385,7 +21414,7 @@
       </p:sp>
       <p:sp>
         <p:nvSpPr>
-          <p:cNvPr id="372" name="Google Shape;372;p51"/>
+          <p:cNvPr id="373" name="Google Shape;373;p51"/>
           <p:cNvSpPr txBox="1"/>
           <p:nvPr/>
         </p:nvSpPr>
@@ -21501,7 +21530,7 @@
       </p:sp>
       <p:sp>
         <p:nvSpPr>
-          <p:cNvPr id="373" name="Google Shape;373;p51"/>
+          <p:cNvPr id="374" name="Google Shape;374;p51"/>
           <p:cNvSpPr txBox="1"/>
           <p:nvPr>
             <p:ph idx="12" type="sldNum"/>
@@ -21557,7 +21586,7 @@
       </p:sp>
       <p:pic>
         <p:nvPicPr>
-          <p:cNvPr id="374" name="Google Shape;374;p51"/>
+          <p:cNvPr id="375" name="Google Shape;375;p51"/>
           <p:cNvPicPr preferRelativeResize="0"/>
           <p:nvPr/>
         </p:nvPicPr>
@@ -21584,7 +21613,7 @@
       </p:pic>
       <p:sp>
         <p:nvSpPr>
-          <p:cNvPr id="375" name="Google Shape;375;p51"/>
+          <p:cNvPr id="376" name="Google Shape;376;p51"/>
           <p:cNvSpPr txBox="1"/>
           <p:nvPr/>
         </p:nvSpPr>
@@ -21637,7 +21666,7 @@
   <p:cSld>
     <p:spTree>
       <p:nvGrpSpPr>
-        <p:cNvPr id="379" name="Shape 379"/>
+        <p:cNvPr id="380" name="Shape 380"/>
         <p:cNvGrpSpPr/>
         <p:nvPr/>
       </p:nvGrpSpPr>
@@ -21651,7 +21680,7 @@
       </p:grpSpPr>
       <p:pic>
         <p:nvPicPr>
-          <p:cNvPr id="380" name="Google Shape;380;p52"/>
+          <p:cNvPr id="381" name="Google Shape;381;p52"/>
           <p:cNvPicPr preferRelativeResize="0"/>
           <p:nvPr/>
         </p:nvPicPr>
@@ -21678,7 +21707,7 @@
       </p:pic>
       <p:sp>
         <p:nvSpPr>
-          <p:cNvPr id="381" name="Google Shape;381;p52"/>
+          <p:cNvPr id="382" name="Google Shape;382;p52"/>
           <p:cNvSpPr txBox="1"/>
           <p:nvPr>
             <p:ph type="title"/>
@@ -21742,7 +21771,7 @@
       </p:sp>
       <p:sp>
         <p:nvSpPr>
-          <p:cNvPr id="382" name="Google Shape;382;p52"/>
+          <p:cNvPr id="383" name="Google Shape;383;p52"/>
           <p:cNvSpPr txBox="1"/>
           <p:nvPr/>
         </p:nvSpPr>
@@ -21836,7 +21865,7 @@
       </p:sp>
       <p:sp>
         <p:nvSpPr>
-          <p:cNvPr id="383" name="Google Shape;383;p52"/>
+          <p:cNvPr id="384" name="Google Shape;384;p52"/>
           <p:cNvSpPr txBox="1"/>
           <p:nvPr>
             <p:ph idx="12" type="sldNum"/>
@@ -21892,7 +21921,7 @@
       </p:sp>
       <p:pic>
         <p:nvPicPr>
-          <p:cNvPr id="384" name="Google Shape;384;p52"/>
+          <p:cNvPr id="385" name="Google Shape;385;p52"/>
           <p:cNvPicPr preferRelativeResize="0"/>
           <p:nvPr/>
         </p:nvPicPr>
@@ -21920,7 +21949,7 @@
       </p:pic>
       <p:sp>
         <p:nvSpPr>
-          <p:cNvPr id="385" name="Google Shape;385;p52"/>
+          <p:cNvPr id="386" name="Google Shape;386;p52"/>
           <p:cNvSpPr txBox="1"/>
           <p:nvPr/>
         </p:nvSpPr>
@@ -22010,7 +22039,7 @@
       </p:sp>
       <p:pic>
         <p:nvPicPr>
-          <p:cNvPr id="386" name="Google Shape;386;p52"/>
+          <p:cNvPr id="387" name="Google Shape;387;p52"/>
           <p:cNvPicPr preferRelativeResize="0"/>
           <p:nvPr/>
         </p:nvPicPr>
@@ -22049,7 +22078,7 @@
   <p:cSld>
     <p:spTree>
       <p:nvGrpSpPr>
-        <p:cNvPr id="390" name="Shape 390"/>
+        <p:cNvPr id="391" name="Shape 391"/>
         <p:cNvGrpSpPr/>
         <p:nvPr/>
       </p:nvGrpSpPr>
@@ -22063,7 +22092,7 @@
       </p:grpSpPr>
       <p:pic>
         <p:nvPicPr>
-          <p:cNvPr id="391" name="Google Shape;391;p53"/>
+          <p:cNvPr id="392" name="Google Shape;392;p53"/>
           <p:cNvPicPr preferRelativeResize="0"/>
           <p:nvPr/>
         </p:nvPicPr>
@@ -22090,7 +22119,7 @@
       </p:pic>
       <p:sp>
         <p:nvSpPr>
-          <p:cNvPr id="392" name="Google Shape;392;p53"/>
+          <p:cNvPr id="393" name="Google Shape;393;p53"/>
           <p:cNvSpPr txBox="1"/>
           <p:nvPr>
             <p:ph type="title"/>
@@ -22138,7 +22167,7 @@
       </p:sp>
       <p:sp>
         <p:nvSpPr>
-          <p:cNvPr id="393" name="Google Shape;393;p53"/>
+          <p:cNvPr id="394" name="Google Shape;394;p53"/>
           <p:cNvSpPr txBox="1"/>
           <p:nvPr/>
         </p:nvSpPr>
@@ -22332,7 +22361,7 @@
       </p:sp>
       <p:sp>
         <p:nvSpPr>
-          <p:cNvPr id="394" name="Google Shape;394;p53"/>
+          <p:cNvPr id="395" name="Google Shape;395;p53"/>
           <p:cNvSpPr txBox="1"/>
           <p:nvPr>
             <p:ph idx="12" type="sldNum"/>
@@ -22738,7 +22767,7 @@
   <p:cSld>
     <p:spTree>
       <p:nvGrpSpPr>
-        <p:cNvPr id="398" name="Shape 398"/>
+        <p:cNvPr id="399" name="Shape 399"/>
         <p:cNvGrpSpPr/>
         <p:nvPr/>
       </p:nvGrpSpPr>
@@ -22752,7 +22781,7 @@
       </p:grpSpPr>
       <p:pic>
         <p:nvPicPr>
-          <p:cNvPr id="399" name="Google Shape;399;p54"/>
+          <p:cNvPr id="400" name="Google Shape;400;p54"/>
           <p:cNvPicPr preferRelativeResize="0"/>
           <p:nvPr/>
         </p:nvPicPr>
@@ -22780,7 +22809,7 @@
       </p:pic>
       <p:sp>
         <p:nvSpPr>
-          <p:cNvPr id="400" name="Google Shape;400;p54"/>
+          <p:cNvPr id="401" name="Google Shape;401;p54"/>
           <p:cNvSpPr txBox="1"/>
           <p:nvPr>
             <p:ph type="title"/>
@@ -22828,7 +22857,7 @@
       </p:sp>
       <p:sp>
         <p:nvSpPr>
-          <p:cNvPr id="401" name="Google Shape;401;p54"/>
+          <p:cNvPr id="402" name="Google Shape;402;p54"/>
           <p:cNvSpPr txBox="1"/>
           <p:nvPr>
             <p:ph idx="12" type="sldNum"/>
@@ -22863,69 +22892,6 @@
               <a:t>‹#›</a:t>
             </a:fld>
             <a:endParaRPr/>
-          </a:p>
-        </p:txBody>
-      </p:sp>
-      <p:sp>
-        <p:nvSpPr>
-          <p:cNvPr id="402" name="Google Shape;402;p54"/>
-          <p:cNvSpPr txBox="1"/>
-          <p:nvPr/>
-        </p:nvSpPr>
-        <p:spPr>
-          <a:xfrm>
-            <a:off x="405900" y="579225"/>
-            <a:ext cx="8332200" cy="461700"/>
-          </a:xfrm>
-          <a:prstGeom prst="rect">
-            <a:avLst/>
-          </a:prstGeom>
-          <a:noFill/>
-          <a:ln>
-            <a:noFill/>
-          </a:ln>
-        </p:spPr>
-        <p:txBody>
-          <a:bodyPr anchorCtr="0" anchor="t" bIns="91425" lIns="91425" spcFirstLastPara="1" rIns="91425" wrap="square" tIns="91425">
-            <a:spAutoFit/>
-          </a:bodyPr>
-          <a:lstStyle/>
-          <a:p>
-            <a:pPr indent="-342900" lvl="0" marL="457200" rtl="0" algn="l">
-              <a:spcBef>
-                <a:spcPts val="0"/>
-              </a:spcBef>
-              <a:spcAft>
-                <a:spcPts val="0"/>
-              </a:spcAft>
-              <a:buSzPts val="1800"/>
-              <a:buFont typeface="Roboto"/>
-              <a:buChar char="●"/>
-            </a:pPr>
-            <a:r>
-              <a:rPr lang="en" sz="1800">
-                <a:latin typeface="Roboto"/>
-                <a:ea typeface="Roboto"/>
-                <a:cs typeface="Roboto"/>
-                <a:sym typeface="Roboto"/>
-              </a:rPr>
-              <a:t>What is the drawback of decision tree</a:t>
-            </a:r>
-            <a:r>
-              <a:rPr lang="en" sz="1800">
-                <a:latin typeface="Roboto"/>
-                <a:ea typeface="Roboto"/>
-                <a:cs typeface="Roboto"/>
-                <a:sym typeface="Roboto"/>
-              </a:rPr>
-              <a:t>?</a:t>
-            </a:r>
-            <a:endParaRPr sz="1800">
-              <a:latin typeface="Roboto"/>
-              <a:ea typeface="Roboto"/>
-              <a:cs typeface="Roboto"/>
-              <a:sym typeface="Roboto"/>
-            </a:endParaRPr>
           </a:p>
         </p:txBody>
       </p:sp>
@@ -22937,8 +22903,8 @@
         </p:nvSpPr>
         <p:spPr>
           <a:xfrm>
-            <a:off x="661900" y="1378950"/>
-            <a:ext cx="7143000" cy="400200"/>
+            <a:off x="405900" y="579225"/>
+            <a:ext cx="8332200" cy="461700"/>
           </a:xfrm>
           <a:prstGeom prst="rect">
             <a:avLst/>
@@ -22954,19 +22920,41 @@
           </a:bodyPr>
           <a:lstStyle/>
           <a:p>
-            <a:pPr indent="0" lvl="0" marL="0" rtl="0" algn="l">
-              <a:spcBef>
-                <a:spcPts val="0"/>
-              </a:spcBef>
-              <a:spcAft>
-                <a:spcPts val="0"/>
-              </a:spcAft>
-              <a:buNone/>
-            </a:pPr>
-            <a:r>
-              <a:t/>
-            </a:r>
-            <a:endParaRPr/>
+            <a:pPr indent="-342900" lvl="0" marL="457200" rtl="0" algn="l">
+              <a:spcBef>
+                <a:spcPts val="0"/>
+              </a:spcBef>
+              <a:spcAft>
+                <a:spcPts val="0"/>
+              </a:spcAft>
+              <a:buSzPts val="1800"/>
+              <a:buFont typeface="Roboto"/>
+              <a:buChar char="●"/>
+            </a:pPr>
+            <a:r>
+              <a:rPr lang="en" sz="1800">
+                <a:latin typeface="Roboto"/>
+                <a:ea typeface="Roboto"/>
+                <a:cs typeface="Roboto"/>
+                <a:sym typeface="Roboto"/>
+              </a:rPr>
+              <a:t>What is the drawback of decision tree</a:t>
+            </a:r>
+            <a:r>
+              <a:rPr lang="en" sz="1800">
+                <a:latin typeface="Roboto"/>
+                <a:ea typeface="Roboto"/>
+                <a:cs typeface="Roboto"/>
+                <a:sym typeface="Roboto"/>
+              </a:rPr>
+              <a:t>?</a:t>
+            </a:r>
+            <a:endParaRPr sz="1800">
+              <a:latin typeface="Roboto"/>
+              <a:ea typeface="Roboto"/>
+              <a:cs typeface="Roboto"/>
+              <a:sym typeface="Roboto"/>
+            </a:endParaRPr>
           </a:p>
         </p:txBody>
       </p:sp>
@@ -22978,8 +22966,8 @@
         </p:nvSpPr>
         <p:spPr>
           <a:xfrm>
-            <a:off x="548700" y="900500"/>
-            <a:ext cx="7694700" cy="1046700"/>
+            <a:off x="661900" y="1378950"/>
+            <a:ext cx="7143000" cy="400200"/>
           </a:xfrm>
           <a:prstGeom prst="rect">
             <a:avLst/>
@@ -22995,70 +22983,17 @@
           </a:bodyPr>
           <a:lstStyle/>
           <a:p>
-            <a:pPr indent="-317500" lvl="0" marL="457200" rtl="0" algn="l">
-              <a:spcBef>
-                <a:spcPts val="0"/>
-              </a:spcBef>
-              <a:spcAft>
-                <a:spcPts val="0"/>
-              </a:spcAft>
-              <a:buSzPts val="1400"/>
-              <a:buChar char="❏"/>
-            </a:pPr>
-            <a:r>
-              <a:rPr lang="en"/>
-              <a:t>Works for both regression and classification problems</a:t>
-            </a:r>
-            <a:endParaRPr/>
-          </a:p>
-          <a:p>
-            <a:pPr indent="-317500" lvl="0" marL="457200" rtl="0" algn="l">
-              <a:spcBef>
-                <a:spcPts val="0"/>
-              </a:spcBef>
-              <a:spcAft>
-                <a:spcPts val="0"/>
-              </a:spcAft>
-              <a:buSzPts val="1400"/>
-              <a:buChar char="❏"/>
-            </a:pPr>
-            <a:r>
-              <a:rPr lang="en"/>
-              <a:t>Works for both categorical and numerical data</a:t>
-            </a:r>
-            <a:endParaRPr/>
-          </a:p>
-          <a:p>
-            <a:pPr indent="-317500" lvl="0" marL="457200" rtl="0" algn="l">
-              <a:spcBef>
-                <a:spcPts val="0"/>
-              </a:spcBef>
-              <a:spcAft>
-                <a:spcPts val="0"/>
-              </a:spcAft>
-              <a:buSzPts val="1400"/>
-              <a:buChar char="❏"/>
-            </a:pPr>
-            <a:r>
-              <a:rPr lang="en"/>
-              <a:t>Results are interpretable</a:t>
-            </a:r>
-            <a:endParaRPr/>
-          </a:p>
-          <a:p>
-            <a:pPr indent="-317500" lvl="0" marL="457200" rtl="0" algn="l">
-              <a:spcBef>
-                <a:spcPts val="0"/>
-              </a:spcBef>
-              <a:spcAft>
-                <a:spcPts val="0"/>
-              </a:spcAft>
-              <a:buSzPts val="1400"/>
-              <a:buChar char="❏"/>
-            </a:pPr>
-            <a:r>
-              <a:rPr lang="en"/>
-              <a:t>Prone to overfitting</a:t>
+            <a:pPr indent="0" lvl="0" marL="0" rtl="0" algn="l">
+              <a:spcBef>
+                <a:spcPts val="0"/>
+              </a:spcBef>
+              <a:spcAft>
+                <a:spcPts val="0"/>
+              </a:spcAft>
+              <a:buNone/>
+            </a:pPr>
+            <a:r>
+              <a:t/>
             </a:r>
             <a:endParaRPr/>
           </a:p>
@@ -23072,8 +23007,8 @@
         </p:nvSpPr>
         <p:spPr>
           <a:xfrm>
-            <a:off x="405900" y="1821625"/>
-            <a:ext cx="8584800" cy="431100"/>
+            <a:off x="548700" y="900500"/>
+            <a:ext cx="7694700" cy="1046700"/>
           </a:xfrm>
           <a:prstGeom prst="rect">
             <a:avLst/>
@@ -23089,32 +23024,72 @@
           </a:bodyPr>
           <a:lstStyle/>
           <a:p>
-            <a:pPr indent="-330200" lvl="0" marL="457200" rtl="0" algn="l">
-              <a:spcBef>
-                <a:spcPts val="0"/>
-              </a:spcBef>
-              <a:spcAft>
-                <a:spcPts val="0"/>
-              </a:spcAft>
-              <a:buSzPts val="1600"/>
-              <a:buFont typeface="Roboto"/>
-              <a:buChar char="●"/>
-            </a:pPr>
-            <a:r>
-              <a:rPr lang="en" sz="1600">
-                <a:latin typeface="Roboto"/>
-                <a:ea typeface="Roboto"/>
-                <a:cs typeface="Roboto"/>
-                <a:sym typeface="Roboto"/>
-              </a:rPr>
-              <a:t>Which of the followings are widely used metrics to assess a classification model?</a:t>
-            </a:r>
-            <a:endParaRPr sz="1600">
-              <a:latin typeface="Roboto"/>
-              <a:ea typeface="Roboto"/>
-              <a:cs typeface="Roboto"/>
-              <a:sym typeface="Roboto"/>
-            </a:endParaRPr>
+            <a:pPr indent="-317500" lvl="0" marL="457200" rtl="0" algn="l">
+              <a:spcBef>
+                <a:spcPts val="0"/>
+              </a:spcBef>
+              <a:spcAft>
+                <a:spcPts val="0"/>
+              </a:spcAft>
+              <a:buSzPts val="1400"/>
+              <a:buChar char="❏"/>
+            </a:pPr>
+            <a:r>
+              <a:rPr lang="en"/>
+              <a:t>Works for both regression and classification problems</a:t>
+            </a:r>
+            <a:endParaRPr/>
+          </a:p>
+          <a:p>
+            <a:pPr indent="-317500" lvl="0" marL="457200" rtl="0" algn="l">
+              <a:spcBef>
+                <a:spcPts val="0"/>
+              </a:spcBef>
+              <a:spcAft>
+                <a:spcPts val="0"/>
+              </a:spcAft>
+              <a:buSzPts val="1400"/>
+              <a:buChar char="❏"/>
+            </a:pPr>
+            <a:r>
+              <a:rPr lang="en"/>
+              <a:t>Works for both categorical and numerical data</a:t>
+            </a:r>
+            <a:endParaRPr/>
+          </a:p>
+          <a:p>
+            <a:pPr indent="-317500" lvl="0" marL="457200" rtl="0" algn="l">
+              <a:spcBef>
+                <a:spcPts val="0"/>
+              </a:spcBef>
+              <a:spcAft>
+                <a:spcPts val="0"/>
+              </a:spcAft>
+              <a:buSzPts val="1400"/>
+              <a:buChar char="❏"/>
+            </a:pPr>
+            <a:r>
+              <a:rPr lang="en"/>
+              <a:t>Results are interpretable</a:t>
+            </a:r>
+            <a:endParaRPr/>
+          </a:p>
+          <a:p>
+            <a:pPr indent="-317500" lvl="0" marL="457200" rtl="0" algn="l">
+              <a:spcBef>
+                <a:spcPts val="0"/>
+              </a:spcBef>
+              <a:spcAft>
+                <a:spcPts val="0"/>
+              </a:spcAft>
+              <a:buSzPts val="1400"/>
+              <a:buChar char="❏"/>
+            </a:pPr>
+            <a:r>
+              <a:rPr lang="en"/>
+              <a:t>Prone to overfitting</a:t>
+            </a:r>
+            <a:endParaRPr/>
           </a:p>
         </p:txBody>
       </p:sp>
@@ -23126,8 +23101,8 @@
         </p:nvSpPr>
         <p:spPr>
           <a:xfrm>
-            <a:off x="548700" y="2199288"/>
-            <a:ext cx="7694700" cy="1046700"/>
+            <a:off x="405900" y="1821625"/>
+            <a:ext cx="8584800" cy="431100"/>
           </a:xfrm>
           <a:prstGeom prst="rect">
             <a:avLst/>
@@ -23143,72 +23118,32 @@
           </a:bodyPr>
           <a:lstStyle/>
           <a:p>
-            <a:pPr indent="-317500" lvl="0" marL="457200" rtl="0" algn="l">
-              <a:spcBef>
-                <a:spcPts val="0"/>
-              </a:spcBef>
-              <a:spcAft>
-                <a:spcPts val="0"/>
-              </a:spcAft>
-              <a:buSzPts val="1400"/>
-              <a:buChar char="❏"/>
-            </a:pPr>
-            <a:r>
-              <a:rPr lang="en"/>
-              <a:t>Confusion matrix</a:t>
-            </a:r>
-            <a:endParaRPr/>
-          </a:p>
-          <a:p>
-            <a:pPr indent="-317500" lvl="0" marL="457200" rtl="0" algn="l">
-              <a:spcBef>
-                <a:spcPts val="0"/>
-              </a:spcBef>
-              <a:spcAft>
-                <a:spcPts val="0"/>
-              </a:spcAft>
-              <a:buSzPts val="1400"/>
-              <a:buChar char="❏"/>
-            </a:pPr>
-            <a:r>
-              <a:rPr lang="en"/>
-              <a:t>F1-score</a:t>
-            </a:r>
-            <a:endParaRPr/>
-          </a:p>
-          <a:p>
-            <a:pPr indent="-317500" lvl="0" marL="457200" rtl="0" algn="l">
-              <a:spcBef>
-                <a:spcPts val="0"/>
-              </a:spcBef>
-              <a:spcAft>
-                <a:spcPts val="0"/>
-              </a:spcAft>
-              <a:buSzPts val="1400"/>
-              <a:buChar char="❏"/>
-            </a:pPr>
-            <a:r>
-              <a:rPr lang="en"/>
-              <a:t>Area under the ROC curve</a:t>
-            </a:r>
-            <a:endParaRPr/>
-          </a:p>
-          <a:p>
-            <a:pPr indent="-317500" lvl="0" marL="457200" rtl="0" algn="l">
-              <a:spcBef>
-                <a:spcPts val="0"/>
-              </a:spcBef>
-              <a:spcAft>
-                <a:spcPts val="0"/>
-              </a:spcAft>
-              <a:buSzPts val="1400"/>
-              <a:buChar char="❏"/>
-            </a:pPr>
-            <a:r>
-              <a:rPr lang="en"/>
-              <a:t>All of the above</a:t>
-            </a:r>
-            <a:endParaRPr/>
+            <a:pPr indent="-330200" lvl="0" marL="457200" rtl="0" algn="l">
+              <a:spcBef>
+                <a:spcPts val="0"/>
+              </a:spcBef>
+              <a:spcAft>
+                <a:spcPts val="0"/>
+              </a:spcAft>
+              <a:buSzPts val="1600"/>
+              <a:buFont typeface="Roboto"/>
+              <a:buChar char="●"/>
+            </a:pPr>
+            <a:r>
+              <a:rPr lang="en" sz="1600">
+                <a:latin typeface="Roboto"/>
+                <a:ea typeface="Roboto"/>
+                <a:cs typeface="Roboto"/>
+                <a:sym typeface="Roboto"/>
+              </a:rPr>
+              <a:t>Which of the followings are widely used metrics to assess a classification model?</a:t>
+            </a:r>
+            <a:endParaRPr sz="1600">
+              <a:latin typeface="Roboto"/>
+              <a:ea typeface="Roboto"/>
+              <a:cs typeface="Roboto"/>
+              <a:sym typeface="Roboto"/>
+            </a:endParaRPr>
           </a:p>
         </p:txBody>
       </p:sp>
@@ -23220,8 +23155,8 @@
         </p:nvSpPr>
         <p:spPr>
           <a:xfrm>
-            <a:off x="405900" y="3197025"/>
-            <a:ext cx="8584800" cy="461700"/>
+            <a:off x="548700" y="2199288"/>
+            <a:ext cx="7694700" cy="1046700"/>
           </a:xfrm>
           <a:prstGeom prst="rect">
             <a:avLst/>
@@ -23237,32 +23172,72 @@
           </a:bodyPr>
           <a:lstStyle/>
           <a:p>
-            <a:pPr indent="-342900" lvl="0" marL="457200" rtl="0" algn="l">
-              <a:spcBef>
-                <a:spcPts val="0"/>
-              </a:spcBef>
-              <a:spcAft>
-                <a:spcPts val="0"/>
-              </a:spcAft>
-              <a:buSzPts val="1800"/>
-              <a:buFont typeface="Roboto"/>
-              <a:buChar char="●"/>
-            </a:pPr>
-            <a:r>
-              <a:rPr lang="en" sz="1800">
-                <a:latin typeface="Roboto"/>
-                <a:ea typeface="Roboto"/>
-                <a:cs typeface="Roboto"/>
-                <a:sym typeface="Roboto"/>
-              </a:rPr>
-              <a:t>Which of the following is not good for evaluating clustering algorithm?</a:t>
-            </a:r>
-            <a:endParaRPr sz="1800">
-              <a:latin typeface="Roboto"/>
-              <a:ea typeface="Roboto"/>
-              <a:cs typeface="Roboto"/>
-              <a:sym typeface="Roboto"/>
-            </a:endParaRPr>
+            <a:pPr indent="-317500" lvl="0" marL="457200" rtl="0" algn="l">
+              <a:spcBef>
+                <a:spcPts val="0"/>
+              </a:spcBef>
+              <a:spcAft>
+                <a:spcPts val="0"/>
+              </a:spcAft>
+              <a:buSzPts val="1400"/>
+              <a:buChar char="❏"/>
+            </a:pPr>
+            <a:r>
+              <a:rPr lang="en"/>
+              <a:t>Confusion matrix</a:t>
+            </a:r>
+            <a:endParaRPr/>
+          </a:p>
+          <a:p>
+            <a:pPr indent="-317500" lvl="0" marL="457200" rtl="0" algn="l">
+              <a:spcBef>
+                <a:spcPts val="0"/>
+              </a:spcBef>
+              <a:spcAft>
+                <a:spcPts val="0"/>
+              </a:spcAft>
+              <a:buSzPts val="1400"/>
+              <a:buChar char="❏"/>
+            </a:pPr>
+            <a:r>
+              <a:rPr lang="en"/>
+              <a:t>F1-score</a:t>
+            </a:r>
+            <a:endParaRPr/>
+          </a:p>
+          <a:p>
+            <a:pPr indent="-317500" lvl="0" marL="457200" rtl="0" algn="l">
+              <a:spcBef>
+                <a:spcPts val="0"/>
+              </a:spcBef>
+              <a:spcAft>
+                <a:spcPts val="0"/>
+              </a:spcAft>
+              <a:buSzPts val="1400"/>
+              <a:buChar char="❏"/>
+            </a:pPr>
+            <a:r>
+              <a:rPr lang="en"/>
+              <a:t>Area under the ROC curve</a:t>
+            </a:r>
+            <a:endParaRPr/>
+          </a:p>
+          <a:p>
+            <a:pPr indent="-317500" lvl="0" marL="457200" rtl="0" algn="l">
+              <a:spcBef>
+                <a:spcPts val="0"/>
+              </a:spcBef>
+              <a:spcAft>
+                <a:spcPts val="0"/>
+              </a:spcAft>
+              <a:buSzPts val="1400"/>
+              <a:buChar char="❏"/>
+            </a:pPr>
+            <a:r>
+              <a:rPr lang="en"/>
+              <a:t>All of the above</a:t>
+            </a:r>
+            <a:endParaRPr/>
           </a:p>
         </p:txBody>
       </p:sp>
@@ -23274,8 +23249,8 @@
         </p:nvSpPr>
         <p:spPr>
           <a:xfrm>
-            <a:off x="548700" y="3545488"/>
-            <a:ext cx="7694700" cy="1046700"/>
+            <a:off x="405900" y="3197025"/>
+            <a:ext cx="8584800" cy="461700"/>
           </a:xfrm>
           <a:prstGeom prst="rect">
             <a:avLst/>
@@ -23291,72 +23266,32 @@
           </a:bodyPr>
           <a:lstStyle/>
           <a:p>
-            <a:pPr indent="-317500" lvl="0" marL="457200" rtl="0" algn="l">
-              <a:spcBef>
-                <a:spcPts val="0"/>
-              </a:spcBef>
-              <a:spcAft>
-                <a:spcPts val="0"/>
-              </a:spcAft>
-              <a:buSzPts val="1400"/>
-              <a:buChar char="❏"/>
-            </a:pPr>
-            <a:r>
-              <a:rPr lang="en"/>
-              <a:t>Accuracy</a:t>
-            </a:r>
-            <a:endParaRPr/>
-          </a:p>
-          <a:p>
-            <a:pPr indent="-317500" lvl="0" marL="457200" rtl="0" algn="l">
-              <a:spcBef>
-                <a:spcPts val="0"/>
-              </a:spcBef>
-              <a:spcAft>
-                <a:spcPts val="0"/>
-              </a:spcAft>
-              <a:buSzPts val="1400"/>
-              <a:buChar char="❏"/>
-            </a:pPr>
-            <a:r>
-              <a:rPr lang="en"/>
-              <a:t>Homogeneity</a:t>
-            </a:r>
-            <a:endParaRPr/>
-          </a:p>
-          <a:p>
-            <a:pPr indent="-317500" lvl="0" marL="457200" rtl="0" algn="l">
-              <a:spcBef>
-                <a:spcPts val="0"/>
-              </a:spcBef>
-              <a:spcAft>
-                <a:spcPts val="0"/>
-              </a:spcAft>
-              <a:buSzPts val="1400"/>
-              <a:buChar char="❏"/>
-            </a:pPr>
-            <a:r>
-              <a:rPr lang="en"/>
-              <a:t>Completeness</a:t>
-            </a:r>
-            <a:endParaRPr/>
-          </a:p>
-          <a:p>
-            <a:pPr indent="-317500" lvl="0" marL="457200" rtl="0" algn="l">
-              <a:spcBef>
-                <a:spcPts val="0"/>
-              </a:spcBef>
-              <a:spcAft>
-                <a:spcPts val="0"/>
-              </a:spcAft>
-              <a:buSzPts val="1400"/>
-              <a:buChar char="❏"/>
-            </a:pPr>
-            <a:r>
-              <a:rPr lang="en"/>
-              <a:t>V-measure</a:t>
-            </a:r>
-            <a:endParaRPr/>
+            <a:pPr indent="-342900" lvl="0" marL="457200" rtl="0" algn="l">
+              <a:spcBef>
+                <a:spcPts val="0"/>
+              </a:spcBef>
+              <a:spcAft>
+                <a:spcPts val="0"/>
+              </a:spcAft>
+              <a:buSzPts val="1800"/>
+              <a:buFont typeface="Roboto"/>
+              <a:buChar char="●"/>
+            </a:pPr>
+            <a:r>
+              <a:rPr lang="en" sz="1800">
+                <a:latin typeface="Roboto"/>
+                <a:ea typeface="Roboto"/>
+                <a:cs typeface="Roboto"/>
+                <a:sym typeface="Roboto"/>
+              </a:rPr>
+              <a:t>Which of the following is not good for evaluating clustering algorithm?</a:t>
+            </a:r>
+            <a:endParaRPr sz="1800">
+              <a:latin typeface="Roboto"/>
+              <a:ea typeface="Roboto"/>
+              <a:cs typeface="Roboto"/>
+              <a:sym typeface="Roboto"/>
+            </a:endParaRPr>
           </a:p>
         </p:txBody>
       </p:sp>
@@ -23368,8 +23303,8 @@
         </p:nvSpPr>
         <p:spPr>
           <a:xfrm>
-            <a:off x="661900" y="1499600"/>
-            <a:ext cx="427500" cy="400200"/>
+            <a:off x="548700" y="3545488"/>
+            <a:ext cx="7694700" cy="1046700"/>
           </a:xfrm>
           <a:prstGeom prst="rect">
             <a:avLst/>
@@ -23385,18 +23320,70 @@
           </a:bodyPr>
           <a:lstStyle/>
           <a:p>
-            <a:pPr indent="0" lvl="0" marL="0" rtl="0" algn="l">
-              <a:spcBef>
-                <a:spcPts val="0"/>
-              </a:spcBef>
-              <a:spcAft>
-                <a:spcPts val="0"/>
-              </a:spcAft>
-              <a:buNone/>
+            <a:pPr indent="-317500" lvl="0" marL="457200" rtl="0" algn="l">
+              <a:spcBef>
+                <a:spcPts val="0"/>
+              </a:spcBef>
+              <a:spcAft>
+                <a:spcPts val="0"/>
+              </a:spcAft>
+              <a:buSzPts val="1400"/>
+              <a:buChar char="❏"/>
             </a:pPr>
             <a:r>
               <a:rPr lang="en"/>
-              <a:t>✔</a:t>
+              <a:t>Accuracy</a:t>
+            </a:r>
+            <a:endParaRPr/>
+          </a:p>
+          <a:p>
+            <a:pPr indent="-317500" lvl="0" marL="457200" rtl="0" algn="l">
+              <a:spcBef>
+                <a:spcPts val="0"/>
+              </a:spcBef>
+              <a:spcAft>
+                <a:spcPts val="0"/>
+              </a:spcAft>
+              <a:buSzPts val="1400"/>
+              <a:buChar char="❏"/>
+            </a:pPr>
+            <a:r>
+              <a:rPr lang="en"/>
+              <a:t>Homogeneity</a:t>
+            </a:r>
+            <a:endParaRPr/>
+          </a:p>
+          <a:p>
+            <a:pPr indent="-317500" lvl="0" marL="457200" rtl="0" algn="l">
+              <a:spcBef>
+                <a:spcPts val="0"/>
+              </a:spcBef>
+              <a:spcAft>
+                <a:spcPts val="0"/>
+              </a:spcAft>
+              <a:buSzPts val="1400"/>
+              <a:buChar char="❏"/>
+            </a:pPr>
+            <a:r>
+              <a:rPr lang="en"/>
+              <a:t>Completeness</a:t>
+            </a:r>
+            <a:endParaRPr/>
+          </a:p>
+          <a:p>
+            <a:pPr indent="-317500" lvl="0" marL="457200" rtl="0" algn="l">
+              <a:spcBef>
+                <a:spcPts val="0"/>
+              </a:spcBef>
+              <a:spcAft>
+                <a:spcPts val="0"/>
+              </a:spcAft>
+              <a:buSzPts val="1400"/>
+              <a:buChar char="❏"/>
+            </a:pPr>
+            <a:r>
+              <a:rPr lang="en"/>
+              <a:t>V-measure</a:t>
             </a:r>
             <a:endParaRPr/>
           </a:p>
@@ -23410,7 +23397,7 @@
         </p:nvSpPr>
         <p:spPr>
           <a:xfrm>
-            <a:off x="661900" y="2835900"/>
+            <a:off x="661900" y="1499600"/>
             <a:ext cx="427500" cy="400200"/>
           </a:xfrm>
           <a:prstGeom prst="rect">
@@ -23452,7 +23439,7 @@
         </p:nvSpPr>
         <p:spPr>
           <a:xfrm>
-            <a:off x="661900" y="3498100"/>
+            <a:off x="661900" y="2835900"/>
             <a:ext cx="427500" cy="400200"/>
           </a:xfrm>
           <a:prstGeom prst="rect">
@@ -23494,6 +23481,48 @@
         </p:nvSpPr>
         <p:spPr>
           <a:xfrm>
+            <a:off x="661900" y="3498100"/>
+            <a:ext cx="427500" cy="400200"/>
+          </a:xfrm>
+          <a:prstGeom prst="rect">
+            <a:avLst/>
+          </a:prstGeom>
+          <a:noFill/>
+          <a:ln>
+            <a:noFill/>
+          </a:ln>
+        </p:spPr>
+        <p:txBody>
+          <a:bodyPr anchorCtr="0" anchor="t" bIns="91425" lIns="91425" spcFirstLastPara="1" rIns="91425" wrap="square" tIns="91425">
+            <a:spAutoFit/>
+          </a:bodyPr>
+          <a:lstStyle/>
+          <a:p>
+            <a:pPr indent="0" lvl="0" marL="0" rtl="0" algn="l">
+              <a:spcBef>
+                <a:spcPts val="0"/>
+              </a:spcBef>
+              <a:spcAft>
+                <a:spcPts val="0"/>
+              </a:spcAft>
+              <a:buNone/>
+            </a:pPr>
+            <a:r>
+              <a:rPr lang="en"/>
+              <a:t>✔</a:t>
+            </a:r>
+            <a:endParaRPr/>
+          </a:p>
+        </p:txBody>
+      </p:sp>
+      <p:sp>
+        <p:nvSpPr>
+          <p:cNvPr id="413" name="Google Shape;413;p54"/>
+          <p:cNvSpPr txBox="1"/>
+          <p:nvPr/>
+        </p:nvSpPr>
+        <p:spPr>
+          <a:xfrm>
             <a:off x="4165900" y="4077025"/>
             <a:ext cx="3566100" cy="400200"/>
           </a:xfrm>
@@ -23539,7 +23568,7 @@
       </p:sp>
       <p:pic>
         <p:nvPicPr>
-          <p:cNvPr id="413" name="Google Shape;413;p54"/>
+          <p:cNvPr id="414" name="Google Shape;414;p54"/>
           <p:cNvPicPr preferRelativeResize="0"/>
           <p:nvPr/>
         </p:nvPicPr>
@@ -23578,59 +23607,6 @@
             <p:seq concurrent="1" nextAc="seek">
               <p:cTn dur="indefinite" id="2" nodeType="mainSeq">
                 <p:childTnLst>
-                  <p:par>
-                    <p:cTn fill="hold">
-                      <p:stCondLst>
-                        <p:cond delay="indefinite"/>
-                      </p:stCondLst>
-                      <p:childTnLst>
-                        <p:par>
-                          <p:cTn fill="hold">
-                            <p:stCondLst>
-                              <p:cond delay="0"/>
-                            </p:stCondLst>
-                            <p:childTnLst>
-                              <p:par>
-                                <p:cTn fill="hold" nodeType="clickEffect" presetClass="entr" presetID="10" presetSubtype="0">
-                                  <p:stCondLst>
-                                    <p:cond delay="0"/>
-                                  </p:stCondLst>
-                                  <p:childTnLst>
-                                    <p:set>
-                                      <p:cBhvr>
-                                        <p:cTn dur="1" fill="hold">
-                                          <p:stCondLst>
-                                            <p:cond delay="0"/>
-                                          </p:stCondLst>
-                                        </p:cTn>
-                                        <p:tgtEl>
-                                          <p:spTgt spid="409"/>
-                                        </p:tgtEl>
-                                        <p:attrNameLst>
-                                          <p:attrName>style.visibility</p:attrName>
-                                        </p:attrNameLst>
-                                      </p:cBhvr>
-                                      <p:to>
-                                        <p:strVal val="visible"/>
-                                      </p:to>
-                                    </p:set>
-                                    <p:animEffect filter="fade" transition="in">
-                                      <p:cBhvr>
-                                        <p:cTn dur="1000"/>
-                                        <p:tgtEl>
-                                          <p:spTgt spid="409"/>
-                                        </p:tgtEl>
-                                      </p:cBhvr>
-                                    </p:animEffect>
-                                  </p:childTnLst>
-                                </p:cTn>
-                              </p:par>
-                            </p:childTnLst>
-                          </p:cTn>
-                        </p:par>
-                      </p:childTnLst>
-                    </p:cTn>
-                  </p:par>
                   <p:par>
                     <p:cTn fill="hold">
                       <p:stCondLst>
@@ -23737,6 +23713,59 @@
                       </p:childTnLst>
                     </p:cTn>
                   </p:par>
+                  <p:par>
+                    <p:cTn fill="hold">
+                      <p:stCondLst>
+                        <p:cond delay="indefinite"/>
+                      </p:stCondLst>
+                      <p:childTnLst>
+                        <p:par>
+                          <p:cTn fill="hold">
+                            <p:stCondLst>
+                              <p:cond delay="0"/>
+                            </p:stCondLst>
+                            <p:childTnLst>
+                              <p:par>
+                                <p:cTn fill="hold" nodeType="clickEffect" presetClass="entr" presetID="10" presetSubtype="0">
+                                  <p:stCondLst>
+                                    <p:cond delay="0"/>
+                                  </p:stCondLst>
+                                  <p:childTnLst>
+                                    <p:set>
+                                      <p:cBhvr>
+                                        <p:cTn dur="1" fill="hold">
+                                          <p:stCondLst>
+                                            <p:cond delay="0"/>
+                                          </p:stCondLst>
+                                        </p:cTn>
+                                        <p:tgtEl>
+                                          <p:spTgt spid="412"/>
+                                        </p:tgtEl>
+                                        <p:attrNameLst>
+                                          <p:attrName>style.visibility</p:attrName>
+                                        </p:attrNameLst>
+                                      </p:cBhvr>
+                                      <p:to>
+                                        <p:strVal val="visible"/>
+                                      </p:to>
+                                    </p:set>
+                                    <p:animEffect filter="fade" transition="in">
+                                      <p:cBhvr>
+                                        <p:cTn dur="1000"/>
+                                        <p:tgtEl>
+                                          <p:spTgt spid="412"/>
+                                        </p:tgtEl>
+                                      </p:cBhvr>
+                                    </p:animEffect>
+                                  </p:childTnLst>
+                                </p:cTn>
+                              </p:par>
+                            </p:childTnLst>
+                          </p:cTn>
+                        </p:par>
+                      </p:childTnLst>
+                    </p:cTn>
+                  </p:par>
                 </p:childTnLst>
               </p:cTn>
               <p:prevCondLst>
@@ -23767,7 +23796,7 @@
   <p:cSld>
     <p:spTree>
       <p:nvGrpSpPr>
-        <p:cNvPr id="417" name="Shape 417"/>
+        <p:cNvPr id="418" name="Shape 418"/>
         <p:cNvGrpSpPr/>
         <p:nvPr/>
       </p:nvGrpSpPr>
@@ -23781,7 +23810,7 @@
       </p:grpSpPr>
       <p:pic>
         <p:nvPicPr>
-          <p:cNvPr id="418" name="Google Shape;418;p55"/>
+          <p:cNvPr id="419" name="Google Shape;419;p55"/>
           <p:cNvPicPr preferRelativeResize="0"/>
           <p:nvPr/>
         </p:nvPicPr>
@@ -23808,7 +23837,7 @@
       </p:pic>
       <p:sp>
         <p:nvSpPr>
-          <p:cNvPr id="419" name="Google Shape;419;p55"/>
+          <p:cNvPr id="420" name="Google Shape;420;p55"/>
           <p:cNvSpPr txBox="1"/>
           <p:nvPr>
             <p:ph type="title"/>
@@ -23856,7 +23885,7 @@
       </p:sp>
       <p:sp>
         <p:nvSpPr>
-          <p:cNvPr id="420" name="Google Shape;420;p55"/>
+          <p:cNvPr id="421" name="Google Shape;421;p55"/>
           <p:cNvSpPr txBox="1"/>
           <p:nvPr/>
         </p:nvSpPr>
@@ -23962,7 +23991,7 @@
       </p:sp>
       <p:sp>
         <p:nvSpPr>
-          <p:cNvPr id="421" name="Google Shape;421;p55"/>
+          <p:cNvPr id="422" name="Google Shape;422;p55"/>
           <p:cNvSpPr txBox="1"/>
           <p:nvPr>
             <p:ph idx="12" type="sldNum"/>
@@ -24018,7 +24047,7 @@
       </p:sp>
       <p:pic>
         <p:nvPicPr>
-          <p:cNvPr id="422" name="Google Shape;422;p55"/>
+          <p:cNvPr id="423" name="Google Shape;423;p55"/>
           <p:cNvPicPr preferRelativeResize="0"/>
           <p:nvPr/>
         </p:nvPicPr>
@@ -24057,7 +24086,7 @@
   <p:cSld>
     <p:spTree>
       <p:nvGrpSpPr>
-        <p:cNvPr id="426" name="Shape 426"/>
+        <p:cNvPr id="427" name="Shape 427"/>
         <p:cNvGrpSpPr/>
         <p:nvPr/>
       </p:nvGrpSpPr>
@@ -24071,7 +24100,7 @@
       </p:grpSpPr>
       <p:pic>
         <p:nvPicPr>
-          <p:cNvPr id="427" name="Google Shape;427;p56"/>
+          <p:cNvPr id="428" name="Google Shape;428;p56"/>
           <p:cNvPicPr preferRelativeResize="0"/>
           <p:nvPr/>
         </p:nvPicPr>
@@ -24098,7 +24127,7 @@
       </p:pic>
       <p:sp>
         <p:nvSpPr>
-          <p:cNvPr id="428" name="Google Shape;428;p56"/>
+          <p:cNvPr id="429" name="Google Shape;429;p56"/>
           <p:cNvSpPr txBox="1"/>
           <p:nvPr>
             <p:ph type="title"/>
@@ -24146,7 +24175,7 @@
       </p:sp>
       <p:sp>
         <p:nvSpPr>
-          <p:cNvPr id="429" name="Google Shape;429;p56"/>
+          <p:cNvPr id="430" name="Google Shape;430;p56"/>
           <p:cNvSpPr txBox="1"/>
           <p:nvPr/>
         </p:nvSpPr>
@@ -24392,7 +24421,7 @@
       </p:sp>
       <p:sp>
         <p:nvSpPr>
-          <p:cNvPr id="430" name="Google Shape;430;p56"/>
+          <p:cNvPr id="431" name="Google Shape;431;p56"/>
           <p:cNvSpPr txBox="1"/>
           <p:nvPr>
             <p:ph idx="12" type="sldNum"/>
@@ -24448,7 +24477,7 @@
       </p:sp>
       <p:pic>
         <p:nvPicPr>
-          <p:cNvPr id="431" name="Google Shape;431;p56"/>
+          <p:cNvPr id="432" name="Google Shape;432;p56"/>
           <p:cNvPicPr preferRelativeResize="0"/>
           <p:nvPr/>
         </p:nvPicPr>
@@ -24476,7 +24505,7 @@
       </p:pic>
       <p:sp>
         <p:nvSpPr>
-          <p:cNvPr id="432" name="Google Shape;432;p56"/>
+          <p:cNvPr id="433" name="Google Shape;433;p56"/>
           <p:cNvSpPr txBox="1"/>
           <p:nvPr/>
         </p:nvSpPr>
@@ -27415,6 +27444,285 @@
 </file>
 
 <file path=ppt/theme/theme2.xml><?xml version="1.0" encoding="utf-8"?>
+<a:theme xmlns:a="http://schemas.openxmlformats.org/drawingml/2006/main" xmlns:r="http://schemas.openxmlformats.org/officeDocument/2006/relationships">
+  <a:themeElements>
+    <a:clrScheme name="Default">
+      <a:dk1>
+        <a:srgbClr val="000000"/>
+      </a:dk1>
+      <a:lt1>
+        <a:srgbClr val="FFFFFF"/>
+      </a:lt1>
+      <a:dk2>
+        <a:srgbClr val="158158"/>
+      </a:dk2>
+      <a:lt2>
+        <a:srgbClr val="F3F3F3"/>
+      </a:lt2>
+      <a:accent1>
+        <a:srgbClr val="058DC7"/>
+      </a:accent1>
+      <a:accent2>
+        <a:srgbClr val="50B432"/>
+      </a:accent2>
+      <a:accent3>
+        <a:srgbClr val="ED561B"/>
+      </a:accent3>
+      <a:accent4>
+        <a:srgbClr val="EDEF00"/>
+      </a:accent4>
+      <a:accent5>
+        <a:srgbClr val="24CBE5"/>
+      </a:accent5>
+      <a:accent6>
+        <a:srgbClr val="64E572"/>
+      </a:accent6>
+      <a:hlink>
+        <a:srgbClr val="2200CC"/>
+      </a:hlink>
+      <a:folHlink>
+        <a:srgbClr val="551A8B"/>
+      </a:folHlink>
+    </a:clrScheme>
+    <a:fontScheme name="Office">
+      <a:majorFont>
+        <a:latin typeface="Arial"/>
+        <a:ea typeface=""/>
+        <a:cs typeface=""/>
+        <a:font script="Jpan" typeface="ＭＳ Ｐゴシック"/>
+        <a:font script="Hang" typeface="맑은 고딕"/>
+        <a:font script="Hans" typeface="宋体"/>
+        <a:font script="Hant" typeface="新細明體"/>
+        <a:font script="Arab" typeface="Times New Roman"/>
+        <a:font script="Hebr" typeface="Times New Roman"/>
+        <a:font script="Thai" typeface="Angsana New"/>
+        <a:font script="Ethi" typeface="Nyala"/>
+        <a:font script="Beng" typeface="Vrinda"/>
+        <a:font script="Gujr" typeface="Shruti"/>
+        <a:font script="Khmr" typeface="MoolBoran"/>
+        <a:font script="Knda" typeface="Tunga"/>
+        <a:font script="Guru" typeface="Raavi"/>
+        <a:font script="Cans" typeface="Euphemia"/>
+        <a:font script="Cher" typeface="Plantagenet Cherokee"/>
+        <a:font script="Yiii" typeface="Microsoft Yi Baiti"/>
+        <a:font script="Tibt" typeface="Microsoft Himalaya"/>
+        <a:font script="Thaa" typeface="MV Boli"/>
+        <a:font script="Deva" typeface="Mangal"/>
+        <a:font script="Telu" typeface="Gautami"/>
+        <a:font script="Taml" typeface="Latha"/>
+        <a:font script="Syrc" typeface="Estrangelo Edessa"/>
+        <a:font script="Orya" typeface="Kalinga"/>
+        <a:font script="Mlym" typeface="Kartika"/>
+        <a:font script="Laoo" typeface="DokChampa"/>
+        <a:font script="Sinh" typeface="Iskoola Pota"/>
+        <a:font script="Mong" typeface="Mongolian Baiti"/>
+        <a:font script="Viet" typeface="Times New Roman"/>
+        <a:font script="Uigh" typeface="Microsoft Uighur"/>
+        <a:font script="Geor" typeface="Sylfaen"/>
+      </a:majorFont>
+      <a:minorFont>
+        <a:latin typeface="Arial"/>
+        <a:ea typeface=""/>
+        <a:cs typeface=""/>
+        <a:font script="Jpan" typeface="ＭＳ Ｐゴシック"/>
+        <a:font script="Hang" typeface="맑은 고딕"/>
+        <a:font script="Hans" typeface="宋体"/>
+        <a:font script="Hant" typeface="新細明體"/>
+        <a:font script="Arab" typeface="Arial"/>
+        <a:font script="Hebr" typeface="Arial"/>
+        <a:font script="Thai" typeface="Cordia New"/>
+        <a:font script="Ethi" typeface="Nyala"/>
+        <a:font script="Beng" typeface="Vrinda"/>
+        <a:font script="Gujr" typeface="Shruti"/>
+        <a:font script="Khmr" typeface="DaunPenh"/>
+        <a:font script="Knda" typeface="Tunga"/>
+        <a:font script="Guru" typeface="Raavi"/>
+        <a:font script="Cans" typeface="Euphemia"/>
+        <a:font script="Cher" typeface="Plantagenet Cherokee"/>
+        <a:font script="Yiii" typeface="Microsoft Yi Baiti"/>
+        <a:font script="Tibt" typeface="Microsoft Himalaya"/>
+        <a:font script="Thaa" typeface="MV Boli"/>
+        <a:font script="Deva" typeface="Mangal"/>
+        <a:font script="Telu" typeface="Gautami"/>
+        <a:font script="Taml" typeface="Latha"/>
+        <a:font script="Syrc" typeface="Estrangelo Edessa"/>
+        <a:font script="Orya" typeface="Kalinga"/>
+        <a:font script="Mlym" typeface="Kartika"/>
+        <a:font script="Laoo" typeface="DokChampa"/>
+        <a:font script="Sinh" typeface="Iskoola Pota"/>
+        <a:font script="Mong" typeface="Mongolian Baiti"/>
+        <a:font script="Viet" typeface="Arial"/>
+        <a:font script="Uigh" typeface="Microsoft Uighur"/>
+        <a:font script="Geor" typeface="Sylfaen"/>
+      </a:minorFont>
+    </a:fontScheme>
+    <a:fmtScheme name="Office">
+      <a:fillStyleLst>
+        <a:solidFill>
+          <a:schemeClr val="phClr"/>
+        </a:solidFill>
+        <a:gradFill rotWithShape="1">
+          <a:gsLst>
+            <a:gs pos="0">
+              <a:schemeClr val="phClr">
+                <a:tint val="50000"/>
+                <a:satMod val="300000"/>
+              </a:schemeClr>
+            </a:gs>
+            <a:gs pos="35000">
+              <a:schemeClr val="phClr">
+                <a:tint val="37000"/>
+                <a:satMod val="300000"/>
+              </a:schemeClr>
+            </a:gs>
+            <a:gs pos="100000">
+              <a:schemeClr val="phClr">
+                <a:tint val="15000"/>
+                <a:satMod val="350000"/>
+              </a:schemeClr>
+            </a:gs>
+          </a:gsLst>
+          <a:lin ang="16200000" scaled="1"/>
+        </a:gradFill>
+        <a:gradFill rotWithShape="1">
+          <a:gsLst>
+            <a:gs pos="0">
+              <a:schemeClr val="phClr">
+                <a:tint val="100000"/>
+                <a:shade val="100000"/>
+                <a:satMod val="130000"/>
+              </a:schemeClr>
+            </a:gs>
+            <a:gs pos="100000">
+              <a:schemeClr val="phClr">
+                <a:tint val="50000"/>
+                <a:shade val="100000"/>
+                <a:satMod val="350000"/>
+              </a:schemeClr>
+            </a:gs>
+          </a:gsLst>
+          <a:lin ang="16200000" scaled="0"/>
+        </a:gradFill>
+      </a:fillStyleLst>
+      <a:lnStyleLst>
+        <a:ln w="9525" cap="flat" cmpd="sng" algn="ctr">
+          <a:solidFill>
+            <a:schemeClr val="phClr">
+              <a:shade val="95000"/>
+              <a:satMod val="105000"/>
+            </a:schemeClr>
+          </a:solidFill>
+          <a:prstDash val="solid"/>
+        </a:ln>
+        <a:ln w="25400" cap="flat" cmpd="sng" algn="ctr">
+          <a:solidFill>
+            <a:schemeClr val="phClr"/>
+          </a:solidFill>
+          <a:prstDash val="solid"/>
+        </a:ln>
+        <a:ln w="38100" cap="flat" cmpd="sng" algn="ctr">
+          <a:solidFill>
+            <a:schemeClr val="phClr"/>
+          </a:solidFill>
+          <a:prstDash val="solid"/>
+        </a:ln>
+      </a:lnStyleLst>
+      <a:effectStyleLst>
+        <a:effectStyle>
+          <a:effectLst>
+            <a:outerShdw blurRad="40000" dist="20000" dir="5400000" rotWithShape="0">
+              <a:srgbClr val="000000">
+                <a:alpha val="38000"/>
+              </a:srgbClr>
+            </a:outerShdw>
+          </a:effectLst>
+        </a:effectStyle>
+        <a:effectStyle>
+          <a:effectLst>
+            <a:outerShdw blurRad="40000" dist="23000" dir="5400000" rotWithShape="0">
+              <a:srgbClr val="000000">
+                <a:alpha val="35000"/>
+              </a:srgbClr>
+            </a:outerShdw>
+          </a:effectLst>
+        </a:effectStyle>
+        <a:effectStyle>
+          <a:effectLst>
+            <a:outerShdw blurRad="40000" dist="23000" dir="5400000" rotWithShape="0">
+              <a:srgbClr val="000000">
+                <a:alpha val="35000"/>
+              </a:srgbClr>
+            </a:outerShdw>
+          </a:effectLst>
+          <a:scene3d>
+            <a:camera prst="orthographicFront">
+              <a:rot lat="0" lon="0" rev="0"/>
+            </a:camera>
+            <a:lightRig rig="threePt" dir="t">
+              <a:rot lat="0" lon="0" rev="1200000"/>
+            </a:lightRig>
+          </a:scene3d>
+          <a:sp3d>
+            <a:bevelT w="63500" h="25400"/>
+          </a:sp3d>
+        </a:effectStyle>
+      </a:effectStyleLst>
+      <a:bgFillStyleLst>
+        <a:solidFill>
+          <a:schemeClr val="phClr"/>
+        </a:solidFill>
+        <a:gradFill rotWithShape="1">
+          <a:gsLst>
+            <a:gs pos="0">
+              <a:schemeClr val="phClr">
+                <a:tint val="40000"/>
+                <a:satMod val="350000"/>
+              </a:schemeClr>
+            </a:gs>
+            <a:gs pos="40000">
+              <a:schemeClr val="phClr">
+                <a:tint val="45000"/>
+                <a:shade val="99000"/>
+                <a:satMod val="350000"/>
+              </a:schemeClr>
+            </a:gs>
+            <a:gs pos="100000">
+              <a:schemeClr val="phClr">
+                <a:shade val="20000"/>
+                <a:satMod val="255000"/>
+              </a:schemeClr>
+            </a:gs>
+          </a:gsLst>
+          <a:path path="circle">
+            <a:fillToRect l="50000" t="-80000" r="50000" b="180000"/>
+          </a:path>
+        </a:gradFill>
+        <a:gradFill rotWithShape="1">
+          <a:gsLst>
+            <a:gs pos="0">
+              <a:schemeClr val="phClr">
+                <a:tint val="80000"/>
+                <a:satMod val="300000"/>
+              </a:schemeClr>
+            </a:gs>
+            <a:gs pos="100000">
+              <a:schemeClr val="phClr">
+                <a:shade val="30000"/>
+                <a:satMod val="200000"/>
+              </a:schemeClr>
+            </a:gs>
+          </a:gsLst>
+          <a:path path="circle">
+            <a:fillToRect l="50000" t="50000" r="50000" b="50000"/>
+          </a:path>
+        </a:gradFill>
+      </a:bgFillStyleLst>
+    </a:fmtScheme>
+  </a:themeElements>
+</a:theme>
+</file>
+
+<file path=ppt/theme/theme3.xml><?xml version="1.0" encoding="utf-8"?>
 <a:theme xmlns:a="http://schemas.openxmlformats.org/drawingml/2006/main" xmlns:r="http://schemas.openxmlformats.org/officeDocument/2006/relationships" name="Simple Light">
   <a:themeElements>
     <a:clrScheme name="Simple Light">
@@ -27691,283 +27999,4 @@
     </a:fmtScheme>
   </a:themeElements>
 </a:theme>
-</file>
-
-<file path=ppt/theme/theme3.xml><?xml version="1.0" encoding="utf-8"?>
-<a:theme xmlns:a="http://schemas.openxmlformats.org/drawingml/2006/main" xmlns:r="http://schemas.openxmlformats.org/officeDocument/2006/relationships">
-  <a:themeElements>
-    <a:clrScheme name="Default">
-      <a:dk1>
-        <a:srgbClr val="000000"/>
-      </a:dk1>
-      <a:lt1>
-        <a:srgbClr val="FFFFFF"/>
-      </a:lt1>
-      <a:dk2>
-        <a:srgbClr val="158158"/>
-      </a:dk2>
-      <a:lt2>
-        <a:srgbClr val="F3F3F3"/>
-      </a:lt2>
-      <a:accent1>
-        <a:srgbClr val="058DC7"/>
-      </a:accent1>
-      <a:accent2>
-        <a:srgbClr val="50B432"/>
-      </a:accent2>
-      <a:accent3>
-        <a:srgbClr val="ED561B"/>
-      </a:accent3>
-      <a:accent4>
-        <a:srgbClr val="EDEF00"/>
-      </a:accent4>
-      <a:accent5>
-        <a:srgbClr val="24CBE5"/>
-      </a:accent5>
-      <a:accent6>
-        <a:srgbClr val="64E572"/>
-      </a:accent6>
-      <a:hlink>
-        <a:srgbClr val="2200CC"/>
-      </a:hlink>
-      <a:folHlink>
-        <a:srgbClr val="551A8B"/>
-      </a:folHlink>
-    </a:clrScheme>
-    <a:fontScheme name="Office">
-      <a:majorFont>
-        <a:latin typeface="Arial"/>
-        <a:ea typeface=""/>
-        <a:cs typeface=""/>
-        <a:font script="Jpan" typeface="ＭＳ Ｐゴシック"/>
-        <a:font script="Hang" typeface="맑은 고딕"/>
-        <a:font script="Hans" typeface="宋体"/>
-        <a:font script="Hant" typeface="新細明體"/>
-        <a:font script="Arab" typeface="Times New Roman"/>
-        <a:font script="Hebr" typeface="Times New Roman"/>
-        <a:font script="Thai" typeface="Angsana New"/>
-        <a:font script="Ethi" typeface="Nyala"/>
-        <a:font script="Beng" typeface="Vrinda"/>
-        <a:font script="Gujr" typeface="Shruti"/>
-        <a:font script="Khmr" typeface="MoolBoran"/>
-        <a:font script="Knda" typeface="Tunga"/>
-        <a:font script="Guru" typeface="Raavi"/>
-        <a:font script="Cans" typeface="Euphemia"/>
-        <a:font script="Cher" typeface="Plantagenet Cherokee"/>
-        <a:font script="Yiii" typeface="Microsoft Yi Baiti"/>
-        <a:font script="Tibt" typeface="Microsoft Himalaya"/>
-        <a:font script="Thaa" typeface="MV Boli"/>
-        <a:font script="Deva" typeface="Mangal"/>
-        <a:font script="Telu" typeface="Gautami"/>
-        <a:font script="Taml" typeface="Latha"/>
-        <a:font script="Syrc" typeface="Estrangelo Edessa"/>
-        <a:font script="Orya" typeface="Kalinga"/>
-        <a:font script="Mlym" typeface="Kartika"/>
-        <a:font script="Laoo" typeface="DokChampa"/>
-        <a:font script="Sinh" typeface="Iskoola Pota"/>
-        <a:font script="Mong" typeface="Mongolian Baiti"/>
-        <a:font script="Viet" typeface="Times New Roman"/>
-        <a:font script="Uigh" typeface="Microsoft Uighur"/>
-        <a:font script="Geor" typeface="Sylfaen"/>
-      </a:majorFont>
-      <a:minorFont>
-        <a:latin typeface="Arial"/>
-        <a:ea typeface=""/>
-        <a:cs typeface=""/>
-        <a:font script="Jpan" typeface="ＭＳ Ｐゴシック"/>
-        <a:font script="Hang" typeface="맑은 고딕"/>
-        <a:font script="Hans" typeface="宋体"/>
-        <a:font script="Hant" typeface="新細明體"/>
-        <a:font script="Arab" typeface="Arial"/>
-        <a:font script="Hebr" typeface="Arial"/>
-        <a:font script="Thai" typeface="Cordia New"/>
-        <a:font script="Ethi" typeface="Nyala"/>
-        <a:font script="Beng" typeface="Vrinda"/>
-        <a:font script="Gujr" typeface="Shruti"/>
-        <a:font script="Khmr" typeface="DaunPenh"/>
-        <a:font script="Knda" typeface="Tunga"/>
-        <a:font script="Guru" typeface="Raavi"/>
-        <a:font script="Cans" typeface="Euphemia"/>
-        <a:font script="Cher" typeface="Plantagenet Cherokee"/>
-        <a:font script="Yiii" typeface="Microsoft Yi Baiti"/>
-        <a:font script="Tibt" typeface="Microsoft Himalaya"/>
-        <a:font script="Thaa" typeface="MV Boli"/>
-        <a:font script="Deva" typeface="Mangal"/>
-        <a:font script="Telu" typeface="Gautami"/>
-        <a:font script="Taml" typeface="Latha"/>
-        <a:font script="Syrc" typeface="Estrangelo Edessa"/>
-        <a:font script="Orya" typeface="Kalinga"/>
-        <a:font script="Mlym" typeface="Kartika"/>
-        <a:font script="Laoo" typeface="DokChampa"/>
-        <a:font script="Sinh" typeface="Iskoola Pota"/>
-        <a:font script="Mong" typeface="Mongolian Baiti"/>
-        <a:font script="Viet" typeface="Arial"/>
-        <a:font script="Uigh" typeface="Microsoft Uighur"/>
-        <a:font script="Geor" typeface="Sylfaen"/>
-      </a:minorFont>
-    </a:fontScheme>
-    <a:fmtScheme name="Office">
-      <a:fillStyleLst>
-        <a:solidFill>
-          <a:schemeClr val="phClr"/>
-        </a:solidFill>
-        <a:gradFill rotWithShape="1">
-          <a:gsLst>
-            <a:gs pos="0">
-              <a:schemeClr val="phClr">
-                <a:tint val="50000"/>
-                <a:satMod val="300000"/>
-              </a:schemeClr>
-            </a:gs>
-            <a:gs pos="35000">
-              <a:schemeClr val="phClr">
-                <a:tint val="37000"/>
-                <a:satMod val="300000"/>
-              </a:schemeClr>
-            </a:gs>
-            <a:gs pos="100000">
-              <a:schemeClr val="phClr">
-                <a:tint val="15000"/>
-                <a:satMod val="350000"/>
-              </a:schemeClr>
-            </a:gs>
-          </a:gsLst>
-          <a:lin ang="16200000" scaled="1"/>
-        </a:gradFill>
-        <a:gradFill rotWithShape="1">
-          <a:gsLst>
-            <a:gs pos="0">
-              <a:schemeClr val="phClr">
-                <a:tint val="100000"/>
-                <a:shade val="100000"/>
-                <a:satMod val="130000"/>
-              </a:schemeClr>
-            </a:gs>
-            <a:gs pos="100000">
-              <a:schemeClr val="phClr">
-                <a:tint val="50000"/>
-                <a:shade val="100000"/>
-                <a:satMod val="350000"/>
-              </a:schemeClr>
-            </a:gs>
-          </a:gsLst>
-          <a:lin ang="16200000" scaled="0"/>
-        </a:gradFill>
-      </a:fillStyleLst>
-      <a:lnStyleLst>
-        <a:ln w="9525" cap="flat" cmpd="sng" algn="ctr">
-          <a:solidFill>
-            <a:schemeClr val="phClr">
-              <a:shade val="95000"/>
-              <a:satMod val="105000"/>
-            </a:schemeClr>
-          </a:solidFill>
-          <a:prstDash val="solid"/>
-        </a:ln>
-        <a:ln w="25400" cap="flat" cmpd="sng" algn="ctr">
-          <a:solidFill>
-            <a:schemeClr val="phClr"/>
-          </a:solidFill>
-          <a:prstDash val="solid"/>
-        </a:ln>
-        <a:ln w="38100" cap="flat" cmpd="sng" algn="ctr">
-          <a:solidFill>
-            <a:schemeClr val="phClr"/>
-          </a:solidFill>
-          <a:prstDash val="solid"/>
-        </a:ln>
-      </a:lnStyleLst>
-      <a:effectStyleLst>
-        <a:effectStyle>
-          <a:effectLst>
-            <a:outerShdw blurRad="40000" dist="20000" dir="5400000" rotWithShape="0">
-              <a:srgbClr val="000000">
-                <a:alpha val="38000"/>
-              </a:srgbClr>
-            </a:outerShdw>
-          </a:effectLst>
-        </a:effectStyle>
-        <a:effectStyle>
-          <a:effectLst>
-            <a:outerShdw blurRad="40000" dist="23000" dir="5400000" rotWithShape="0">
-              <a:srgbClr val="000000">
-                <a:alpha val="35000"/>
-              </a:srgbClr>
-            </a:outerShdw>
-          </a:effectLst>
-        </a:effectStyle>
-        <a:effectStyle>
-          <a:effectLst>
-            <a:outerShdw blurRad="40000" dist="23000" dir="5400000" rotWithShape="0">
-              <a:srgbClr val="000000">
-                <a:alpha val="35000"/>
-              </a:srgbClr>
-            </a:outerShdw>
-          </a:effectLst>
-          <a:scene3d>
-            <a:camera prst="orthographicFront">
-              <a:rot lat="0" lon="0" rev="0"/>
-            </a:camera>
-            <a:lightRig rig="threePt" dir="t">
-              <a:rot lat="0" lon="0" rev="1200000"/>
-            </a:lightRig>
-          </a:scene3d>
-          <a:sp3d>
-            <a:bevelT w="63500" h="25400"/>
-          </a:sp3d>
-        </a:effectStyle>
-      </a:effectStyleLst>
-      <a:bgFillStyleLst>
-        <a:solidFill>
-          <a:schemeClr val="phClr"/>
-        </a:solidFill>
-        <a:gradFill rotWithShape="1">
-          <a:gsLst>
-            <a:gs pos="0">
-              <a:schemeClr val="phClr">
-                <a:tint val="40000"/>
-                <a:satMod val="350000"/>
-              </a:schemeClr>
-            </a:gs>
-            <a:gs pos="40000">
-              <a:schemeClr val="phClr">
-                <a:tint val="45000"/>
-                <a:shade val="99000"/>
-                <a:satMod val="350000"/>
-              </a:schemeClr>
-            </a:gs>
-            <a:gs pos="100000">
-              <a:schemeClr val="phClr">
-                <a:shade val="20000"/>
-                <a:satMod val="255000"/>
-              </a:schemeClr>
-            </a:gs>
-          </a:gsLst>
-          <a:path path="circle">
-            <a:fillToRect l="50000" t="-80000" r="50000" b="180000"/>
-          </a:path>
-        </a:gradFill>
-        <a:gradFill rotWithShape="1">
-          <a:gsLst>
-            <a:gs pos="0">
-              <a:schemeClr val="phClr">
-                <a:tint val="80000"/>
-                <a:satMod val="300000"/>
-              </a:schemeClr>
-            </a:gs>
-            <a:gs pos="100000">
-              <a:schemeClr val="phClr">
-                <a:shade val="30000"/>
-                <a:satMod val="200000"/>
-              </a:schemeClr>
-            </a:gs>
-          </a:gsLst>
-          <a:path path="circle">
-            <a:fillToRect l="50000" t="50000" r="50000" b="50000"/>
-          </a:path>
-        </a:gradFill>
-      </a:bgFillStyleLst>
-    </a:fmtScheme>
-  </a:themeElements>
-</a:theme>
 </file>
</xml_diff>